<commit_message>
setting up training of mcts
</commit_message>
<xml_diff>
--- a/docs/Semi Final Results.pptx
+++ b/docs/Semi Final Results.pptx
@@ -16039,7 +16039,7 @@
           <a:p>
             <a:r>
               <a:rPr lang="en-US" dirty="0"/>
-              <a:t>Double Deep Q-Learning Algorithm</a:t>
+              <a:t>Zero-sum stochastic game</a:t>
             </a:r>
             <a:endParaRPr lang="he-IL" dirty="0"/>
           </a:p>
@@ -17040,7 +17040,7 @@
         </p:nvSpPr>
         <p:spPr>
           <a:xfrm>
-            <a:off x="979487" y="2219324"/>
+            <a:off x="1141411" y="1981199"/>
             <a:ext cx="10340347" cy="3541714"/>
           </a:xfrm>
         </p:spPr>
@@ -19456,7 +19456,7 @@
         </p:blipFill>
         <p:spPr>
           <a:xfrm>
-            <a:off x="3948311" y="1955430"/>
+            <a:off x="6189302" y="1851913"/>
             <a:ext cx="4295378" cy="4284052"/>
           </a:xfrm>
           <a:prstGeom prst="rect">
@@ -19464,6 +19464,220 @@
           </a:prstGeom>
         </p:spPr>
       </p:pic>
+      <p:sp>
+        <p:nvSpPr>
+          <p:cNvPr id="4" name="Text Placeholder 3">
+            <a:extLst>
+              <a:ext uri="{FF2B5EF4-FFF2-40B4-BE49-F238E27FC236}">
+                <a16:creationId xmlns:a16="http://schemas.microsoft.com/office/drawing/2014/main" id="{370A4EFD-AA97-45B0-8154-B075DC53B217}"/>
+              </a:ext>
+            </a:extLst>
+          </p:cNvPr>
+          <p:cNvSpPr txBox="1">
+            <a:spLocks/>
+          </p:cNvSpPr>
+          <p:nvPr/>
+        </p:nvSpPr>
+        <p:spPr>
+          <a:xfrm>
+            <a:off x="1141413" y="2288356"/>
+            <a:ext cx="4641763" cy="1140644"/>
+          </a:xfrm>
+          <a:prstGeom prst="rect">
+            <a:avLst/>
+          </a:prstGeom>
+        </p:spPr>
+        <p:txBody>
+          <a:bodyPr/>
+          <a:lstStyle>
+            <a:lvl1pPr marL="228600" indent="-228600" algn="r" defTabSz="914400" rtl="1" eaLnBrk="1" latinLnBrk="0" hangingPunct="1">
+              <a:lnSpc>
+                <a:spcPct val="120000"/>
+              </a:lnSpc>
+              <a:spcBef>
+                <a:spcPts val="1000"/>
+              </a:spcBef>
+              <a:buSzPct val="125000"/>
+              <a:buFont typeface="Arial" panose="020B0604020202020204" pitchFamily="34" charset="0"/>
+              <a:buChar char="•"/>
+              <a:defRPr sz="2400" kern="1200">
+                <a:solidFill>
+                  <a:schemeClr val="tx1"/>
+                </a:solidFill>
+                <a:latin typeface="+mn-lt"/>
+                <a:ea typeface="+mn-ea"/>
+                <a:cs typeface="+mn-cs"/>
+              </a:defRPr>
+            </a:lvl1pPr>
+            <a:lvl2pPr marL="685800" indent="-228600" algn="r" defTabSz="914400" rtl="1" eaLnBrk="1" latinLnBrk="0" hangingPunct="1">
+              <a:lnSpc>
+                <a:spcPct val="120000"/>
+              </a:lnSpc>
+              <a:spcBef>
+                <a:spcPts val="500"/>
+              </a:spcBef>
+              <a:buSzPct val="125000"/>
+              <a:buFont typeface="Arial" panose="020B0604020202020204" pitchFamily="34" charset="0"/>
+              <a:buChar char="•"/>
+              <a:defRPr sz="2000" kern="1200">
+                <a:solidFill>
+                  <a:schemeClr val="tx1"/>
+                </a:solidFill>
+                <a:latin typeface="+mn-lt"/>
+                <a:ea typeface="+mn-ea"/>
+                <a:cs typeface="+mn-cs"/>
+              </a:defRPr>
+            </a:lvl2pPr>
+            <a:lvl3pPr marL="1143000" indent="-228600" algn="r" defTabSz="914400" rtl="1" eaLnBrk="1" latinLnBrk="0" hangingPunct="1">
+              <a:lnSpc>
+                <a:spcPct val="120000"/>
+              </a:lnSpc>
+              <a:spcBef>
+                <a:spcPts val="500"/>
+              </a:spcBef>
+              <a:buSzPct val="125000"/>
+              <a:buFont typeface="Arial" panose="020B0604020202020204" pitchFamily="34" charset="0"/>
+              <a:buChar char="•"/>
+              <a:defRPr sz="1800" kern="1200">
+                <a:solidFill>
+                  <a:schemeClr val="tx1"/>
+                </a:solidFill>
+                <a:latin typeface="+mn-lt"/>
+                <a:ea typeface="+mn-ea"/>
+                <a:cs typeface="+mn-cs"/>
+              </a:defRPr>
+            </a:lvl3pPr>
+            <a:lvl4pPr marL="1600200" indent="-228600" algn="r" defTabSz="914400" rtl="1" eaLnBrk="1" latinLnBrk="0" hangingPunct="1">
+              <a:lnSpc>
+                <a:spcPct val="120000"/>
+              </a:lnSpc>
+              <a:spcBef>
+                <a:spcPts val="500"/>
+              </a:spcBef>
+              <a:buSzPct val="125000"/>
+              <a:buFont typeface="Arial" panose="020B0604020202020204" pitchFamily="34" charset="0"/>
+              <a:buChar char="•"/>
+              <a:defRPr sz="1600" kern="1200">
+                <a:solidFill>
+                  <a:schemeClr val="tx1"/>
+                </a:solidFill>
+                <a:latin typeface="+mn-lt"/>
+                <a:ea typeface="+mn-ea"/>
+                <a:cs typeface="+mn-cs"/>
+              </a:defRPr>
+            </a:lvl4pPr>
+            <a:lvl5pPr marL="2057400" indent="-228600" algn="r" defTabSz="914400" rtl="1" eaLnBrk="1" latinLnBrk="0" hangingPunct="1">
+              <a:lnSpc>
+                <a:spcPct val="120000"/>
+              </a:lnSpc>
+              <a:spcBef>
+                <a:spcPts val="500"/>
+              </a:spcBef>
+              <a:buSzPct val="125000"/>
+              <a:buFont typeface="Arial" panose="020B0604020202020204" pitchFamily="34" charset="0"/>
+              <a:buChar char="•"/>
+              <a:defRPr sz="1600" kern="1200">
+                <a:solidFill>
+                  <a:schemeClr val="tx1"/>
+                </a:solidFill>
+                <a:latin typeface="+mn-lt"/>
+                <a:ea typeface="+mn-ea"/>
+                <a:cs typeface="+mn-cs"/>
+              </a:defRPr>
+            </a:lvl5pPr>
+            <a:lvl6pPr marL="2514600" indent="-228600" algn="r" defTabSz="914400" rtl="1" eaLnBrk="1" latinLnBrk="0" hangingPunct="1">
+              <a:lnSpc>
+                <a:spcPct val="120000"/>
+              </a:lnSpc>
+              <a:spcBef>
+                <a:spcPts val="500"/>
+              </a:spcBef>
+              <a:buSzPct val="125000"/>
+              <a:buFont typeface="Arial" panose="020B0604020202020204" pitchFamily="34" charset="0"/>
+              <a:buChar char="•"/>
+              <a:defRPr sz="1400" kern="1200">
+                <a:solidFill>
+                  <a:schemeClr val="tx1"/>
+                </a:solidFill>
+                <a:latin typeface="+mn-lt"/>
+                <a:ea typeface="+mn-ea"/>
+                <a:cs typeface="+mn-cs"/>
+              </a:defRPr>
+            </a:lvl6pPr>
+            <a:lvl7pPr marL="2971800" indent="-228600" algn="r" defTabSz="914400" rtl="1" eaLnBrk="1" latinLnBrk="0" hangingPunct="1">
+              <a:lnSpc>
+                <a:spcPct val="120000"/>
+              </a:lnSpc>
+              <a:spcBef>
+                <a:spcPts val="500"/>
+              </a:spcBef>
+              <a:buSzPct val="125000"/>
+              <a:buFont typeface="Arial" panose="020B0604020202020204" pitchFamily="34" charset="0"/>
+              <a:buChar char="•"/>
+              <a:defRPr sz="1400" kern="1200">
+                <a:solidFill>
+                  <a:schemeClr val="tx1"/>
+                </a:solidFill>
+                <a:latin typeface="+mn-lt"/>
+                <a:ea typeface="+mn-ea"/>
+                <a:cs typeface="+mn-cs"/>
+              </a:defRPr>
+            </a:lvl7pPr>
+            <a:lvl8pPr marL="3429000" indent="-228600" algn="r" defTabSz="914400" rtl="1" eaLnBrk="1" latinLnBrk="0" hangingPunct="1">
+              <a:lnSpc>
+                <a:spcPct val="120000"/>
+              </a:lnSpc>
+              <a:spcBef>
+                <a:spcPts val="500"/>
+              </a:spcBef>
+              <a:buSzPct val="125000"/>
+              <a:buFont typeface="Arial" panose="020B0604020202020204" pitchFamily="34" charset="0"/>
+              <a:buChar char="•"/>
+              <a:defRPr sz="1400" kern="1200">
+                <a:solidFill>
+                  <a:schemeClr val="tx1"/>
+                </a:solidFill>
+                <a:latin typeface="+mn-lt"/>
+                <a:ea typeface="+mn-ea"/>
+                <a:cs typeface="+mn-cs"/>
+              </a:defRPr>
+            </a:lvl8pPr>
+            <a:lvl9pPr marL="3886200" indent="-228600" algn="r" defTabSz="914400" rtl="1" eaLnBrk="1" latinLnBrk="0" hangingPunct="1">
+              <a:lnSpc>
+                <a:spcPct val="120000"/>
+              </a:lnSpc>
+              <a:spcBef>
+                <a:spcPts val="500"/>
+              </a:spcBef>
+              <a:buSzPct val="125000"/>
+              <a:buFont typeface="Arial" panose="020B0604020202020204" pitchFamily="34" charset="0"/>
+              <a:buChar char="•"/>
+              <a:defRPr sz="1400" kern="1200">
+                <a:solidFill>
+                  <a:schemeClr val="tx1"/>
+                </a:solidFill>
+                <a:latin typeface="+mn-lt"/>
+                <a:ea typeface="+mn-ea"/>
+                <a:cs typeface="+mn-cs"/>
+              </a:defRPr>
+            </a:lvl9pPr>
+          </a:lstStyle>
+          <a:p>
+            <a:pPr algn="l" rtl="0"/>
+            <a:r>
+              <a:rPr lang="en-US" dirty="0"/>
+              <a:t>Board of 10x10</a:t>
+            </a:r>
+          </a:p>
+          <a:p>
+            <a:pPr algn="l" rtl="0"/>
+            <a:r>
+              <a:rPr lang="en-US" dirty="0"/>
+              <a:t>Goal: Maximize Total Reward (Minimum zombies survival)</a:t>
+            </a:r>
+          </a:p>
+        </p:txBody>
+      </p:sp>
     </p:spTree>
     <p:extLst>
       <p:ext uri="{BB962C8B-B14F-4D97-AF65-F5344CB8AC3E}">
@@ -22447,6 +22661,13 @@
           <a:p>
             <a:pPr algn="l" rtl="0"/>
             <a:r>
+              <a:rPr lang="en-US"/>
+              <a:t>Board of 10x10</a:t>
+            </a:r>
+          </a:p>
+          <a:p>
+            <a:pPr algn="l" rtl="0"/>
+            <a:r>
               <a:rPr lang="en-US" dirty="0"/>
               <a:t>Goal: Maximize Total Reward (Minimum zombies survival)</a:t>
             </a:r>
@@ -24504,9 +24725,16 @@
             <p:ph idx="1"/>
           </p:nvPr>
         </p:nvSpPr>
-        <p:spPr/>
+        <p:spPr>
+          <a:xfrm>
+            <a:off x="1141412" y="2249486"/>
+            <a:ext cx="10450513" cy="4265613"/>
+          </a:xfrm>
+        </p:spPr>
         <p:txBody>
-          <a:bodyPr/>
+          <a:bodyPr>
+            <a:normAutofit/>
+          </a:bodyPr>
           <a:lstStyle/>
           <a:p>
             <a:pPr algn="l" rtl="0"/>
@@ -24555,7 +24783,21 @@
             <a:pPr algn="l" rtl="0"/>
             <a:r>
               <a:rPr lang="en-US" dirty="0"/>
+              <a:t>Ask Yehudit:</a:t>
+            </a:r>
+          </a:p>
+          <a:p>
+            <a:pPr lvl="1" algn="l" rtl="0"/>
+            <a:r>
+              <a:rPr lang="en-US" dirty="0"/>
               <a:t>Add a slide to scenarios and elaborate on the tuning params?</a:t>
+            </a:r>
+          </a:p>
+          <a:p>
+            <a:pPr lvl="1" algn="l" rtl="0"/>
+            <a:r>
+              <a:rPr lang="en-US" dirty="0"/>
+              <a:t>Add action distribution graphs of best agents?</a:t>
             </a:r>
             <a:endParaRPr lang="he-IL" dirty="0"/>
           </a:p>

</xml_diff>

<commit_message>
further work on post process results
</commit_message>
<xml_diff>
--- a/docs/Semi Final Results.pptx
+++ b/docs/Semi Final Results.pptx
@@ -5,10 +5,10 @@
     <p:sldMasterId id="2147484016" r:id="rId1"/>
   </p:sldMasterIdLst>
   <p:notesMasterIdLst>
-    <p:notesMasterId r:id="rId36"/>
+    <p:notesMasterId r:id="rId38"/>
   </p:notesMasterIdLst>
   <p:handoutMasterIdLst>
-    <p:handoutMasterId r:id="rId37"/>
+    <p:handoutMasterId r:id="rId39"/>
   </p:handoutMasterIdLst>
   <p:sldIdLst>
     <p:sldId id="256" r:id="rId2"/>
@@ -24,27 +24,29 @@
     <p:sldId id="288" r:id="rId12"/>
     <p:sldId id="261" r:id="rId13"/>
     <p:sldId id="290" r:id="rId14"/>
-    <p:sldId id="283" r:id="rId15"/>
-    <p:sldId id="262" r:id="rId16"/>
-    <p:sldId id="263" r:id="rId17"/>
-    <p:sldId id="272" r:id="rId18"/>
-    <p:sldId id="281" r:id="rId19"/>
-    <p:sldId id="278" r:id="rId20"/>
-    <p:sldId id="279" r:id="rId21"/>
-    <p:sldId id="280" r:id="rId22"/>
-    <p:sldId id="269" r:id="rId23"/>
-    <p:sldId id="292" r:id="rId24"/>
-    <p:sldId id="293" r:id="rId25"/>
+    <p:sldId id="263" r:id="rId15"/>
+    <p:sldId id="283" r:id="rId16"/>
+    <p:sldId id="262" r:id="rId17"/>
+    <p:sldId id="299" r:id="rId18"/>
+    <p:sldId id="272" r:id="rId19"/>
+    <p:sldId id="281" r:id="rId20"/>
+    <p:sldId id="278" r:id="rId21"/>
+    <p:sldId id="279" r:id="rId22"/>
+    <p:sldId id="280" r:id="rId23"/>
+    <p:sldId id="269" r:id="rId24"/>
+    <p:sldId id="292" r:id="rId25"/>
     <p:sldId id="271" r:id="rId26"/>
-    <p:sldId id="296" r:id="rId27"/>
-    <p:sldId id="267" r:id="rId28"/>
-    <p:sldId id="276" r:id="rId29"/>
-    <p:sldId id="277" r:id="rId30"/>
-    <p:sldId id="274" r:id="rId31"/>
-    <p:sldId id="268" r:id="rId32"/>
-    <p:sldId id="282" r:id="rId33"/>
-    <p:sldId id="284" r:id="rId34"/>
-    <p:sldId id="295" r:id="rId35"/>
+    <p:sldId id="298" r:id="rId27"/>
+    <p:sldId id="296" r:id="rId28"/>
+    <p:sldId id="267" r:id="rId29"/>
+    <p:sldId id="276" r:id="rId30"/>
+    <p:sldId id="277" r:id="rId31"/>
+    <p:sldId id="274" r:id="rId32"/>
+    <p:sldId id="268" r:id="rId33"/>
+    <p:sldId id="282" r:id="rId34"/>
+    <p:sldId id="284" r:id="rId35"/>
+    <p:sldId id="297" r:id="rId36"/>
+    <p:sldId id="295" r:id="rId37"/>
   </p:sldIdLst>
   <p:sldSz cx="12192000" cy="6858000"/>
   <p:notesSz cx="6858000" cy="9144000"/>
@@ -3612,6 +3614,93 @@
           <a:lstStyle/>
           <a:p>
             <a:r>
+              <a:rPr lang="he-IL" dirty="0"/>
+              <a:t>נשים לב שבמקרה שבו האלגוריתם משחק את הזומבי, התגמול חיובי</a:t>
+            </a:r>
+          </a:p>
+        </p:txBody>
+      </p:sp>
+      <p:sp>
+        <p:nvSpPr>
+          <p:cNvPr id="4" name="Slide Number Placeholder 3"/>
+          <p:cNvSpPr>
+            <a:spLocks noGrp="1"/>
+          </p:cNvSpPr>
+          <p:nvPr>
+            <p:ph type="sldNum" sz="quarter" idx="5"/>
+          </p:nvPr>
+        </p:nvSpPr>
+        <p:spPr/>
+        <p:txBody>
+          <a:bodyPr/>
+          <a:lstStyle/>
+          <a:p>
+            <a:fld id="{123C78F5-5A45-4F29-8BF1-BDB6DE7EB81D}" type="slidenum">
+              <a:rPr lang="he-IL" smtClean="0"/>
+              <a:t>26</a:t>
+            </a:fld>
+            <a:endParaRPr lang="he-IL"/>
+          </a:p>
+        </p:txBody>
+      </p:sp>
+    </p:spTree>
+    <p:extLst>
+      <p:ext uri="{BB962C8B-B14F-4D97-AF65-F5344CB8AC3E}">
+        <p14:creationId xmlns:p14="http://schemas.microsoft.com/office/powerpoint/2010/main" val="3093472343"/>
+      </p:ext>
+    </p:extLst>
+  </p:cSld>
+  <p:clrMapOvr>
+    <a:masterClrMapping/>
+  </p:clrMapOvr>
+</p:notes>
+</file>
+
+<file path=ppt/notesSlides/notesSlide2.xml><?xml version="1.0" encoding="utf-8"?>
+<p:notes xmlns:a="http://schemas.openxmlformats.org/drawingml/2006/main" xmlns:r="http://schemas.openxmlformats.org/officeDocument/2006/relationships" xmlns:p="http://schemas.openxmlformats.org/presentationml/2006/main">
+  <p:cSld>
+    <p:spTree>
+      <p:nvGrpSpPr>
+        <p:cNvPr id="1" name=""/>
+        <p:cNvGrpSpPr/>
+        <p:nvPr/>
+      </p:nvGrpSpPr>
+      <p:grpSpPr>
+        <a:xfrm>
+          <a:off x="0" y="0"/>
+          <a:ext cx="0" cy="0"/>
+          <a:chOff x="0" y="0"/>
+          <a:chExt cx="0" cy="0"/>
+        </a:xfrm>
+      </p:grpSpPr>
+      <p:sp>
+        <p:nvSpPr>
+          <p:cNvPr id="2" name="Slide Image Placeholder 1"/>
+          <p:cNvSpPr>
+            <a:spLocks noGrp="1" noRot="1" noChangeAspect="1"/>
+          </p:cNvSpPr>
+          <p:nvPr>
+            <p:ph type="sldImg"/>
+          </p:nvPr>
+        </p:nvSpPr>
+        <p:spPr/>
+      </p:sp>
+      <p:sp>
+        <p:nvSpPr>
+          <p:cNvPr id="3" name="Notes Placeholder 2"/>
+          <p:cNvSpPr>
+            <a:spLocks noGrp="1"/>
+          </p:cNvSpPr>
+          <p:nvPr>
+            <p:ph type="body" idx="1"/>
+          </p:nvPr>
+        </p:nvSpPr>
+        <p:spPr/>
+        <p:txBody>
+          <a:bodyPr/>
+          <a:lstStyle/>
+          <a:p>
+            <a:r>
               <a:rPr lang="en-US" dirty="0"/>
               <a:t>We keep showing the rewards of the zombie player – the goal of the light is to minimize it.</a:t>
             </a:r>
@@ -3636,7 +3725,7 @@
           <a:p>
             <a:fld id="{123C78F5-5A45-4F29-8BF1-BDB6DE7EB81D}" type="slidenum">
               <a:rPr lang="he-IL" smtClean="0"/>
-              <a:t>28</a:t>
+              <a:t>29</a:t>
             </a:fld>
             <a:endParaRPr lang="he-IL"/>
           </a:p>
@@ -3646,6 +3735,110 @@
     <p:extLst>
       <p:ext uri="{BB962C8B-B14F-4D97-AF65-F5344CB8AC3E}">
         <p14:creationId xmlns:p14="http://schemas.microsoft.com/office/powerpoint/2010/main" val="3715902976"/>
+      </p:ext>
+    </p:extLst>
+  </p:cSld>
+  <p:clrMapOvr>
+    <a:masterClrMapping/>
+  </p:clrMapOvr>
+</p:notes>
+</file>
+
+<file path=ppt/notesSlides/notesSlide3.xml><?xml version="1.0" encoding="utf-8"?>
+<p:notes xmlns:a="http://schemas.openxmlformats.org/drawingml/2006/main" xmlns:r="http://schemas.openxmlformats.org/officeDocument/2006/relationships" xmlns:p="http://schemas.openxmlformats.org/presentationml/2006/main">
+  <p:cSld>
+    <p:spTree>
+      <p:nvGrpSpPr>
+        <p:cNvPr id="1" name=""/>
+        <p:cNvGrpSpPr/>
+        <p:nvPr/>
+      </p:nvGrpSpPr>
+      <p:grpSpPr>
+        <a:xfrm>
+          <a:off x="0" y="0"/>
+          <a:ext cx="0" cy="0"/>
+          <a:chOff x="0" y="0"/>
+          <a:chExt cx="0" cy="0"/>
+        </a:xfrm>
+      </p:grpSpPr>
+      <p:sp>
+        <p:nvSpPr>
+          <p:cNvPr id="2" name="Slide Image Placeholder 1"/>
+          <p:cNvSpPr>
+            <a:spLocks noGrp="1" noRot="1" noChangeAspect="1"/>
+          </p:cNvSpPr>
+          <p:nvPr>
+            <p:ph type="sldImg"/>
+          </p:nvPr>
+        </p:nvSpPr>
+        <p:spPr/>
+      </p:sp>
+      <p:sp>
+        <p:nvSpPr>
+          <p:cNvPr id="3" name="Notes Placeholder 2"/>
+          <p:cNvSpPr>
+            <a:spLocks noGrp="1"/>
+          </p:cNvSpPr>
+          <p:nvPr>
+            <p:ph type="body" idx="1"/>
+          </p:nvPr>
+        </p:nvSpPr>
+        <p:spPr/>
+        <p:txBody>
+          <a:bodyPr/>
+          <a:lstStyle/>
+          <a:p>
+            <a:pPr marL="0" marR="0" lvl="0" indent="0" algn="l" defTabSz="914400" rtl="0" eaLnBrk="1" fontAlgn="auto" latinLnBrk="0" hangingPunct="1">
+              <a:lnSpc>
+                <a:spcPct val="100000"/>
+              </a:lnSpc>
+              <a:spcBef>
+                <a:spcPts val="0"/>
+              </a:spcBef>
+              <a:spcAft>
+                <a:spcPts val="0"/>
+              </a:spcAft>
+              <a:buClrTx/>
+              <a:buSzTx/>
+              <a:buFontTx/>
+              <a:buNone/>
+              <a:tabLst/>
+              <a:defRPr/>
+            </a:pPr>
+            <a:r>
+              <a:rPr lang="he-IL" dirty="0"/>
+              <a:t>נשים לב שבמקרה שבו האלגוריתם משחק את האור, התגמול חיובי</a:t>
+            </a:r>
+          </a:p>
+        </p:txBody>
+      </p:sp>
+      <p:sp>
+        <p:nvSpPr>
+          <p:cNvPr id="4" name="Slide Number Placeholder 3"/>
+          <p:cNvSpPr>
+            <a:spLocks noGrp="1"/>
+          </p:cNvSpPr>
+          <p:nvPr>
+            <p:ph type="sldNum" sz="quarter" idx="5"/>
+          </p:nvPr>
+        </p:nvSpPr>
+        <p:spPr/>
+        <p:txBody>
+          <a:bodyPr/>
+          <a:lstStyle/>
+          <a:p>
+            <a:fld id="{123C78F5-5A45-4F29-8BF1-BDB6DE7EB81D}" type="slidenum">
+              <a:rPr lang="he-IL" smtClean="0"/>
+              <a:t>34</a:t>
+            </a:fld>
+            <a:endParaRPr lang="he-IL"/>
+          </a:p>
+        </p:txBody>
+      </p:sp>
+    </p:spTree>
+    <p:extLst>
+      <p:ext uri="{BB962C8B-B14F-4D97-AF65-F5344CB8AC3E}">
+        <p14:creationId xmlns:p14="http://schemas.microsoft.com/office/powerpoint/2010/main" val="146709713"/>
       </p:ext>
     </p:extLst>
   </p:cSld>
@@ -16039,7 +16232,13 @@
           <a:p>
             <a:r>
               <a:rPr lang="en-US" dirty="0"/>
-              <a:t>Zero-sum stochastic game</a:t>
+              <a:t>Zero-sum stochastic game – Light vs. zombies</a:t>
+            </a:r>
+          </a:p>
+          <a:p>
+            <a:r>
+              <a:rPr lang="en-US" dirty="0"/>
+              <a:t>Eliav shalelashvili</a:t>
             </a:r>
             <a:endParaRPr lang="he-IL" dirty="0"/>
           </a:p>
@@ -16565,6 +16764,11 @@
           <a:bodyPr/>
           <a:lstStyle/>
           <a:p>
+            <a:pPr algn="l" rtl="0"/>
+            <a:r>
+              <a:rPr lang="en-US" dirty="0"/>
+              <a:t>TODO</a:t>
+            </a:r>
             <a:endParaRPr lang="he-IL" dirty="0"/>
           </a:p>
         </p:txBody>
@@ -16951,6 +17155,10 @@
           <a:lstStyle/>
           <a:p>
             <a:pPr algn="l" rtl="0"/>
+            <a:r>
+              <a:rPr lang="en-US" dirty="0"/>
+              <a:t>TODO</a:t>
+            </a:r>
             <a:endParaRPr lang="he-IL" dirty="0"/>
           </a:p>
         </p:txBody>
@@ -16969,6 +17177,130 @@
 </file>
 
 <file path=ppt/slides/slide14.xml><?xml version="1.0" encoding="utf-8"?>
+<p:sld xmlns:a="http://schemas.openxmlformats.org/drawingml/2006/main" xmlns:r="http://schemas.openxmlformats.org/officeDocument/2006/relationships" xmlns:p="http://schemas.openxmlformats.org/presentationml/2006/main">
+  <p:cSld>
+    <p:bg>
+      <p:bgPr>
+        <a:solidFill>
+          <a:srgbClr val="002060"/>
+        </a:solidFill>
+        <a:effectLst/>
+      </p:bgPr>
+    </p:bg>
+    <p:spTree>
+      <p:nvGrpSpPr>
+        <p:cNvPr id="1" name=""/>
+        <p:cNvGrpSpPr/>
+        <p:nvPr/>
+      </p:nvGrpSpPr>
+      <p:grpSpPr>
+        <a:xfrm>
+          <a:off x="0" y="0"/>
+          <a:ext cx="0" cy="0"/>
+          <a:chOff x="0" y="0"/>
+          <a:chExt cx="0" cy="0"/>
+        </a:xfrm>
+      </p:grpSpPr>
+      <p:sp>
+        <p:nvSpPr>
+          <p:cNvPr id="2" name="Title 1">
+            <a:extLst>
+              <a:ext uri="{FF2B5EF4-FFF2-40B4-BE49-F238E27FC236}">
+                <a16:creationId xmlns:a16="http://schemas.microsoft.com/office/drawing/2014/main" id="{4A205DD9-A050-4AA9-958D-89346327686B}"/>
+              </a:ext>
+            </a:extLst>
+          </p:cNvPr>
+          <p:cNvSpPr>
+            <a:spLocks noGrp="1"/>
+          </p:cNvSpPr>
+          <p:nvPr>
+            <p:ph type="title"/>
+          </p:nvPr>
+        </p:nvSpPr>
+        <p:spPr/>
+        <p:txBody>
+          <a:bodyPr/>
+          <a:lstStyle/>
+          <a:p>
+            <a:r>
+              <a:rPr lang="en-US" dirty="0"/>
+              <a:t>Double deep q-learning evaluation</a:t>
+            </a:r>
+            <a:endParaRPr lang="he-IL" dirty="0"/>
+          </a:p>
+        </p:txBody>
+      </p:sp>
+      <p:sp>
+        <p:nvSpPr>
+          <p:cNvPr id="3" name="Content Placeholder 2">
+            <a:extLst>
+              <a:ext uri="{FF2B5EF4-FFF2-40B4-BE49-F238E27FC236}">
+                <a16:creationId xmlns:a16="http://schemas.microsoft.com/office/drawing/2014/main" id="{82AB2385-8183-4A5C-803F-416B01EF97AD}"/>
+              </a:ext>
+            </a:extLst>
+          </p:cNvPr>
+          <p:cNvSpPr>
+            <a:spLocks noGrp="1"/>
+          </p:cNvSpPr>
+          <p:nvPr>
+            <p:ph idx="1"/>
+          </p:nvPr>
+        </p:nvSpPr>
+        <p:spPr>
+          <a:xfrm>
+            <a:off x="1003389" y="2240860"/>
+            <a:ext cx="10702656" cy="3541714"/>
+          </a:xfrm>
+        </p:spPr>
+        <p:txBody>
+          <a:bodyPr>
+            <a:normAutofit/>
+          </a:bodyPr>
+          <a:lstStyle/>
+          <a:p>
+            <a:pPr algn="l" rtl="0"/>
+            <a:r>
+              <a:rPr lang="en-US" dirty="0"/>
+              <a:t>To estimate the success of a learning DDQN agent, we will use average test score.</a:t>
+            </a:r>
+          </a:p>
+          <a:p>
+            <a:pPr lvl="1" algn="l" rtl="0"/>
+            <a:r>
+              <a:rPr lang="en-US" dirty="0"/>
+              <a:t>Since we are using epsilon greedy strategy, the known ‘Time to Convergence’ indicator is redundant</a:t>
+            </a:r>
+          </a:p>
+          <a:p>
+            <a:pPr algn="l" rtl="0"/>
+            <a:r>
+              <a:rPr lang="en-US" dirty="0"/>
+              <a:t>Later on, we are going to choose the best sets of parameters and look at the action distributions of the players in the chosen games</a:t>
+            </a:r>
+          </a:p>
+          <a:p>
+            <a:pPr algn="l" rtl="0"/>
+            <a:r>
+              <a:rPr lang="en-US" dirty="0"/>
+              <a:t>At last, we are going to compare the results of the best agent over the different competitors</a:t>
+            </a:r>
+          </a:p>
+        </p:txBody>
+      </p:sp>
+    </p:spTree>
+    <p:extLst>
+      <p:ext uri="{BB962C8B-B14F-4D97-AF65-F5344CB8AC3E}">
+        <p14:creationId xmlns:p14="http://schemas.microsoft.com/office/powerpoint/2010/main" val="2454744745"/>
+      </p:ext>
+    </p:extLst>
+  </p:cSld>
+  <p:clrMapOvr>
+    <a:overrideClrMapping bg1="dk1" tx1="lt1" bg2="dk2" tx2="lt2" accent1="accent1" accent2="accent2" accent3="accent3" accent4="accent4" accent5="accent5" accent6="accent6" hlink="hlink" folHlink="folHlink"/>
+  </p:clrMapOvr>
+</p:sld>
+</file>
+
+<file path=ppt/slides/slide15.xml><?xml version="1.0" encoding="utf-8"?>
 <p:sld xmlns:a="http://schemas.openxmlformats.org/drawingml/2006/main" xmlns:r="http://schemas.openxmlformats.org/officeDocument/2006/relationships" xmlns:p="http://schemas.openxmlformats.org/presentationml/2006/main">
   <p:cSld>
     <p:bg>
@@ -17168,7 +17500,7 @@
 </p:sld>
 </file>
 
-<file path=ppt/slides/slide15.xml><?xml version="1.0" encoding="utf-8"?>
+<file path=ppt/slides/slide16.xml><?xml version="1.0" encoding="utf-8"?>
 <p:sld xmlns:a="http://schemas.openxmlformats.org/drawingml/2006/main" xmlns:r="http://schemas.openxmlformats.org/officeDocument/2006/relationships" xmlns:p="http://schemas.openxmlformats.org/presentationml/2006/main">
   <p:cSld>
     <p:bg>
@@ -18563,7 +18895,7 @@
 </p:sld>
 </file>
 
-<file path=ppt/slides/slide16.xml><?xml version="1.0" encoding="utf-8"?>
+<file path=ppt/slides/slide17.xml><?xml version="1.0" encoding="utf-8"?>
 <p:sld xmlns:a="http://schemas.openxmlformats.org/drawingml/2006/main" xmlns:r="http://schemas.openxmlformats.org/officeDocument/2006/relationships" xmlns:p="http://schemas.openxmlformats.org/presentationml/2006/main">
   <p:cSld>
     <p:bg>
@@ -18593,7 +18925,7 @@
           <p:cNvPr id="2" name="Title 1">
             <a:extLst>
               <a:ext uri="{FF2B5EF4-FFF2-40B4-BE49-F238E27FC236}">
-                <a16:creationId xmlns:a16="http://schemas.microsoft.com/office/drawing/2014/main" id="{4A205DD9-A050-4AA9-958D-89346327686B}"/>
+                <a16:creationId xmlns:a16="http://schemas.microsoft.com/office/drawing/2014/main" id="{F4687C04-419C-4270-B90B-3191E5274DE8}"/>
               </a:ext>
             </a:extLst>
           </p:cNvPr>
@@ -18604,14 +18936,19 @@
             <p:ph type="title"/>
           </p:nvPr>
         </p:nvSpPr>
-        <p:spPr/>
+        <p:spPr>
+          <a:xfrm>
+            <a:off x="1068261" y="435638"/>
+            <a:ext cx="9905998" cy="1478570"/>
+          </a:xfrm>
+        </p:spPr>
         <p:txBody>
           <a:bodyPr/>
           <a:lstStyle/>
           <a:p>
             <a:r>
               <a:rPr lang="en-US" dirty="0"/>
-              <a:t>Double deep q-learning evaluation</a:t>
+              <a:t>Example of a single evaluation</a:t>
             </a:r>
             <a:endParaRPr lang="he-IL" dirty="0"/>
           </a:p>
@@ -18622,7 +18959,7 @@
           <p:cNvPr id="3" name="Content Placeholder 2">
             <a:extLst>
               <a:ext uri="{FF2B5EF4-FFF2-40B4-BE49-F238E27FC236}">
-                <a16:creationId xmlns:a16="http://schemas.microsoft.com/office/drawing/2014/main" id="{82AB2385-8183-4A5C-803F-416B01EF97AD}"/>
+                <a16:creationId xmlns:a16="http://schemas.microsoft.com/office/drawing/2014/main" id="{A8DADC15-1AAB-484C-95EA-2537E9C7B959}"/>
               </a:ext>
             </a:extLst>
           </p:cNvPr>
@@ -18635,49 +18972,98 @@
         </p:nvSpPr>
         <p:spPr>
           <a:xfrm>
-            <a:off x="1003389" y="2240860"/>
-            <a:ext cx="10702656" cy="3541714"/>
+            <a:off x="1068260" y="1914208"/>
+            <a:ext cx="9905999" cy="3541714"/>
           </a:xfrm>
         </p:spPr>
         <p:txBody>
-          <a:bodyPr>
-            <a:normAutofit/>
-          </a:bodyPr>
+          <a:bodyPr/>
           <a:lstStyle/>
           <a:p>
             <a:pPr algn="l" rtl="0"/>
             <a:r>
               <a:rPr lang="en-US" dirty="0"/>
-              <a:t>To estimate the success of a learning DDQN agent, we will use average test score.</a:t>
-            </a:r>
-          </a:p>
-          <a:p>
-            <a:pPr lvl="1" algn="l" rtl="0"/>
-            <a:r>
-              <a:rPr lang="en-US" dirty="0"/>
-              <a:t>Since we are using epsilon greedy strategy, the known ‘Time to Convergence’ indicator is redundant</a:t>
-            </a:r>
-          </a:p>
-          <a:p>
-            <a:pPr algn="l" rtl="0"/>
-            <a:r>
-              <a:rPr lang="en-US" dirty="0"/>
-              <a:t>Later on, we are going to choose the best sets of parameters and look at the action distributions of the players in the chosen games</a:t>
-            </a:r>
-          </a:p>
-          <a:p>
-            <a:pPr algn="l" rtl="0"/>
-            <a:r>
-              <a:rPr lang="en-US" dirty="0"/>
-              <a:t>At last, we are going to compare the results of the best agent over the different competitors</a:t>
+              <a:t>For each scenario (for example, DDQN as Zombie and Single Action Agent as Light), we produces two types of results - Rewards and Action Distribution:</a:t>
             </a:r>
           </a:p>
         </p:txBody>
       </p:sp>
+      <p:pic>
+        <p:nvPicPr>
+          <p:cNvPr id="5" name="Picture 4">
+            <a:extLst>
+              <a:ext uri="{FF2B5EF4-FFF2-40B4-BE49-F238E27FC236}">
+                <a16:creationId xmlns:a16="http://schemas.microsoft.com/office/drawing/2014/main" id="{4B65C526-04A8-475C-A212-021C2AB07082}"/>
+              </a:ext>
+            </a:extLst>
+          </p:cNvPr>
+          <p:cNvPicPr>
+            <a:picLocks noChangeAspect="1"/>
+          </p:cNvPicPr>
+          <p:nvPr/>
+        </p:nvPicPr>
+        <p:blipFill>
+          <a:blip r:embed="rId3">
+            <a:extLst>
+              <a:ext uri="{28A0092B-C50C-407E-A947-70E740481C1C}">
+                <a14:useLocalDpi xmlns:a14="http://schemas.microsoft.com/office/drawing/2010/main" val="0"/>
+              </a:ext>
+            </a:extLst>
+          </a:blip>
+          <a:stretch>
+            <a:fillRect/>
+          </a:stretch>
+        </p:blipFill>
+        <p:spPr>
+          <a:xfrm>
+            <a:off x="548640" y="3102871"/>
+            <a:ext cx="4325112" cy="3401520"/>
+          </a:xfrm>
+          <a:prstGeom prst="rect">
+            <a:avLst/>
+          </a:prstGeom>
+        </p:spPr>
+      </p:pic>
+      <p:pic>
+        <p:nvPicPr>
+          <p:cNvPr id="7" name="Picture 6">
+            <a:extLst>
+              <a:ext uri="{FF2B5EF4-FFF2-40B4-BE49-F238E27FC236}">
+                <a16:creationId xmlns:a16="http://schemas.microsoft.com/office/drawing/2014/main" id="{A4D4FE84-05CF-43BB-A4C2-875CB1B9512A}"/>
+              </a:ext>
+            </a:extLst>
+          </p:cNvPr>
+          <p:cNvPicPr>
+            <a:picLocks noChangeAspect="1"/>
+          </p:cNvPicPr>
+          <p:nvPr/>
+        </p:nvPicPr>
+        <p:blipFill>
+          <a:blip r:embed="rId4">
+            <a:extLst>
+              <a:ext uri="{28A0092B-C50C-407E-A947-70E740481C1C}">
+                <a14:useLocalDpi xmlns:a14="http://schemas.microsoft.com/office/drawing/2010/main" val="0"/>
+              </a:ext>
+            </a:extLst>
+          </a:blip>
+          <a:stretch>
+            <a:fillRect/>
+          </a:stretch>
+        </p:blipFill>
+        <p:spPr>
+          <a:xfrm>
+            <a:off x="5393372" y="3032774"/>
+            <a:ext cx="6323642" cy="3541714"/>
+          </a:xfrm>
+          <a:prstGeom prst="rect">
+            <a:avLst/>
+          </a:prstGeom>
+        </p:spPr>
+      </p:pic>
     </p:spTree>
     <p:extLst>
       <p:ext uri="{BB962C8B-B14F-4D97-AF65-F5344CB8AC3E}">
-        <p14:creationId xmlns:p14="http://schemas.microsoft.com/office/powerpoint/2010/main" val="2454744745"/>
+        <p14:creationId xmlns:p14="http://schemas.microsoft.com/office/powerpoint/2010/main" val="268856505"/>
       </p:ext>
     </p:extLst>
   </p:cSld>
@@ -18687,7 +19073,7 @@
 </p:sld>
 </file>
 
-<file path=ppt/slides/slide17.xml><?xml version="1.0" encoding="utf-8"?>
+<file path=ppt/slides/slide18.xml><?xml version="1.0" encoding="utf-8"?>
 <p:sld xmlns:a="http://schemas.openxmlformats.org/drawingml/2006/main" xmlns:r="http://schemas.openxmlformats.org/officeDocument/2006/relationships" xmlns:p="http://schemas.openxmlformats.org/presentationml/2006/main">
   <p:cSld>
     <p:bg>
@@ -18734,7 +19120,7 @@
         </p:blipFill>
         <p:spPr>
           <a:xfrm>
-            <a:off x="2814463" y="1616770"/>
+            <a:off x="4364674" y="4238652"/>
             <a:ext cx="2913214" cy="2291121"/>
           </a:xfrm>
           <a:prstGeom prst="rect">
@@ -18764,7 +19150,7 @@
         </p:blipFill>
         <p:spPr>
           <a:xfrm>
-            <a:off x="2814463" y="4146629"/>
+            <a:off x="702199" y="4215780"/>
             <a:ext cx="2913213" cy="2291121"/>
           </a:xfrm>
           <a:prstGeom prst="rect">
@@ -18820,7 +19206,7 @@
         </p:nvSpPr>
         <p:spPr>
           <a:xfrm>
-            <a:off x="4894076" y="1616770"/>
+            <a:off x="6444287" y="4238652"/>
             <a:ext cx="749262" cy="492174"/>
           </a:xfrm>
           <a:prstGeom prst="ellipse">
@@ -18879,8 +19265,8 @@
         </p:nvCxnSpPr>
         <p:spPr>
           <a:xfrm>
-            <a:off x="5643338" y="1862857"/>
-            <a:ext cx="1752934" cy="1128546"/>
+            <a:off x="7193549" y="4484739"/>
+            <a:ext cx="1210305" cy="1068996"/>
           </a:xfrm>
           <a:prstGeom prst="straightConnector1">
             <a:avLst/>
@@ -18924,7 +19310,7 @@
         </p:nvSpPr>
         <p:spPr>
           <a:xfrm>
-            <a:off x="8993620" y="3017733"/>
+            <a:off x="9981172" y="5580065"/>
             <a:ext cx="1264195" cy="461665"/>
           </a:xfrm>
           <a:prstGeom prst="rect">
@@ -18963,7 +19349,7 @@
         </p:nvSpPr>
         <p:spPr>
           <a:xfrm>
-            <a:off x="4926745" y="4169501"/>
+            <a:off x="2814481" y="4238652"/>
             <a:ext cx="749262" cy="492174"/>
           </a:xfrm>
           <a:prstGeom prst="ellipse">
@@ -19016,14 +19402,14 @@
           <p:cNvCxnSpPr>
             <a:cxnSpLocks/>
             <a:stCxn id="24" idx="6"/>
-            <a:endCxn id="35" idx="2"/>
+            <a:endCxn id="35" idx="1"/>
           </p:cNvCxnSpPr>
           <p:nvPr/>
         </p:nvCxnSpPr>
         <p:spPr>
-          <a:xfrm flipV="1">
-            <a:off x="5676007" y="3514623"/>
-            <a:ext cx="1720265" cy="900965"/>
+          <a:xfrm>
+            <a:off x="3563743" y="4484739"/>
+            <a:ext cx="4044065" cy="1330606"/>
           </a:xfrm>
           <a:prstGeom prst="straightConnector1">
             <a:avLst/>
@@ -19067,7 +19453,7 @@
         </p:nvSpPr>
         <p:spPr>
           <a:xfrm>
-            <a:off x="8950491" y="2991403"/>
+            <a:off x="9938043" y="5553735"/>
             <a:ext cx="1040934" cy="547378"/>
           </a:xfrm>
           <a:prstGeom prst="ellipse">
@@ -19122,8 +19508,8 @@
         </p:nvSpPr>
         <p:spPr>
           <a:xfrm>
-            <a:off x="6580196" y="2991403"/>
-            <a:ext cx="1632151" cy="523220"/>
+            <a:off x="7607808" y="5553735"/>
+            <a:ext cx="1592091" cy="523220"/>
           </a:xfrm>
           <a:prstGeom prst="rect">
             <a:avLst/>
@@ -19146,8 +19532,8 @@
           <a:p>
             <a:pPr algn="ctr"/>
             <a:r>
-              <a:rPr lang="en-US" sz="2800" dirty="0"/>
-              <a:t>Sum, Avg</a:t>
+              <a:rPr lang="en-US" sz="2800"/>
+              <a:t>Average</a:t>
             </a:r>
             <a:endParaRPr lang="he-IL" sz="2800" dirty="0"/>
           </a:p>
@@ -19169,7 +19555,7 @@
             </p:nvSpPr>
             <p:spPr>
               <a:xfrm>
-                <a:off x="7968290" y="2991403"/>
+                <a:off x="8955842" y="5553735"/>
                 <a:ext cx="1241862" cy="523220"/>
               </a:xfrm>
               <a:prstGeom prst="rect">
@@ -19229,7 +19615,7 @@
             </p:nvSpPr>
             <p:spPr>
               <a:xfrm>
-                <a:off x="7968290" y="2991403"/>
+                <a:off x="8955842" y="5553735"/>
                 <a:ext cx="1241862" cy="523220"/>
               </a:xfrm>
               <a:prstGeom prst="rect">
@@ -19260,6 +19646,286 @@
           </p:sp>
         </mc:Fallback>
       </mc:AlternateContent>
+      <p:grpSp>
+        <p:nvGrpSpPr>
+          <p:cNvPr id="64" name="Group 63">
+            <a:extLst>
+              <a:ext uri="{FF2B5EF4-FFF2-40B4-BE49-F238E27FC236}">
+                <a16:creationId xmlns:a16="http://schemas.microsoft.com/office/drawing/2014/main" id="{7A369BB1-9434-40A2-AC22-45AE2D56A71A}"/>
+              </a:ext>
+            </a:extLst>
+          </p:cNvPr>
+          <p:cNvGrpSpPr/>
+          <p:nvPr/>
+        </p:nvGrpSpPr>
+        <p:grpSpPr>
+          <a:xfrm>
+            <a:off x="8063639" y="1855999"/>
+            <a:ext cx="3835066" cy="2444767"/>
+            <a:chOff x="8145534" y="546636"/>
+            <a:chExt cx="3835066" cy="2444767"/>
+          </a:xfrm>
+        </p:grpSpPr>
+        <p:pic>
+          <p:nvPicPr>
+            <p:cNvPr id="53" name="Picture 52">
+              <a:extLst>
+                <a:ext uri="{FF2B5EF4-FFF2-40B4-BE49-F238E27FC236}">
+                  <a16:creationId xmlns:a16="http://schemas.microsoft.com/office/drawing/2014/main" id="{E9E442C8-22D0-4D2E-8CFD-1AF6A102CFA0}"/>
+                </a:ext>
+              </a:extLst>
+            </p:cNvPr>
+            <p:cNvPicPr>
+              <a:picLocks noChangeAspect="1"/>
+            </p:cNvPicPr>
+            <p:nvPr/>
+          </p:nvPicPr>
+          <p:blipFill rotWithShape="1">
+            <a:blip r:embed="rId6"/>
+            <a:srcRect l="29747" t="-6811" r="-7122" b="58439"/>
+            <a:stretch/>
+          </p:blipFill>
+          <p:spPr>
+            <a:xfrm>
+              <a:off x="8145534" y="546636"/>
+              <a:ext cx="3835066" cy="2444767"/>
+            </a:xfrm>
+            <a:prstGeom prst="ellipse">
+              <a:avLst/>
+            </a:prstGeom>
+            <a:ln w="63500" cap="rnd">
+              <a:solidFill>
+                <a:srgbClr val="333333"/>
+              </a:solidFill>
+            </a:ln>
+            <a:effectLst>
+              <a:outerShdw blurRad="381000" dist="292100" dir="5400000" sx="-80000" sy="-18000" rotWithShape="0">
+                <a:srgbClr val="000000">
+                  <a:alpha val="22000"/>
+                </a:srgbClr>
+              </a:outerShdw>
+            </a:effectLst>
+            <a:scene3d>
+              <a:camera prst="orthographicFront"/>
+              <a:lightRig rig="contrasting" dir="t">
+                <a:rot lat="0" lon="0" rev="3000000"/>
+              </a:lightRig>
+            </a:scene3d>
+            <a:sp3d contourW="7620">
+              <a:bevelT w="95250" h="31750"/>
+              <a:contourClr>
+                <a:srgbClr val="333333"/>
+              </a:contourClr>
+            </a:sp3d>
+          </p:spPr>
+        </p:pic>
+        <p:cxnSp>
+          <p:nvCxnSpPr>
+            <p:cNvPr id="57" name="Straight Connector 56">
+              <a:extLst>
+                <a:ext uri="{FF2B5EF4-FFF2-40B4-BE49-F238E27FC236}">
+                  <a16:creationId xmlns:a16="http://schemas.microsoft.com/office/drawing/2014/main" id="{EC2FA476-0145-4932-8380-E2F023B391BE}"/>
+                </a:ext>
+              </a:extLst>
+            </p:cNvPr>
+            <p:cNvCxnSpPr/>
+            <p:nvPr/>
+          </p:nvCxnSpPr>
+          <p:spPr>
+            <a:xfrm>
+              <a:off x="8540496" y="1616770"/>
+              <a:ext cx="1225296" cy="0"/>
+            </a:xfrm>
+            <a:prstGeom prst="line">
+              <a:avLst/>
+            </a:prstGeom>
+            <a:ln w="38100">
+              <a:solidFill>
+                <a:srgbClr val="DF2121"/>
+              </a:solidFill>
+            </a:ln>
+          </p:spPr>
+          <p:style>
+            <a:lnRef idx="3">
+              <a:schemeClr val="accent3"/>
+            </a:lnRef>
+            <a:fillRef idx="0">
+              <a:schemeClr val="accent3"/>
+            </a:fillRef>
+            <a:effectRef idx="2">
+              <a:schemeClr val="accent3"/>
+            </a:effectRef>
+            <a:fontRef idx="minor">
+              <a:schemeClr val="tx1"/>
+            </a:fontRef>
+          </p:style>
+        </p:cxnSp>
+        <p:cxnSp>
+          <p:nvCxnSpPr>
+            <p:cNvPr id="58" name="Straight Connector 57">
+              <a:extLst>
+                <a:ext uri="{FF2B5EF4-FFF2-40B4-BE49-F238E27FC236}">
+                  <a16:creationId xmlns:a16="http://schemas.microsoft.com/office/drawing/2014/main" id="{29EDAF8A-79FA-45FD-94E7-ED45F5E26A65}"/>
+                </a:ext>
+              </a:extLst>
+            </p:cNvPr>
+            <p:cNvCxnSpPr/>
+            <p:nvPr/>
+          </p:nvCxnSpPr>
+          <p:spPr>
+            <a:xfrm>
+              <a:off x="10441048" y="2189794"/>
+              <a:ext cx="691648" cy="0"/>
+            </a:xfrm>
+            <a:prstGeom prst="line">
+              <a:avLst/>
+            </a:prstGeom>
+            <a:ln w="38100">
+              <a:solidFill>
+                <a:srgbClr val="DF2121"/>
+              </a:solidFill>
+            </a:ln>
+          </p:spPr>
+          <p:style>
+            <a:lnRef idx="3">
+              <a:schemeClr val="accent3"/>
+            </a:lnRef>
+            <a:fillRef idx="0">
+              <a:schemeClr val="accent3"/>
+            </a:fillRef>
+            <a:effectRef idx="2">
+              <a:schemeClr val="accent3"/>
+            </a:effectRef>
+            <a:fontRef idx="minor">
+              <a:schemeClr val="tx1"/>
+            </a:fontRef>
+          </p:style>
+        </p:cxnSp>
+      </p:grpSp>
+      <mc:AlternateContent xmlns:mc="http://schemas.openxmlformats.org/markup-compatibility/2006">
+        <mc:Choice xmlns:a14="http://schemas.microsoft.com/office/drawing/2010/main" Requires="a14">
+          <p:sp>
+            <p:nvSpPr>
+              <p:cNvPr id="65" name="Content Placeholder 2">
+                <a:extLst>
+                  <a:ext uri="{FF2B5EF4-FFF2-40B4-BE49-F238E27FC236}">
+                    <a16:creationId xmlns:a16="http://schemas.microsoft.com/office/drawing/2014/main" id="{94487073-E2D1-47C7-9459-8AC2ECCC29BB}"/>
+                  </a:ext>
+                </a:extLst>
+              </p:cNvPr>
+              <p:cNvSpPr>
+                <a:spLocks noGrp="1"/>
+              </p:cNvSpPr>
+              <p:nvPr>
+                <p:ph idx="1"/>
+              </p:nvPr>
+            </p:nvSpPr>
+            <p:spPr>
+              <a:xfrm>
+                <a:off x="1007720" y="1779557"/>
+                <a:ext cx="7450881" cy="2237909"/>
+              </a:xfrm>
+            </p:spPr>
+            <p:txBody>
+              <a:bodyPr>
+                <a:normAutofit/>
+              </a:bodyPr>
+              <a:lstStyle/>
+              <a:p>
+                <a:pPr algn="l" rtl="0"/>
+                <a:r>
+                  <a:rPr lang="en-US" dirty="0"/>
+                  <a:t>Considering the scenario of DDQN as Zombie and Single Action Agent as Light on top a board of </a:t>
+                </a:r>
+                <a14:m>
+                  <m:oMath xmlns:m="http://schemas.openxmlformats.org/officeDocument/2006/math">
+                    <m:r>
+                      <a:rPr lang="en-US" i="1" dirty="0" smtClean="0">
+                        <a:latin typeface="Cambria Math" panose="02040503050406030204" pitchFamily="18" charset="0"/>
+                      </a:rPr>
+                      <m:t>10</m:t>
+                    </m:r>
+                    <m:r>
+                      <a:rPr lang="en-US" i="1" dirty="0" smtClean="0">
+                        <a:latin typeface="Cambria Math" panose="02040503050406030204" pitchFamily="18" charset="0"/>
+                        <a:ea typeface="Cambria Math" panose="02040503050406030204" pitchFamily="18" charset="0"/>
+                      </a:rPr>
+                      <m:t>×</m:t>
+                    </m:r>
+                    <m:r>
+                      <a:rPr lang="en-US" i="1" dirty="0" smtClean="0">
+                        <a:latin typeface="Cambria Math" panose="02040503050406030204" pitchFamily="18" charset="0"/>
+                      </a:rPr>
+                      <m:t>10</m:t>
+                    </m:r>
+                  </m:oMath>
+                </a14:m>
+                <a:r>
+                  <a:rPr lang="en-US" dirty="0"/>
+                  <a:t>:</a:t>
+                </a:r>
+              </a:p>
+              <a:p>
+                <a:pPr lvl="1" algn="l" rtl="0"/>
+                <a:r>
+                  <a:rPr lang="en-US" dirty="0"/>
+                  <a:t>First, repeat the scenario several times</a:t>
+                </a:r>
+              </a:p>
+              <a:p>
+                <a:pPr lvl="1" algn="l" rtl="0"/>
+                <a:r>
+                  <a:rPr lang="en-US" dirty="0"/>
+                  <a:t>Second, get the average of test rewards</a:t>
+                </a:r>
+              </a:p>
+            </p:txBody>
+          </p:sp>
+        </mc:Choice>
+        <mc:Fallback>
+          <p:sp>
+            <p:nvSpPr>
+              <p:cNvPr id="65" name="Content Placeholder 2">
+                <a:extLst>
+                  <a:ext uri="{FF2B5EF4-FFF2-40B4-BE49-F238E27FC236}">
+                    <a16:creationId xmlns:a16="http://schemas.microsoft.com/office/drawing/2014/main" id="{94487073-E2D1-47C7-9459-8AC2ECCC29BB}"/>
+                  </a:ext>
+                </a:extLst>
+              </p:cNvPr>
+              <p:cNvSpPr>
+                <a:spLocks noGrp="1" noRot="1" noChangeAspect="1" noMove="1" noResize="1" noEditPoints="1" noAdjustHandles="1" noChangeArrowheads="1" noChangeShapeType="1" noTextEdit="1"/>
+              </p:cNvSpPr>
+              <p:nvPr>
+                <p:ph idx="1"/>
+              </p:nvPr>
+            </p:nvSpPr>
+            <p:spPr>
+              <a:xfrm>
+                <a:off x="1007720" y="1779557"/>
+                <a:ext cx="7450881" cy="2237909"/>
+              </a:xfrm>
+              <a:blipFill>
+                <a:blip r:embed="rId7"/>
+                <a:stretch>
+                  <a:fillRect l="-1635" t="-3815" r="-654"/>
+                </a:stretch>
+              </a:blipFill>
+            </p:spPr>
+            <p:txBody>
+              <a:bodyPr/>
+              <a:lstStyle/>
+              <a:p>
+                <a:r>
+                  <a:rPr lang="he-IL">
+                    <a:noFill/>
+                  </a:rPr>
+                  <a:t> </a:t>
+                </a:r>
+              </a:p>
+            </p:txBody>
+          </p:sp>
+        </mc:Fallback>
+      </mc:AlternateContent>
     </p:spTree>
     <p:extLst>
       <p:ext uri="{BB962C8B-B14F-4D97-AF65-F5344CB8AC3E}">
@@ -19273,7 +19939,7 @@
 </p:sld>
 </file>
 
-<file path=ppt/slides/slide18.xml><?xml version="1.0" encoding="utf-8"?>
+<file path=ppt/slides/slide19.xml><?xml version="1.0" encoding="utf-8"?>
 <p:sld xmlns:a="http://schemas.openxmlformats.org/drawingml/2006/main" xmlns:r="http://schemas.openxmlformats.org/officeDocument/2006/relationships" xmlns:p="http://schemas.openxmlformats.org/presentationml/2006/main">
   <p:cSld>
     <p:bg>
@@ -19370,7 +20036,139 @@
 </p:sld>
 </file>
 
-<file path=ppt/slides/slide19.xml><?xml version="1.0" encoding="utf-8"?>
+<file path=ppt/slides/slide2.xml><?xml version="1.0" encoding="utf-8"?>
+<p:sld xmlns:a="http://schemas.openxmlformats.org/drawingml/2006/main" xmlns:r="http://schemas.openxmlformats.org/officeDocument/2006/relationships" xmlns:p="http://schemas.openxmlformats.org/presentationml/2006/main">
+  <p:cSld>
+    <p:bg>
+      <p:bgPr>
+        <a:solidFill>
+          <a:srgbClr val="002060"/>
+        </a:solidFill>
+        <a:effectLst/>
+      </p:bgPr>
+    </p:bg>
+    <p:spTree>
+      <p:nvGrpSpPr>
+        <p:cNvPr id="1" name=""/>
+        <p:cNvGrpSpPr/>
+        <p:nvPr/>
+      </p:nvGrpSpPr>
+      <p:grpSpPr>
+        <a:xfrm>
+          <a:off x="0" y="0"/>
+          <a:ext cx="0" cy="0"/>
+          <a:chOff x="0" y="0"/>
+          <a:chExt cx="0" cy="0"/>
+        </a:xfrm>
+      </p:grpSpPr>
+      <p:sp>
+        <p:nvSpPr>
+          <p:cNvPr id="2" name="Title 1">
+            <a:extLst>
+              <a:ext uri="{FF2B5EF4-FFF2-40B4-BE49-F238E27FC236}">
+                <a16:creationId xmlns:a16="http://schemas.microsoft.com/office/drawing/2014/main" id="{1F46C161-6712-4FDA-9DA7-4CD9956C043B}"/>
+              </a:ext>
+            </a:extLst>
+          </p:cNvPr>
+          <p:cNvSpPr>
+            <a:spLocks noGrp="1"/>
+          </p:cNvSpPr>
+          <p:nvPr>
+            <p:ph type="title"/>
+          </p:nvPr>
+        </p:nvSpPr>
+        <p:spPr/>
+        <p:txBody>
+          <a:bodyPr/>
+          <a:lstStyle/>
+          <a:p>
+            <a:r>
+              <a:rPr lang="en-US" dirty="0"/>
+              <a:t>Table of contents</a:t>
+            </a:r>
+            <a:endParaRPr lang="he-IL" dirty="0"/>
+          </a:p>
+        </p:txBody>
+      </p:sp>
+      <p:sp>
+        <p:nvSpPr>
+          <p:cNvPr id="3" name="Content Placeholder 2">
+            <a:extLst>
+              <a:ext uri="{FF2B5EF4-FFF2-40B4-BE49-F238E27FC236}">
+                <a16:creationId xmlns:a16="http://schemas.microsoft.com/office/drawing/2014/main" id="{D61EC056-C98D-402A-A3B1-038262C952B9}"/>
+              </a:ext>
+            </a:extLst>
+          </p:cNvPr>
+          <p:cNvSpPr>
+            <a:spLocks noGrp="1"/>
+          </p:cNvSpPr>
+          <p:nvPr>
+            <p:ph idx="1"/>
+          </p:nvPr>
+        </p:nvSpPr>
+        <p:spPr/>
+        <p:txBody>
+          <a:bodyPr/>
+          <a:lstStyle/>
+          <a:p>
+            <a:pPr algn="l" rtl="0"/>
+            <a:r>
+              <a:rPr lang="en-US" dirty="0"/>
+              <a:t>What did we build?</a:t>
+            </a:r>
+          </a:p>
+          <a:p>
+            <a:pPr lvl="1" algn="l" rtl="0"/>
+            <a:r>
+              <a:rPr lang="en-US" dirty="0"/>
+              <a:t>Game Environment</a:t>
+            </a:r>
+          </a:p>
+          <a:p>
+            <a:pPr lvl="1" algn="l" rtl="0"/>
+            <a:r>
+              <a:rPr lang="en-US" dirty="0"/>
+              <a:t>Algorithms</a:t>
+            </a:r>
+          </a:p>
+          <a:p>
+            <a:pPr lvl="1" algn="l" rtl="0"/>
+            <a:r>
+              <a:rPr lang="en-US" dirty="0"/>
+              <a:t>Agents</a:t>
+            </a:r>
+          </a:p>
+          <a:p>
+            <a:pPr algn="l" rtl="0"/>
+            <a:r>
+              <a:rPr lang="en-US" dirty="0"/>
+              <a:t>Game Scenarios</a:t>
+            </a:r>
+          </a:p>
+          <a:p>
+            <a:pPr algn="l" rtl="0"/>
+            <a:r>
+              <a:rPr lang="en-US" dirty="0"/>
+              <a:t>Game Evaluation</a:t>
+            </a:r>
+            <a:endParaRPr lang="he-IL" dirty="0"/>
+          </a:p>
+        </p:txBody>
+      </p:sp>
+    </p:spTree>
+    <p:extLst>
+      <p:ext uri="{BB962C8B-B14F-4D97-AF65-F5344CB8AC3E}">
+        <p14:creationId xmlns:p14="http://schemas.microsoft.com/office/powerpoint/2010/main" val="1724918253"/>
+      </p:ext>
+    </p:extLst>
+  </p:cSld>
+  <p:clrMapOvr>
+    <a:overrideClrMapping bg1="dk1" tx1="lt1" bg2="dk2" tx2="lt2" accent1="accent1" accent2="accent2" accent3="accent3" accent4="accent4" accent5="accent5" accent6="accent6" hlink="hlink" folHlink="folHlink"/>
+  </p:clrMapOvr>
+</p:sld>
+</file>
+
+<file path=ppt/slides/slide20.xml><?xml version="1.0" encoding="utf-8"?>
 <p:sld xmlns:a="http://schemas.openxmlformats.org/drawingml/2006/main" xmlns:r="http://schemas.openxmlformats.org/officeDocument/2006/relationships" xmlns:p="http://schemas.openxmlformats.org/presentationml/2006/main">
   <p:cSld>
     <p:bg>
@@ -19429,41 +20227,6 @@
           </a:p>
         </p:txBody>
       </p:sp>
-      <p:pic>
-        <p:nvPicPr>
-          <p:cNvPr id="7" name="Picture 6">
-            <a:extLst>
-              <a:ext uri="{FF2B5EF4-FFF2-40B4-BE49-F238E27FC236}">
-                <a16:creationId xmlns:a16="http://schemas.microsoft.com/office/drawing/2014/main" id="{A4370602-E88D-4F9F-B0E1-C94FF3145B23}"/>
-              </a:ext>
-            </a:extLst>
-          </p:cNvPr>
-          <p:cNvPicPr>
-            <a:picLocks noChangeAspect="1"/>
-          </p:cNvPicPr>
-          <p:nvPr/>
-        </p:nvPicPr>
-        <p:blipFill rotWithShape="1">
-          <a:blip r:embed="rId3">
-            <a:extLst>
-              <a:ext uri="{28A0092B-C50C-407E-A947-70E740481C1C}">
-                <a14:useLocalDpi xmlns:a14="http://schemas.microsoft.com/office/drawing/2010/main" val="0"/>
-              </a:ext>
-            </a:extLst>
-          </a:blip>
-          <a:srcRect l="9584" t="6805" r="67125" b="62222"/>
-          <a:stretch/>
-        </p:blipFill>
-        <p:spPr>
-          <a:xfrm>
-            <a:off x="6189302" y="1851913"/>
-            <a:ext cx="4295378" cy="4284052"/>
-          </a:xfrm>
-          <a:prstGeom prst="rect">
-            <a:avLst/>
-          </a:prstGeom>
-        </p:spPr>
-      </p:pic>
       <p:sp>
         <p:nvSpPr>
           <p:cNvPr id="4" name="Text Placeholder 3">
@@ -19678,6 +20441,41 @@
           </a:p>
         </p:txBody>
       </p:sp>
+      <p:pic>
+        <p:nvPicPr>
+          <p:cNvPr id="5" name="Picture 4">
+            <a:extLst>
+              <a:ext uri="{FF2B5EF4-FFF2-40B4-BE49-F238E27FC236}">
+                <a16:creationId xmlns:a16="http://schemas.microsoft.com/office/drawing/2014/main" id="{63D92C50-252F-4AC5-BACB-FA8CAD65770B}"/>
+              </a:ext>
+            </a:extLst>
+          </p:cNvPr>
+          <p:cNvPicPr>
+            <a:picLocks noChangeAspect="1"/>
+          </p:cNvPicPr>
+          <p:nvPr/>
+        </p:nvPicPr>
+        <p:blipFill rotWithShape="1">
+          <a:blip r:embed="rId3">
+            <a:extLst>
+              <a:ext uri="{28A0092B-C50C-407E-A947-70E740481C1C}">
+                <a14:useLocalDpi xmlns:a14="http://schemas.microsoft.com/office/drawing/2010/main" val="0"/>
+              </a:ext>
+            </a:extLst>
+          </a:blip>
+          <a:srcRect l="10133" t="6933" r="67161" b="62133"/>
+          <a:stretch/>
+        </p:blipFill>
+        <p:spPr>
+          <a:xfrm>
+            <a:off x="6408826" y="2085963"/>
+            <a:ext cx="3808429" cy="3891399"/>
+          </a:xfrm>
+          <a:prstGeom prst="rect">
+            <a:avLst/>
+          </a:prstGeom>
+        </p:spPr>
+      </p:pic>
     </p:spTree>
     <p:extLst>
       <p:ext uri="{BB962C8B-B14F-4D97-AF65-F5344CB8AC3E}">
@@ -19691,139 +20489,7 @@
 </p:sld>
 </file>
 
-<file path=ppt/slides/slide2.xml><?xml version="1.0" encoding="utf-8"?>
-<p:sld xmlns:a="http://schemas.openxmlformats.org/drawingml/2006/main" xmlns:r="http://schemas.openxmlformats.org/officeDocument/2006/relationships" xmlns:p="http://schemas.openxmlformats.org/presentationml/2006/main">
-  <p:cSld>
-    <p:bg>
-      <p:bgPr>
-        <a:solidFill>
-          <a:srgbClr val="002060"/>
-        </a:solidFill>
-        <a:effectLst/>
-      </p:bgPr>
-    </p:bg>
-    <p:spTree>
-      <p:nvGrpSpPr>
-        <p:cNvPr id="1" name=""/>
-        <p:cNvGrpSpPr/>
-        <p:nvPr/>
-      </p:nvGrpSpPr>
-      <p:grpSpPr>
-        <a:xfrm>
-          <a:off x="0" y="0"/>
-          <a:ext cx="0" cy="0"/>
-          <a:chOff x="0" y="0"/>
-          <a:chExt cx="0" cy="0"/>
-        </a:xfrm>
-      </p:grpSpPr>
-      <p:sp>
-        <p:nvSpPr>
-          <p:cNvPr id="2" name="Title 1">
-            <a:extLst>
-              <a:ext uri="{FF2B5EF4-FFF2-40B4-BE49-F238E27FC236}">
-                <a16:creationId xmlns:a16="http://schemas.microsoft.com/office/drawing/2014/main" id="{1F46C161-6712-4FDA-9DA7-4CD9956C043B}"/>
-              </a:ext>
-            </a:extLst>
-          </p:cNvPr>
-          <p:cNvSpPr>
-            <a:spLocks noGrp="1"/>
-          </p:cNvSpPr>
-          <p:nvPr>
-            <p:ph type="title"/>
-          </p:nvPr>
-        </p:nvSpPr>
-        <p:spPr/>
-        <p:txBody>
-          <a:bodyPr/>
-          <a:lstStyle/>
-          <a:p>
-            <a:r>
-              <a:rPr lang="en-US" dirty="0"/>
-              <a:t>Table of contents</a:t>
-            </a:r>
-            <a:endParaRPr lang="he-IL" dirty="0"/>
-          </a:p>
-        </p:txBody>
-      </p:sp>
-      <p:sp>
-        <p:nvSpPr>
-          <p:cNvPr id="3" name="Content Placeholder 2">
-            <a:extLst>
-              <a:ext uri="{FF2B5EF4-FFF2-40B4-BE49-F238E27FC236}">
-                <a16:creationId xmlns:a16="http://schemas.microsoft.com/office/drawing/2014/main" id="{D61EC056-C98D-402A-A3B1-038262C952B9}"/>
-              </a:ext>
-            </a:extLst>
-          </p:cNvPr>
-          <p:cNvSpPr>
-            <a:spLocks noGrp="1"/>
-          </p:cNvSpPr>
-          <p:nvPr>
-            <p:ph idx="1"/>
-          </p:nvPr>
-        </p:nvSpPr>
-        <p:spPr/>
-        <p:txBody>
-          <a:bodyPr/>
-          <a:lstStyle/>
-          <a:p>
-            <a:pPr algn="l" rtl="0"/>
-            <a:r>
-              <a:rPr lang="en-US" dirty="0"/>
-              <a:t>What did we build?</a:t>
-            </a:r>
-          </a:p>
-          <a:p>
-            <a:pPr lvl="1" algn="l" rtl="0"/>
-            <a:r>
-              <a:rPr lang="en-US" dirty="0"/>
-              <a:t>Game Environment</a:t>
-            </a:r>
-          </a:p>
-          <a:p>
-            <a:pPr lvl="1" algn="l" rtl="0"/>
-            <a:r>
-              <a:rPr lang="en-US" dirty="0"/>
-              <a:t>Algorithms</a:t>
-            </a:r>
-          </a:p>
-          <a:p>
-            <a:pPr lvl="1" algn="l" rtl="0"/>
-            <a:r>
-              <a:rPr lang="en-US" dirty="0"/>
-              <a:t>Agents</a:t>
-            </a:r>
-          </a:p>
-          <a:p>
-            <a:pPr algn="l" rtl="0"/>
-            <a:r>
-              <a:rPr lang="en-US" dirty="0"/>
-              <a:t>Game Scenarios</a:t>
-            </a:r>
-          </a:p>
-          <a:p>
-            <a:pPr algn="l" rtl="0"/>
-            <a:r>
-              <a:rPr lang="en-US" dirty="0"/>
-              <a:t>Game Evaluation</a:t>
-            </a:r>
-            <a:endParaRPr lang="he-IL" dirty="0"/>
-          </a:p>
-        </p:txBody>
-      </p:sp>
-    </p:spTree>
-    <p:extLst>
-      <p:ext uri="{BB962C8B-B14F-4D97-AF65-F5344CB8AC3E}">
-        <p14:creationId xmlns:p14="http://schemas.microsoft.com/office/powerpoint/2010/main" val="1724918253"/>
-      </p:ext>
-    </p:extLst>
-  </p:cSld>
-  <p:clrMapOvr>
-    <a:overrideClrMapping bg1="dk1" tx1="lt1" bg2="dk2" tx2="lt2" accent1="accent1" accent2="accent2" accent3="accent3" accent4="accent4" accent5="accent5" accent6="accent6" hlink="hlink" folHlink="folHlink"/>
-  </p:clrMapOvr>
-</p:sld>
-</file>
-
-<file path=ppt/slides/slide20.xml><?xml version="1.0" encoding="utf-8"?>
+<file path=ppt/slides/slide21.xml><?xml version="1.0" encoding="utf-8"?>
 <p:sld xmlns:a="http://schemas.openxmlformats.org/drawingml/2006/main" xmlns:r="http://schemas.openxmlformats.org/officeDocument/2006/relationships" xmlns:p="http://schemas.openxmlformats.org/presentationml/2006/main">
   <p:cSld>
     <p:bg>
@@ -19879,10 +20545,10 @@
       </p:sp>
       <p:pic>
         <p:nvPicPr>
-          <p:cNvPr id="6" name="Picture 5">
+          <p:cNvPr id="7" name="Picture 6">
             <a:extLst>
               <a:ext uri="{FF2B5EF4-FFF2-40B4-BE49-F238E27FC236}">
-                <a16:creationId xmlns:a16="http://schemas.microsoft.com/office/drawing/2014/main" id="{676BBD47-75E3-43A6-987C-450CA68D6049}"/>
+                <a16:creationId xmlns:a16="http://schemas.microsoft.com/office/drawing/2014/main" id="{2DA1C58D-B4ED-40F0-956D-A7044D24CCC3}"/>
               </a:ext>
             </a:extLst>
           </p:cNvPr>
@@ -19899,13 +20565,13 @@
               </a:ext>
             </a:extLst>
           </a:blip>
-          <a:srcRect l="9584" t="6805" b="62222"/>
+          <a:srcRect l="10133" t="6933" b="62133"/>
           <a:stretch/>
         </p:blipFill>
         <p:spPr>
           <a:xfrm>
-            <a:off x="431755" y="2192338"/>
-            <a:ext cx="11328489" cy="2910430"/>
+            <a:off x="747601" y="2304288"/>
+            <a:ext cx="10696798" cy="2761488"/>
           </a:xfrm>
           <a:prstGeom prst="rect">
             <a:avLst/>
@@ -19925,7 +20591,7 @@
 </p:sld>
 </file>
 
-<file path=ppt/slides/slide21.xml><?xml version="1.0" encoding="utf-8"?>
+<file path=ppt/slides/slide22.xml><?xml version="1.0" encoding="utf-8"?>
 <p:sld xmlns:a="http://schemas.openxmlformats.org/drawingml/2006/main" xmlns:r="http://schemas.openxmlformats.org/officeDocument/2006/relationships" xmlns:p="http://schemas.openxmlformats.org/presentationml/2006/main">
   <p:cSld>
     <p:bg>
@@ -19952,10 +20618,10 @@
       </p:grpSpPr>
       <p:pic>
         <p:nvPicPr>
-          <p:cNvPr id="5" name="Picture 4">
+          <p:cNvPr id="8" name="Picture 7">
             <a:extLst>
               <a:ext uri="{FF2B5EF4-FFF2-40B4-BE49-F238E27FC236}">
-                <a16:creationId xmlns:a16="http://schemas.microsoft.com/office/drawing/2014/main" id="{9E6DC8EC-E24C-4C03-995B-6F05FF43004A}"/>
+                <a16:creationId xmlns:a16="http://schemas.microsoft.com/office/drawing/2014/main" id="{AC200FFE-6831-4863-AE75-C636272BDF1C}"/>
               </a:ext>
             </a:extLst>
           </p:cNvPr>
@@ -19999,7 +20665,7 @@
 </p:sld>
 </file>
 
-<file path=ppt/slides/slide22.xml><?xml version="1.0" encoding="utf-8"?>
+<file path=ppt/slides/slide23.xml><?xml version="1.0" encoding="utf-8"?>
 <p:sld xmlns:a="http://schemas.openxmlformats.org/drawingml/2006/main" xmlns:r="http://schemas.openxmlformats.org/officeDocument/2006/relationships" xmlns:p="http://schemas.openxmlformats.org/presentationml/2006/main">
   <p:cSld>
     <p:bg>
@@ -20123,7 +20789,7 @@
 </p:sld>
 </file>
 
-<file path=ppt/slides/slide23.xml><?xml version="1.0" encoding="utf-8"?>
+<file path=ppt/slides/slide24.xml><?xml version="1.0" encoding="utf-8"?>
 <p:sld xmlns:a="http://schemas.openxmlformats.org/drawingml/2006/main" xmlns:r="http://schemas.openxmlformats.org/officeDocument/2006/relationships" xmlns:p="http://schemas.openxmlformats.org/presentationml/2006/main">
   <p:cSld>
     <p:bg>
@@ -20247,287 +20913,6 @@
 </p:sld>
 </file>
 
-<file path=ppt/slides/slide24.xml><?xml version="1.0" encoding="utf-8"?>
-<p:sld xmlns:a="http://schemas.openxmlformats.org/drawingml/2006/main" xmlns:r="http://schemas.openxmlformats.org/officeDocument/2006/relationships" xmlns:p="http://schemas.openxmlformats.org/presentationml/2006/main" show="0">
-  <p:cSld>
-    <p:bg>
-      <p:bgPr>
-        <a:solidFill>
-          <a:srgbClr val="002060"/>
-        </a:solidFill>
-        <a:effectLst/>
-      </p:bgPr>
-    </p:bg>
-    <p:spTree>
-      <p:nvGrpSpPr>
-        <p:cNvPr id="1" name=""/>
-        <p:cNvGrpSpPr/>
-        <p:nvPr/>
-      </p:nvGrpSpPr>
-      <p:grpSpPr>
-        <a:xfrm>
-          <a:off x="0" y="0"/>
-          <a:ext cx="0" cy="0"/>
-          <a:chOff x="0" y="0"/>
-          <a:chExt cx="0" cy="0"/>
-        </a:xfrm>
-      </p:grpSpPr>
-      <mc:AlternateContent xmlns:mc="http://schemas.openxmlformats.org/markup-compatibility/2006">
-        <mc:Choice xmlns:a14="http://schemas.microsoft.com/office/drawing/2010/main" Requires="a14">
-          <p:sp>
-            <p:nvSpPr>
-              <p:cNvPr id="2" name="Title 1">
-                <a:extLst>
-                  <a:ext uri="{FF2B5EF4-FFF2-40B4-BE49-F238E27FC236}">
-                    <a16:creationId xmlns:a16="http://schemas.microsoft.com/office/drawing/2014/main" id="{3D14D9E3-B5FD-4A86-9B0E-8E189BE467F2}"/>
-                  </a:ext>
-                </a:extLst>
-              </p:cNvPr>
-              <p:cNvSpPr>
-                <a:spLocks noGrp="1"/>
-              </p:cNvSpPr>
-              <p:nvPr>
-                <p:ph type="title"/>
-              </p:nvPr>
-            </p:nvSpPr>
-            <p:spPr>
-              <a:xfrm>
-                <a:off x="905624" y="575871"/>
-                <a:ext cx="10685402" cy="1478570"/>
-              </a:xfrm>
-            </p:spPr>
-            <p:txBody>
-              <a:bodyPr>
-                <a:normAutofit/>
-              </a:bodyPr>
-              <a:lstStyle/>
-              <a:p>
-                <a:pPr rtl="0"/>
-                <a:r>
-                  <a:rPr lang="en-US" dirty="0"/>
-                  <a:t>DDQN Agent vs. Uniform Agent - </a:t>
-                </a:r>
-                <a14:m>
-                  <m:oMath xmlns:m="http://schemas.openxmlformats.org/officeDocument/2006/math">
-                    <m:r>
-                      <a:rPr lang="en-US" i="1" dirty="0" smtClean="0">
-                        <a:latin typeface="Cambria Math" panose="02040503050406030204" pitchFamily="18" charset="0"/>
-                      </a:rPr>
-                      <m:t>10</m:t>
-                    </m:r>
-                    <m:r>
-                      <a:rPr lang="en-US" i="1" dirty="0" smtClean="0">
-                        <a:latin typeface="Cambria Math" panose="02040503050406030204" pitchFamily="18" charset="0"/>
-                        <a:ea typeface="Cambria Math" panose="02040503050406030204" pitchFamily="18" charset="0"/>
-                      </a:rPr>
-                      <m:t>×</m:t>
-                    </m:r>
-                    <m:r>
-                      <a:rPr lang="en-US" i="1" dirty="0" smtClean="0">
-                        <a:latin typeface="Cambria Math" panose="02040503050406030204" pitchFamily="18" charset="0"/>
-                      </a:rPr>
-                      <m:t>10</m:t>
-                    </m:r>
-                  </m:oMath>
-                </a14:m>
-                <a:r>
-                  <a:rPr lang="en-US" dirty="0"/>
-                  <a:t> board</a:t>
-                </a:r>
-                <a:endParaRPr lang="he-IL" dirty="0"/>
-              </a:p>
-            </p:txBody>
-          </p:sp>
-        </mc:Choice>
-        <mc:Fallback>
-          <p:sp>
-            <p:nvSpPr>
-              <p:cNvPr id="2" name="Title 1">
-                <a:extLst>
-                  <a:ext uri="{FF2B5EF4-FFF2-40B4-BE49-F238E27FC236}">
-                    <a16:creationId xmlns:a16="http://schemas.microsoft.com/office/drawing/2014/main" id="{3D14D9E3-B5FD-4A86-9B0E-8E189BE467F2}"/>
-                  </a:ext>
-                </a:extLst>
-              </p:cNvPr>
-              <p:cNvSpPr>
-                <a:spLocks noGrp="1" noRot="1" noChangeAspect="1" noMove="1" noResize="1" noEditPoints="1" noAdjustHandles="1" noChangeArrowheads="1" noChangeShapeType="1" noTextEdit="1"/>
-              </p:cNvSpPr>
-              <p:nvPr>
-                <p:ph type="title"/>
-              </p:nvPr>
-            </p:nvSpPr>
-            <p:spPr>
-              <a:xfrm>
-                <a:off x="905624" y="575871"/>
-                <a:ext cx="10685402" cy="1478570"/>
-              </a:xfrm>
-              <a:blipFill>
-                <a:blip r:embed="rId3"/>
-                <a:stretch>
-                  <a:fillRect l="-1769"/>
-                </a:stretch>
-              </a:blipFill>
-            </p:spPr>
-            <p:txBody>
-              <a:bodyPr/>
-              <a:lstStyle/>
-              <a:p>
-                <a:r>
-                  <a:rPr lang="he-IL">
-                    <a:noFill/>
-                  </a:rPr>
-                  <a:t> </a:t>
-                </a:r>
-              </a:p>
-            </p:txBody>
-          </p:sp>
-        </mc:Fallback>
-      </mc:AlternateContent>
-      <p:pic>
-        <p:nvPicPr>
-          <p:cNvPr id="5" name="Picture 4">
-            <a:extLst>
-              <a:ext uri="{FF2B5EF4-FFF2-40B4-BE49-F238E27FC236}">
-                <a16:creationId xmlns:a16="http://schemas.microsoft.com/office/drawing/2014/main" id="{7BC2C0F1-7A32-46E0-A46D-35AB9BA3867C}"/>
-              </a:ext>
-            </a:extLst>
-          </p:cNvPr>
-          <p:cNvPicPr>
-            <a:picLocks noChangeAspect="1"/>
-          </p:cNvPicPr>
-          <p:nvPr/>
-        </p:nvPicPr>
-        <p:blipFill>
-          <a:blip r:embed="rId4"/>
-          <a:stretch>
-            <a:fillRect/>
-          </a:stretch>
-        </p:blipFill>
-        <p:spPr>
-          <a:xfrm>
-            <a:off x="1061048" y="2337275"/>
-            <a:ext cx="3830129" cy="3012237"/>
-          </a:xfrm>
-          <a:prstGeom prst="rect">
-            <a:avLst/>
-          </a:prstGeom>
-        </p:spPr>
-      </p:pic>
-      <p:pic>
-        <p:nvPicPr>
-          <p:cNvPr id="7" name="Picture 6">
-            <a:extLst>
-              <a:ext uri="{FF2B5EF4-FFF2-40B4-BE49-F238E27FC236}">
-                <a16:creationId xmlns:a16="http://schemas.microsoft.com/office/drawing/2014/main" id="{6B7DCF0C-FE13-4670-BCE4-118C29B8A315}"/>
-              </a:ext>
-            </a:extLst>
-          </p:cNvPr>
-          <p:cNvPicPr>
-            <a:picLocks noChangeAspect="1"/>
-          </p:cNvPicPr>
-          <p:nvPr/>
-        </p:nvPicPr>
-        <p:blipFill>
-          <a:blip r:embed="rId5"/>
-          <a:stretch>
-            <a:fillRect/>
-          </a:stretch>
-        </p:blipFill>
-        <p:spPr>
-          <a:xfrm>
-            <a:off x="5469147" y="2337275"/>
-            <a:ext cx="6141932" cy="3003545"/>
-          </a:xfrm>
-          <a:prstGeom prst="rect">
-            <a:avLst/>
-          </a:prstGeom>
-        </p:spPr>
-      </p:pic>
-      <p:sp>
-        <p:nvSpPr>
-          <p:cNvPr id="8" name="Content Placeholder 2">
-            <a:extLst>
-              <a:ext uri="{FF2B5EF4-FFF2-40B4-BE49-F238E27FC236}">
-                <a16:creationId xmlns:a16="http://schemas.microsoft.com/office/drawing/2014/main" id="{F1EFCD01-4E06-4B1D-9CB5-9F0EA9EFBF5E}"/>
-              </a:ext>
-            </a:extLst>
-          </p:cNvPr>
-          <p:cNvSpPr>
-            <a:spLocks noGrp="1"/>
-          </p:cNvSpPr>
-          <p:nvPr>
-            <p:ph idx="1"/>
-          </p:nvPr>
-        </p:nvSpPr>
-        <p:spPr>
-          <a:xfrm>
-            <a:off x="1143000" y="5666202"/>
-            <a:ext cx="9905999" cy="967512"/>
-          </a:xfrm>
-        </p:spPr>
-        <p:txBody>
-          <a:bodyPr>
-            <a:normAutofit/>
-          </a:bodyPr>
-          <a:lstStyle/>
-          <a:p>
-            <a:pPr algn="l" rtl="0"/>
-            <a:r>
-              <a:rPr lang="en-US" dirty="0"/>
-              <a:t>Both graphs indicate that the agent played according the optimal policy for a small period of episodes (600-700)</a:t>
-            </a:r>
-          </a:p>
-        </p:txBody>
-      </p:sp>
-      <p:sp>
-        <p:nvSpPr>
-          <p:cNvPr id="10" name="TextBox 9">
-            <a:extLst>
-              <a:ext uri="{FF2B5EF4-FFF2-40B4-BE49-F238E27FC236}">
-                <a16:creationId xmlns:a16="http://schemas.microsoft.com/office/drawing/2014/main" id="{EF7B2106-B7AD-4059-83DF-AB3663B70220}"/>
-              </a:ext>
-            </a:extLst>
-          </p:cNvPr>
-          <p:cNvSpPr txBox="1"/>
-          <p:nvPr/>
-        </p:nvSpPr>
-        <p:spPr>
-          <a:xfrm>
-            <a:off x="819508" y="1690944"/>
-            <a:ext cx="10685401" cy="369332"/>
-          </a:xfrm>
-          <a:prstGeom prst="rect">
-            <a:avLst/>
-          </a:prstGeom>
-          <a:noFill/>
-        </p:spPr>
-        <p:txBody>
-          <a:bodyPr wrap="square">
-            <a:spAutoFit/>
-          </a:bodyPr>
-          <a:lstStyle/>
-          <a:p>
-            <a:pPr algn="l" rtl="0"/>
-            <a:r>
-              <a:rPr lang="en-US" dirty="0"/>
-              <a:t>Lets review the rewards the agents get along the episodes in the scenario of DDQN Agent vs. Uniform Agent…</a:t>
-            </a:r>
-          </a:p>
-        </p:txBody>
-      </p:sp>
-    </p:spTree>
-    <p:extLst>
-      <p:ext uri="{BB962C8B-B14F-4D97-AF65-F5344CB8AC3E}">
-        <p14:creationId xmlns:p14="http://schemas.microsoft.com/office/powerpoint/2010/main" val="837735606"/>
-      </p:ext>
-    </p:extLst>
-  </p:cSld>
-  <p:clrMapOvr>
-    <a:overrideClrMapping bg1="dk1" tx1="lt1" bg2="dk2" tx2="lt2" accent1="accent1" accent2="accent2" accent3="accent3" accent4="accent4" accent5="accent5" accent6="accent6" hlink="hlink" folHlink="folHlink"/>
-  </p:clrMapOvr>
-</p:sld>
-</file>
-
 <file path=ppt/slides/slide25.xml><?xml version="1.0" encoding="utf-8"?>
 <p:sld xmlns:a="http://schemas.openxmlformats.org/drawingml/2006/main" xmlns:r="http://schemas.openxmlformats.org/officeDocument/2006/relationships" xmlns:p="http://schemas.openxmlformats.org/presentationml/2006/main">
   <p:cSld>
@@ -20603,59 +20988,119 @@
             <p:ph idx="1"/>
             <p:extLst>
               <p:ext uri="{D42A27DB-BD31-4B8C-83A1-F6EECF244321}">
-                <p14:modId xmlns:p14="http://schemas.microsoft.com/office/powerpoint/2010/main" val="1114046997"/>
+                <p14:modId xmlns:p14="http://schemas.microsoft.com/office/powerpoint/2010/main" val="395666467"/>
               </p:ext>
             </p:extLst>
           </p:nvPr>
         </p:nvGraphicFramePr>
         <p:xfrm>
-          <a:off x="1603648" y="1350375"/>
-          <a:ext cx="8826275" cy="4933435"/>
+          <a:off x="1772553" y="1344670"/>
+          <a:ext cx="8643715" cy="4933435"/>
         </p:xfrm>
         <a:graphic>
           <a:graphicData uri="http://schemas.openxmlformats.org/drawingml/2006/table">
             <a:tbl>
-              <a:tblPr rtl="1" firstRow="1" bandRow="1">
+              <a:tblPr firstRow="1" bandRow="1">
                 <a:tableStyleId>{35758FB7-9AC5-4552-8A53-C91805E547FA}</a:tableStyleId>
               </a:tblPr>
               <a:tblGrid>
-                <a:gridCol w="2262823">
+                <a:gridCol w="1720884">
+                  <a:extLst>
+                    <a:ext uri="{9D8B030D-6E8A-4147-A177-3AD203B41FA5}">
+                      <a16:colId xmlns:a16="http://schemas.microsoft.com/office/drawing/2014/main" val="858290143"/>
+                    </a:ext>
+                  </a:extLst>
+                </a:gridCol>
+                <a:gridCol w="1641600">
                   <a:extLst>
                     <a:ext uri="{9D8B030D-6E8A-4147-A177-3AD203B41FA5}">
                       <a16:colId xmlns:a16="http://schemas.microsoft.com/office/drawing/2014/main" val="1438140627"/>
                     </a:ext>
                   </a:extLst>
                 </a:gridCol>
-                <a:gridCol w="1640863">
+                <a:gridCol w="1467929">
                   <a:extLst>
                     <a:ext uri="{9D8B030D-6E8A-4147-A177-3AD203B41FA5}">
                       <a16:colId xmlns:a16="http://schemas.microsoft.com/office/drawing/2014/main" val="3591085594"/>
                     </a:ext>
                   </a:extLst>
                 </a:gridCol>
-                <a:gridCol w="1640863">
+                <a:gridCol w="1550479">
                   <a:extLst>
                     <a:ext uri="{9D8B030D-6E8A-4147-A177-3AD203B41FA5}">
                       <a16:colId xmlns:a16="http://schemas.microsoft.com/office/drawing/2014/main" val="1993991516"/>
                     </a:ext>
                   </a:extLst>
                 </a:gridCol>
-                <a:gridCol w="1640863">
+                <a:gridCol w="2262823">
                   <a:extLst>
                     <a:ext uri="{9D8B030D-6E8A-4147-A177-3AD203B41FA5}">
                       <a16:colId xmlns:a16="http://schemas.microsoft.com/office/drawing/2014/main" val="1864289781"/>
                     </a:ext>
                   </a:extLst>
                 </a:gridCol>
-                <a:gridCol w="1640863">
-                  <a:extLst>
-                    <a:ext uri="{9D8B030D-6E8A-4147-A177-3AD203B41FA5}">
-                      <a16:colId xmlns:a16="http://schemas.microsoft.com/office/drawing/2014/main" val="2751685555"/>
-                    </a:ext>
-                  </a:extLst>
-                </a:gridCol>
               </a:tblGrid>
               <a:tr h="379495">
+                <a:tc>
+                  <a:txBody>
+                    <a:bodyPr/>
+                    <a:lstStyle/>
+                    <a:p>
+                      <a:pPr algn="ctr" rtl="0"/>
+                      <a:r>
+                        <a:rPr lang="en-US" dirty="0"/>
+                        <a:t>Board size</a:t>
+                      </a:r>
+                      <a:endParaRPr lang="he-IL" dirty="0"/>
+                    </a:p>
+                  </a:txBody>
+                  <a:tcPr anchor="ctr"/>
+                </a:tc>
+                <a:tc>
+                  <a:txBody>
+                    <a:bodyPr/>
+                    <a:lstStyle/>
+                    <a:p>
+                      <a:pPr algn="ctr" rtl="0"/>
+                      <a:r>
+                        <a:rPr lang="en-US" dirty="0"/>
+                        <a:t>Competitor</a:t>
+                      </a:r>
+                      <a:endParaRPr lang="he-IL" dirty="0"/>
+                    </a:p>
+                  </a:txBody>
+                  <a:tcPr anchor="ctr"/>
+                </a:tc>
+                <a:tc>
+                  <a:txBody>
+                    <a:bodyPr/>
+                    <a:lstStyle/>
+                    <a:p>
+                      <a:pPr algn="ctr" rtl="0"/>
+                      <a:r>
+                        <a:rPr lang="en-US" dirty="0"/>
+                        <a:t>Memory Size</a:t>
+                      </a:r>
+                      <a:endParaRPr lang="he-IL" dirty="0"/>
+                    </a:p>
+                  </a:txBody>
+                  <a:tcPr anchor="ctr"/>
+                </a:tc>
+                <a:tc>
+                  <a:txBody>
+                    <a:bodyPr/>
+                    <a:lstStyle/>
+                    <a:p>
+                      <a:pPr algn="ctr" rtl="0"/>
+                      <a:r>
+                        <a:rPr lang="en-US" dirty="0"/>
+                        <a:t>Target Update</a:t>
+                      </a:r>
+                      <a:endParaRPr lang="he-IL" dirty="0"/>
+                    </a:p>
+                  </a:txBody>
+                  <a:tcPr anchor="ctr"/>
+                </a:tc>
                 <a:tc>
                   <a:txBody>
                     <a:bodyPr/>
@@ -20671,7 +21116,14 @@
                   </a:txBody>
                   <a:tcPr anchor="ctr"/>
                 </a:tc>
-                <a:tc>
+                <a:extLst>
+                  <a:ext uri="{0D108BD9-81ED-4DB2-BD59-A6C34878D82A}">
+                    <a16:rowId xmlns:a16="http://schemas.microsoft.com/office/drawing/2014/main" val="1194583991"/>
+                  </a:ext>
+                </a:extLst>
+              </a:tr>
+              <a:tr h="379495">
+                <a:tc rowSpan="4">
                   <a:txBody>
                     <a:bodyPr/>
                     <a:lstStyle/>
@@ -20679,100 +21131,7 @@
                       <a:pPr algn="ctr" rtl="0"/>
                       <a:r>
                         <a:rPr lang="en-US" dirty="0"/>
-                        <a:t>Target update</a:t>
-                      </a:r>
-                      <a:endParaRPr lang="he-IL" dirty="0"/>
-                    </a:p>
-                  </a:txBody>
-                  <a:tcPr anchor="ctr"/>
-                </a:tc>
-                <a:tc>
-                  <a:txBody>
-                    <a:bodyPr/>
-                    <a:lstStyle/>
-                    <a:p>
-                      <a:pPr algn="ctr" rtl="0"/>
-                      <a:r>
-                        <a:rPr lang="en-US" dirty="0"/>
-                        <a:t>Memory size</a:t>
-                      </a:r>
-                      <a:endParaRPr lang="he-IL" dirty="0"/>
-                    </a:p>
-                  </a:txBody>
-                  <a:tcPr anchor="ctr"/>
-                </a:tc>
-                <a:tc>
-                  <a:txBody>
-                    <a:bodyPr/>
-                    <a:lstStyle/>
-                    <a:p>
-                      <a:pPr algn="ctr" rtl="0"/>
-                      <a:r>
-                        <a:rPr lang="en-US" dirty="0"/>
-                        <a:t>competitor</a:t>
-                      </a:r>
-                      <a:endParaRPr lang="he-IL" dirty="0"/>
-                    </a:p>
-                  </a:txBody>
-                  <a:tcPr anchor="ctr"/>
-                </a:tc>
-                <a:tc>
-                  <a:txBody>
-                    <a:bodyPr/>
-                    <a:lstStyle/>
-                    <a:p>
-                      <a:pPr algn="ctr" rtl="0"/>
-                      <a:endParaRPr lang="he-IL" dirty="0"/>
-                    </a:p>
-                  </a:txBody>
-                  <a:tcPr anchor="ctr"/>
-                </a:tc>
-                <a:extLst>
-                  <a:ext uri="{0D108BD9-81ED-4DB2-BD59-A6C34878D82A}">
-                    <a16:rowId xmlns:a16="http://schemas.microsoft.com/office/drawing/2014/main" val="1194583991"/>
-                  </a:ext>
-                </a:extLst>
-              </a:tr>
-              <a:tr h="379495">
-                <a:tc>
-                  <a:txBody>
-                    <a:bodyPr/>
-                    <a:lstStyle/>
-                    <a:p>
-                      <a:pPr algn="ctr" rtl="0"/>
-                      <a:r>
-                        <a:rPr lang="en-US" dirty="0"/>
-                        <a:t>~19.99</a:t>
-                      </a:r>
-                      <a:endParaRPr lang="he-IL" dirty="0"/>
-                    </a:p>
-                  </a:txBody>
-                  <a:tcPr anchor="ctr"/>
-                </a:tc>
-                <a:tc>
-                  <a:txBody>
-                    <a:bodyPr/>
-                    <a:lstStyle/>
-                    <a:p>
-                      <a:pPr algn="ctr" rtl="0"/>
-                      <a:r>
-                        <a:rPr lang="en-US" dirty="0"/>
-                        <a:t>750</a:t>
-                      </a:r>
-                      <a:endParaRPr lang="he-IL" dirty="0"/>
-                    </a:p>
-                  </a:txBody>
-                  <a:tcPr anchor="ctr"/>
-                </a:tc>
-                <a:tc>
-                  <a:txBody>
-                    <a:bodyPr/>
-                    <a:lstStyle/>
-                    <a:p>
-                      <a:pPr algn="ctr" rtl="0"/>
-                      <a:r>
-                        <a:rPr lang="en-US" dirty="0"/>
-                        <a:t>5000</a:t>
+                        <a:t>10x10</a:t>
                       </a:r>
                       <a:endParaRPr lang="he-IL" dirty="0"/>
                     </a:p>
@@ -20794,20 +21153,68 @@
                   </a:txBody>
                   <a:tcPr anchor="ctr"/>
                 </a:tc>
-                <a:tc rowSpan="4">
+                <a:tc>
                   <a:txBody>
                     <a:bodyPr/>
                     <a:lstStyle/>
                     <a:p>
-                      <a:pPr algn="ctr" rtl="0"/>
+                      <a:pPr algn="ctr" rtl="0" fontAlgn="b"/>
                       <a:r>
-                        <a:rPr lang="en-US" dirty="0"/>
-                        <a:t>Board 10x10</a:t>
+                        <a:rPr lang="he-IL" sz="1800" kern="1200" dirty="0">
+                          <a:solidFill>
+                            <a:schemeClr val="dk1"/>
+                          </a:solidFill>
+                          <a:latin typeface="+mn-lt"/>
+                          <a:ea typeface="+mn-ea"/>
+                          <a:cs typeface="+mn-cs"/>
+                        </a:rPr>
+                        <a:t>20</a:t>
                       </a:r>
-                      <a:endParaRPr lang="he-IL" dirty="0"/>
                     </a:p>
                   </a:txBody>
-                  <a:tcPr anchor="ctr"/>
+                  <a:tcPr marL="9525" marR="9525" marT="9525" marB="0" anchor="ctr"/>
+                </a:tc>
+                <a:tc>
+                  <a:txBody>
+                    <a:bodyPr/>
+                    <a:lstStyle/>
+                    <a:p>
+                      <a:pPr algn="ctr" rtl="0" fontAlgn="b"/>
+                      <a:r>
+                        <a:rPr lang="he-IL" sz="1800" kern="1200" dirty="0">
+                          <a:solidFill>
+                            <a:schemeClr val="dk1"/>
+                          </a:solidFill>
+                          <a:latin typeface="+mn-lt"/>
+                          <a:ea typeface="+mn-ea"/>
+                          <a:cs typeface="+mn-cs"/>
+                        </a:rPr>
+                        <a:t>750</a:t>
+                      </a:r>
+                    </a:p>
+                  </a:txBody>
+                  <a:tcPr marL="9525" marR="9525" marT="9525" marB="0" anchor="ctr"/>
+                </a:tc>
+                <a:tc>
+                  <a:txBody>
+                    <a:bodyPr/>
+                    <a:lstStyle/>
+                    <a:p>
+                      <a:pPr algn="ctr" rtl="0" fontAlgn="b"/>
+                      <a:r>
+                        <a:rPr lang="he-IL" sz="1800" kern="1200" dirty="0">
+                          <a:solidFill>
+                            <a:schemeClr val="dk1"/>
+                          </a:solidFill>
+                          <a:latin typeface="+mn-lt"/>
+                          <a:ea typeface="+mn-ea"/>
+                          <a:cs typeface="+mn-cs"/>
+                        </a:rPr>
+                        <a:t>3000</a:t>
+                      </a:r>
+                    </a:p>
+                  </a:txBody>
+                  <a:tcPr marL="9525" marR="9525" marT="9525" marB="0" anchor="ctr"/>
                 </a:tc>
                 <a:extLst>
                   <a:ext uri="{0D108BD9-81ED-4DB2-BD59-A6C34878D82A}">
@@ -20816,66 +21223,16 @@
                 </a:extLst>
               </a:tr>
               <a:tr h="379495">
-                <a:tc>
+                <a:tc vMerge="1">
                   <a:txBody>
                     <a:bodyPr/>
                     <a:lstStyle/>
                     <a:p>
-                      <a:pPr marL="0" marR="0" lvl="0" indent="0" algn="ctr" defTabSz="914400" rtl="0" eaLnBrk="1" fontAlgn="auto" latinLnBrk="0" hangingPunct="1">
-                        <a:lnSpc>
-                          <a:spcPct val="100000"/>
-                        </a:lnSpc>
-                        <a:spcBef>
-                          <a:spcPts val="0"/>
-                        </a:spcBef>
-                        <a:spcAft>
-                          <a:spcPts val="0"/>
-                        </a:spcAft>
-                        <a:buClrTx/>
-                        <a:buSzTx/>
-                        <a:buFontTx/>
-                        <a:buNone/>
-                        <a:tabLst/>
-                        <a:defRPr/>
-                      </a:pPr>
-                      <a:r>
-                        <a:rPr lang="en-US" dirty="0"/>
-                        <a:t>~19.99</a:t>
-                      </a:r>
+                      <a:pPr algn="l" rtl="0"/>
                       <a:endParaRPr lang="he-IL" dirty="0"/>
                     </a:p>
                   </a:txBody>
-                  <a:tcPr anchor="ctr"/>
-                </a:tc>
-                <a:tc>
-                  <a:txBody>
-                    <a:bodyPr/>
-                    <a:lstStyle/>
-                    <a:p>
-                      <a:pPr algn="ctr" rtl="0"/>
-                      <a:r>
-                        <a:rPr lang="en-US" dirty="0"/>
-                        <a:t>750</a:t>
-                      </a:r>
-                      <a:endParaRPr lang="he-IL" dirty="0"/>
-                    </a:p>
-                  </a:txBody>
-                  <a:tcPr anchor="ctr"/>
-                </a:tc>
-                <a:tc>
-                  <a:txBody>
-                    <a:bodyPr/>
-                    <a:lstStyle/>
-                    <a:p>
-                      <a:pPr algn="ctr" rtl="0"/>
-                      <a:r>
-                        <a:rPr lang="en-US" dirty="0"/>
-                        <a:t>5000</a:t>
-                      </a:r>
-                      <a:endParaRPr lang="he-IL" dirty="0"/>
-                    </a:p>
-                  </a:txBody>
-                  <a:tcPr anchor="ctr"/>
+                  <a:tcPr/>
                 </a:tc>
                 <a:tc>
                   <a:txBody>
@@ -20892,16 +21249,68 @@
                   </a:txBody>
                   <a:tcPr anchor="ctr"/>
                 </a:tc>
-                <a:tc vMerge="1">
+                <a:tc>
                   <a:txBody>
                     <a:bodyPr/>
                     <a:lstStyle/>
                     <a:p>
-                      <a:pPr algn="l" rtl="0"/>
-                      <a:endParaRPr lang="he-IL" dirty="0"/>
+                      <a:pPr algn="ctr" rtl="0" fontAlgn="b"/>
+                      <a:r>
+                        <a:rPr lang="he-IL" sz="1800" kern="1200" dirty="0">
+                          <a:solidFill>
+                            <a:schemeClr val="dk1"/>
+                          </a:solidFill>
+                          <a:latin typeface="+mn-lt"/>
+                          <a:ea typeface="+mn-ea"/>
+                          <a:cs typeface="+mn-cs"/>
+                        </a:rPr>
+                        <a:t>19.98</a:t>
+                      </a:r>
                     </a:p>
                   </a:txBody>
-                  <a:tcPr/>
+                  <a:tcPr marL="9525" marR="9525" marT="9525" marB="0" anchor="ctr"/>
+                </a:tc>
+                <a:tc>
+                  <a:txBody>
+                    <a:bodyPr/>
+                    <a:lstStyle/>
+                    <a:p>
+                      <a:pPr algn="ctr" rtl="0" fontAlgn="b"/>
+                      <a:r>
+                        <a:rPr lang="he-IL" sz="1800" kern="1200" dirty="0">
+                          <a:solidFill>
+                            <a:schemeClr val="dk1"/>
+                          </a:solidFill>
+                          <a:latin typeface="+mn-lt"/>
+                          <a:ea typeface="+mn-ea"/>
+                          <a:cs typeface="+mn-cs"/>
+                        </a:rPr>
+                        <a:t>500</a:t>
+                      </a:r>
+                    </a:p>
+                  </a:txBody>
+                  <a:tcPr marL="9525" marR="9525" marT="9525" marB="0" anchor="ctr"/>
+                </a:tc>
+                <a:tc>
+                  <a:txBody>
+                    <a:bodyPr/>
+                    <a:lstStyle/>
+                    <a:p>
+                      <a:pPr algn="ctr" rtl="0" fontAlgn="b"/>
+                      <a:r>
+                        <a:rPr lang="he-IL" sz="1800" kern="1200" dirty="0">
+                          <a:solidFill>
+                            <a:schemeClr val="dk1"/>
+                          </a:solidFill>
+                          <a:latin typeface="+mn-lt"/>
+                          <a:ea typeface="+mn-ea"/>
+                          <a:cs typeface="+mn-cs"/>
+                        </a:rPr>
+                        <a:t>3000</a:t>
+                      </a:r>
+                    </a:p>
+                  </a:txBody>
+                  <a:tcPr marL="9525" marR="9525" marT="9525" marB="0" anchor="ctr"/>
                 </a:tc>
                 <a:extLst>
                   <a:ext uri="{0D108BD9-81ED-4DB2-BD59-A6C34878D82A}">
@@ -20910,83 +21319,16 @@
                 </a:extLst>
               </a:tr>
               <a:tr h="379495">
-                <a:tc>
+                <a:tc vMerge="1">
                   <a:txBody>
                     <a:bodyPr/>
                     <a:lstStyle/>
                     <a:p>
-                      <a:pPr marL="0" algn="ctr" defTabSz="914400" rtl="0" eaLnBrk="1" latinLnBrk="0" hangingPunct="1"/>
-                      <a:r>
-                        <a:rPr lang="en-US" sz="1800" kern="1200" dirty="0">
-                          <a:solidFill>
-                            <a:srgbClr val="DF2121"/>
-                          </a:solidFill>
-                        </a:rPr>
-                        <a:t>12.14</a:t>
-                      </a:r>
-                      <a:endParaRPr lang="he-IL" sz="1800" kern="1200" dirty="0">
-                        <a:solidFill>
-                          <a:srgbClr val="DF2121"/>
-                        </a:solidFill>
-                        <a:latin typeface="+mn-lt"/>
-                        <a:ea typeface="+mn-ea"/>
-                        <a:cs typeface="+mn-cs"/>
-                      </a:endParaRPr>
+                      <a:pPr rtl="1"/>
+                      <a:endParaRPr lang="he-IL" dirty="0"/>
                     </a:p>
                   </a:txBody>
-                  <a:tcPr anchor="ctr"/>
-                </a:tc>
-                <a:tc>
-                  <a:txBody>
-                    <a:bodyPr/>
-                    <a:lstStyle/>
-                    <a:p>
-                      <a:pPr marL="0" algn="ctr" defTabSz="914400" rtl="0" eaLnBrk="1" latinLnBrk="0" hangingPunct="1"/>
-                      <a:r>
-                        <a:rPr lang="en-US" sz="1800" kern="1200" dirty="0">
-                          <a:solidFill>
-                            <a:srgbClr val="DF2121"/>
-                          </a:solidFill>
-                        </a:rPr>
-                        <a:t>1000</a:t>
-                      </a:r>
-                      <a:endParaRPr lang="he-IL" sz="1800" kern="1200" dirty="0">
-                        <a:solidFill>
-                          <a:srgbClr val="DF2121"/>
-                        </a:solidFill>
-                        <a:latin typeface="+mn-lt"/>
-                        <a:ea typeface="+mn-ea"/>
-                        <a:cs typeface="+mn-cs"/>
-                      </a:endParaRPr>
-                    </a:p>
-                  </a:txBody>
-                  <a:tcPr anchor="ctr"/>
-                </a:tc>
-                <a:tc>
-                  <a:txBody>
-                    <a:bodyPr/>
-                    <a:lstStyle/>
-                    <a:p>
-                      <a:pPr marL="0" algn="ctr" defTabSz="914400" rtl="0" eaLnBrk="1" latinLnBrk="0" hangingPunct="1"/>
-                      <a:r>
-                        <a:rPr lang="en-US" sz="1800" kern="1200" dirty="0">
-                          <a:solidFill>
-                            <a:srgbClr val="DF2121"/>
-                          </a:solidFill>
-                        </a:rPr>
-                        <a:t>4000</a:t>
-                      </a:r>
-                      <a:endParaRPr lang="he-IL" sz="1800" kern="1200" dirty="0">
-                        <a:solidFill>
-                          <a:srgbClr val="DF2121"/>
-                        </a:solidFill>
-                        <a:latin typeface="+mn-lt"/>
-                        <a:ea typeface="+mn-ea"/>
-                        <a:cs typeface="+mn-cs"/>
-                      </a:endParaRPr>
-                    </a:p>
-                  </a:txBody>
-                  <a:tcPr anchor="ctr"/>
+                  <a:tcPr/>
                 </a:tc>
                 <a:tc>
                   <a:txBody>
@@ -21014,16 +21356,68 @@
                   </a:txBody>
                   <a:tcPr anchor="ctr"/>
                 </a:tc>
-                <a:tc vMerge="1">
+                <a:tc>
                   <a:txBody>
                     <a:bodyPr/>
                     <a:lstStyle/>
                     <a:p>
-                      <a:pPr rtl="1"/>
-                      <a:endParaRPr lang="he-IL"/>
+                      <a:pPr algn="ctr" rtl="0" fontAlgn="b"/>
+                      <a:r>
+                        <a:rPr lang="he-IL" sz="1800" kern="1200" dirty="0">
+                          <a:solidFill>
+                            <a:srgbClr val="DF2121"/>
+                          </a:solidFill>
+                          <a:latin typeface="+mn-lt"/>
+                          <a:ea typeface="+mn-ea"/>
+                          <a:cs typeface="+mn-cs"/>
+                        </a:rPr>
+                        <a:t>12.14</a:t>
+                      </a:r>
                     </a:p>
                   </a:txBody>
-                  <a:tcPr/>
+                  <a:tcPr marL="9525" marR="9525" marT="9525" marB="0" anchor="ctr"/>
+                </a:tc>
+                <a:tc>
+                  <a:txBody>
+                    <a:bodyPr/>
+                    <a:lstStyle/>
+                    <a:p>
+                      <a:pPr algn="ctr" rtl="0" fontAlgn="b"/>
+                      <a:r>
+                        <a:rPr lang="he-IL" sz="1800" kern="1200" dirty="0">
+                          <a:solidFill>
+                            <a:srgbClr val="DF2121"/>
+                          </a:solidFill>
+                          <a:latin typeface="+mn-lt"/>
+                          <a:ea typeface="+mn-ea"/>
+                          <a:cs typeface="+mn-cs"/>
+                        </a:rPr>
+                        <a:t>1000</a:t>
+                      </a:r>
+                    </a:p>
+                  </a:txBody>
+                  <a:tcPr marL="9525" marR="9525" marT="9525" marB="0" anchor="ctr"/>
+                </a:tc>
+                <a:tc>
+                  <a:txBody>
+                    <a:bodyPr/>
+                    <a:lstStyle/>
+                    <a:p>
+                      <a:pPr algn="ctr" rtl="0" fontAlgn="b"/>
+                      <a:r>
+                        <a:rPr lang="he-IL" sz="1800" kern="1200" dirty="0">
+                          <a:solidFill>
+                            <a:srgbClr val="DF2121"/>
+                          </a:solidFill>
+                          <a:latin typeface="+mn-lt"/>
+                          <a:ea typeface="+mn-ea"/>
+                          <a:cs typeface="+mn-cs"/>
+                        </a:rPr>
+                        <a:t>4000</a:t>
+                      </a:r>
+                    </a:p>
+                  </a:txBody>
+                  <a:tcPr marL="9525" marR="9525" marT="9525" marB="0" anchor="ctr"/>
                 </a:tc>
                 <a:extLst>
                   <a:ext uri="{0D108BD9-81ED-4DB2-BD59-A6C34878D82A}">
@@ -21032,83 +21426,16 @@
                 </a:extLst>
               </a:tr>
               <a:tr h="379495">
-                <a:tc>
+                <a:tc vMerge="1">
                   <a:txBody>
                     <a:bodyPr/>
                     <a:lstStyle/>
                     <a:p>
-                      <a:pPr marL="0" algn="ctr" defTabSz="914400" rtl="0" eaLnBrk="1" latinLnBrk="0" hangingPunct="1"/>
-                      <a:r>
-                        <a:rPr lang="en-US" sz="1800" kern="1200" dirty="0">
-                          <a:solidFill>
-                            <a:srgbClr val="DF2121"/>
-                          </a:solidFill>
-                        </a:rPr>
-                        <a:t>10.55</a:t>
-                      </a:r>
-                      <a:endParaRPr lang="he-IL" sz="1800" kern="1200" dirty="0">
-                        <a:solidFill>
-                          <a:srgbClr val="DF2121"/>
-                        </a:solidFill>
-                        <a:latin typeface="+mn-lt"/>
-                        <a:ea typeface="+mn-ea"/>
-                        <a:cs typeface="+mn-cs"/>
-                      </a:endParaRPr>
+                      <a:pPr algn="l" rtl="0"/>
+                      <a:endParaRPr lang="he-IL" dirty="0"/>
                     </a:p>
                   </a:txBody>
-                  <a:tcPr anchor="ctr"/>
-                </a:tc>
-                <a:tc>
-                  <a:txBody>
-                    <a:bodyPr/>
-                    <a:lstStyle/>
-                    <a:p>
-                      <a:pPr marL="0" algn="ctr" defTabSz="914400" rtl="0" eaLnBrk="1" latinLnBrk="0" hangingPunct="1"/>
-                      <a:r>
-                        <a:rPr lang="en-US" sz="1800" kern="1200" dirty="0">
-                          <a:solidFill>
-                            <a:srgbClr val="DF2121"/>
-                          </a:solidFill>
-                        </a:rPr>
-                        <a:t>750</a:t>
-                      </a:r>
-                      <a:endParaRPr lang="he-IL" sz="1800" kern="1200" dirty="0">
-                        <a:solidFill>
-                          <a:srgbClr val="DF2121"/>
-                        </a:solidFill>
-                        <a:latin typeface="+mn-lt"/>
-                        <a:ea typeface="+mn-ea"/>
-                        <a:cs typeface="+mn-cs"/>
-                      </a:endParaRPr>
-                    </a:p>
-                  </a:txBody>
-                  <a:tcPr anchor="ctr"/>
-                </a:tc>
-                <a:tc>
-                  <a:txBody>
-                    <a:bodyPr/>
-                    <a:lstStyle/>
-                    <a:p>
-                      <a:pPr marL="0" algn="ctr" defTabSz="914400" rtl="0" eaLnBrk="1" latinLnBrk="0" hangingPunct="1"/>
-                      <a:r>
-                        <a:rPr lang="en-US" sz="1800" kern="1200" dirty="0">
-                          <a:solidFill>
-                            <a:srgbClr val="DF2121"/>
-                          </a:solidFill>
-                        </a:rPr>
-                        <a:t>5000</a:t>
-                      </a:r>
-                      <a:endParaRPr lang="he-IL" sz="1800" kern="1200" dirty="0">
-                        <a:solidFill>
-                          <a:srgbClr val="DF2121"/>
-                        </a:solidFill>
-                        <a:latin typeface="+mn-lt"/>
-                        <a:ea typeface="+mn-ea"/>
-                        <a:cs typeface="+mn-cs"/>
-                      </a:endParaRPr>
-                    </a:p>
-                  </a:txBody>
-                  <a:tcPr anchor="ctr"/>
+                  <a:tcPr/>
                 </a:tc>
                 <a:tc>
                   <a:txBody>
@@ -21136,16 +21463,68 @@
                   </a:txBody>
                   <a:tcPr anchor="ctr"/>
                 </a:tc>
-                <a:tc vMerge="1">
+                <a:tc>
                   <a:txBody>
                     <a:bodyPr/>
                     <a:lstStyle/>
                     <a:p>
-                      <a:pPr algn="l" rtl="0"/>
-                      <a:endParaRPr lang="he-IL" dirty="0"/>
+                      <a:pPr algn="ctr" rtl="0" fontAlgn="b"/>
+                      <a:r>
+                        <a:rPr lang="he-IL" sz="1800" kern="1200" dirty="0">
+                          <a:solidFill>
+                            <a:srgbClr val="DF2121"/>
+                          </a:solidFill>
+                          <a:latin typeface="+mn-lt"/>
+                          <a:ea typeface="+mn-ea"/>
+                          <a:cs typeface="+mn-cs"/>
+                        </a:rPr>
+                        <a:t>19.03</a:t>
+                      </a:r>
                     </a:p>
                   </a:txBody>
-                  <a:tcPr/>
+                  <a:tcPr marL="9525" marR="9525" marT="9525" marB="0" anchor="ctr"/>
+                </a:tc>
+                <a:tc>
+                  <a:txBody>
+                    <a:bodyPr/>
+                    <a:lstStyle/>
+                    <a:p>
+                      <a:pPr algn="ctr" rtl="0" fontAlgn="b"/>
+                      <a:r>
+                        <a:rPr lang="he-IL" sz="1800" kern="1200" dirty="0">
+                          <a:solidFill>
+                            <a:srgbClr val="DF2121"/>
+                          </a:solidFill>
+                          <a:latin typeface="+mn-lt"/>
+                          <a:ea typeface="+mn-ea"/>
+                          <a:cs typeface="+mn-cs"/>
+                        </a:rPr>
+                        <a:t>500</a:t>
+                      </a:r>
+                    </a:p>
+                  </a:txBody>
+                  <a:tcPr marL="9525" marR="9525" marT="9525" marB="0" anchor="ctr"/>
+                </a:tc>
+                <a:tc>
+                  <a:txBody>
+                    <a:bodyPr/>
+                    <a:lstStyle/>
+                    <a:p>
+                      <a:pPr algn="ctr" rtl="0" fontAlgn="b"/>
+                      <a:r>
+                        <a:rPr lang="he-IL" sz="1800" kern="1200" dirty="0">
+                          <a:solidFill>
+                            <a:srgbClr val="DF2121"/>
+                          </a:solidFill>
+                          <a:latin typeface="+mn-lt"/>
+                          <a:ea typeface="+mn-ea"/>
+                          <a:cs typeface="+mn-cs"/>
+                        </a:rPr>
+                        <a:t>3000</a:t>
+                      </a:r>
+                    </a:p>
+                  </a:txBody>
+                  <a:tcPr marL="9525" marR="9525" marT="9525" marB="0" anchor="ctr"/>
                 </a:tc>
                 <a:extLst>
                   <a:ext uri="{0D108BD9-81ED-4DB2-BD59-A6C34878D82A}">
@@ -21154,91 +21533,17 @@
                 </a:extLst>
               </a:tr>
               <a:tr h="379495">
-                <a:tc>
-                  <a:txBody>
-                    <a:bodyPr/>
-                    <a:lstStyle/>
-                    <a:p>
-                      <a:pPr marL="0" marR="0" lvl="0" indent="0" algn="ctr" defTabSz="914400" rtl="0" eaLnBrk="1" fontAlgn="auto" latinLnBrk="0" hangingPunct="1">
-                        <a:lnSpc>
-                          <a:spcPct val="100000"/>
-                        </a:lnSpc>
-                        <a:spcBef>
-                          <a:spcPts val="0"/>
-                        </a:spcBef>
-                        <a:spcAft>
-                          <a:spcPts val="0"/>
-                        </a:spcAft>
-                        <a:buClrTx/>
-                        <a:buSzTx/>
-                        <a:buFontTx/>
-                        <a:buNone/>
-                        <a:tabLst/>
-                        <a:defRPr/>
-                      </a:pPr>
-                      <a:r>
-                        <a:rPr lang="en-US" dirty="0"/>
-                        <a:t>~19.99</a:t>
-                      </a:r>
-                      <a:endParaRPr lang="he-IL" dirty="0"/>
-                    </a:p>
-                  </a:txBody>
-                  <a:tcPr anchor="ctr"/>
-                </a:tc>
-                <a:tc>
+                <a:tc rowSpan="4">
                   <a:txBody>
                     <a:bodyPr/>
                     <a:lstStyle/>
                     <a:p>
                       <a:pPr algn="ctr" rtl="0"/>
                       <a:r>
-                        <a:rPr lang="en-US" sz="1800" kern="1200" dirty="0">
-                          <a:solidFill>
-                            <a:schemeClr val="dk1"/>
-                          </a:solidFill>
-                          <a:latin typeface="+mn-lt"/>
-                          <a:ea typeface="+mn-ea"/>
-                          <a:cs typeface="+mn-cs"/>
-                        </a:rPr>
-                        <a:t>750</a:t>
+                        <a:rPr lang="en-US" dirty="0"/>
+                        <a:t>20x20</a:t>
                       </a:r>
-                      <a:endParaRPr lang="he-IL" sz="1800" kern="1200" dirty="0">
-                        <a:solidFill>
-                          <a:schemeClr val="dk1"/>
-                        </a:solidFill>
-                        <a:latin typeface="+mn-lt"/>
-                        <a:ea typeface="+mn-ea"/>
-                        <a:cs typeface="+mn-cs"/>
-                      </a:endParaRPr>
-                    </a:p>
-                  </a:txBody>
-                  <a:tcPr anchor="ctr"/>
-                </a:tc>
-                <a:tc>
-                  <a:txBody>
-                    <a:bodyPr/>
-                    <a:lstStyle/>
-                    <a:p>
-                      <a:pPr algn="ctr" rtl="0"/>
-                      <a:r>
-                        <a:rPr lang="en-US" sz="1800" kern="1200" dirty="0">
-                          <a:solidFill>
-                            <a:schemeClr val="dk1"/>
-                          </a:solidFill>
-                          <a:latin typeface="+mn-lt"/>
-                          <a:ea typeface="+mn-ea"/>
-                          <a:cs typeface="+mn-cs"/>
-                        </a:rPr>
-                        <a:t>5000</a:t>
-                      </a:r>
-                      <a:endParaRPr lang="he-IL" sz="1800" kern="1200" dirty="0">
-                        <a:solidFill>
-                          <a:schemeClr val="dk1"/>
-                        </a:solidFill>
-                        <a:latin typeface="+mn-lt"/>
-                        <a:ea typeface="+mn-ea"/>
-                        <a:cs typeface="+mn-cs"/>
-                      </a:endParaRPr>
+                      <a:endParaRPr lang="he-IL" dirty="0"/>
                     </a:p>
                   </a:txBody>
                   <a:tcPr anchor="ctr"/>
@@ -21258,20 +21563,68 @@
                   </a:txBody>
                   <a:tcPr anchor="ctr"/>
                 </a:tc>
-                <a:tc rowSpan="4">
+                <a:tc>
                   <a:txBody>
                     <a:bodyPr/>
                     <a:lstStyle/>
                     <a:p>
-                      <a:pPr algn="ctr" rtl="0"/>
+                      <a:pPr algn="ctr" rtl="0" fontAlgn="b"/>
                       <a:r>
-                        <a:rPr lang="en-US" dirty="0"/>
-                        <a:t>Board 20x20</a:t>
+                        <a:rPr lang="he-IL" sz="1800" kern="1200" dirty="0">
+                          <a:solidFill>
+                            <a:schemeClr val="dk1"/>
+                          </a:solidFill>
+                          <a:latin typeface="+mn-lt"/>
+                          <a:ea typeface="+mn-ea"/>
+                          <a:cs typeface="+mn-cs"/>
+                        </a:rPr>
+                        <a:t>20</a:t>
                       </a:r>
-                      <a:endParaRPr lang="he-IL" dirty="0"/>
                     </a:p>
                   </a:txBody>
-                  <a:tcPr anchor="ctr"/>
+                  <a:tcPr marL="9525" marR="9525" marT="9525" marB="0" anchor="ctr"/>
+                </a:tc>
+                <a:tc>
+                  <a:txBody>
+                    <a:bodyPr/>
+                    <a:lstStyle/>
+                    <a:p>
+                      <a:pPr algn="ctr" rtl="0" fontAlgn="b"/>
+                      <a:r>
+                        <a:rPr lang="he-IL" sz="1800" kern="1200" dirty="0">
+                          <a:solidFill>
+                            <a:schemeClr val="dk1"/>
+                          </a:solidFill>
+                          <a:latin typeface="+mn-lt"/>
+                          <a:ea typeface="+mn-ea"/>
+                          <a:cs typeface="+mn-cs"/>
+                        </a:rPr>
+                        <a:t>500</a:t>
+                      </a:r>
+                    </a:p>
+                  </a:txBody>
+                  <a:tcPr marL="9525" marR="9525" marT="9525" marB="0" anchor="ctr"/>
+                </a:tc>
+                <a:tc>
+                  <a:txBody>
+                    <a:bodyPr/>
+                    <a:lstStyle/>
+                    <a:p>
+                      <a:pPr algn="ctr" rtl="0" fontAlgn="b"/>
+                      <a:r>
+                        <a:rPr lang="he-IL" sz="1800" kern="1200" dirty="0">
+                          <a:solidFill>
+                            <a:schemeClr val="dk1"/>
+                          </a:solidFill>
+                          <a:latin typeface="+mn-lt"/>
+                          <a:ea typeface="+mn-ea"/>
+                          <a:cs typeface="+mn-cs"/>
+                        </a:rPr>
+                        <a:t>3000</a:t>
+                      </a:r>
+                    </a:p>
+                  </a:txBody>
+                  <a:tcPr marL="9525" marR="9525" marT="9525" marB="0" anchor="ctr"/>
                 </a:tc>
                 <a:extLst>
                   <a:ext uri="{0D108BD9-81ED-4DB2-BD59-A6C34878D82A}">
@@ -21280,94 +21633,16 @@
                 </a:extLst>
               </a:tr>
               <a:tr h="379495">
-                <a:tc>
+                <a:tc vMerge="1">
                   <a:txBody>
                     <a:bodyPr/>
                     <a:lstStyle/>
                     <a:p>
-                      <a:pPr marL="0" marR="0" lvl="0" indent="0" algn="ctr" defTabSz="914400" rtl="0" eaLnBrk="1" fontAlgn="auto" latinLnBrk="0" hangingPunct="1">
-                        <a:lnSpc>
-                          <a:spcPct val="100000"/>
-                        </a:lnSpc>
-                        <a:spcBef>
-                          <a:spcPts val="0"/>
-                        </a:spcBef>
-                        <a:spcAft>
-                          <a:spcPts val="0"/>
-                        </a:spcAft>
-                        <a:buClrTx/>
-                        <a:buSzTx/>
-                        <a:buFontTx/>
-                        <a:buNone/>
-                        <a:tabLst/>
-                        <a:defRPr/>
-                      </a:pPr>
-                      <a:r>
-                        <a:rPr lang="en-US" dirty="0"/>
-                        <a:t>~19.99</a:t>
-                      </a:r>
+                      <a:pPr algn="l" rtl="0"/>
                       <a:endParaRPr lang="he-IL" dirty="0"/>
                     </a:p>
                   </a:txBody>
-                  <a:tcPr anchor="ctr"/>
-                </a:tc>
-                <a:tc>
-                  <a:txBody>
-                    <a:bodyPr/>
-                    <a:lstStyle/>
-                    <a:p>
-                      <a:pPr algn="ctr" rtl="0"/>
-                      <a:r>
-                        <a:rPr lang="en-US" sz="1800" kern="1200" dirty="0">
-                          <a:solidFill>
-                            <a:schemeClr val="dk1"/>
-                          </a:solidFill>
-                          <a:latin typeface="+mn-lt"/>
-                          <a:ea typeface="+mn-ea"/>
-                          <a:cs typeface="+mn-cs"/>
-                        </a:rPr>
-                        <a:t>750</a:t>
-                      </a:r>
-                      <a:endParaRPr lang="he-IL" sz="1800" kern="1200" dirty="0">
-                        <a:solidFill>
-                          <a:schemeClr val="dk1"/>
-                        </a:solidFill>
-                        <a:latin typeface="+mn-lt"/>
-                        <a:ea typeface="+mn-ea"/>
-                        <a:cs typeface="+mn-cs"/>
-                      </a:endParaRPr>
-                    </a:p>
-                  </a:txBody>
-                  <a:tcPr anchor="ctr"/>
-                </a:tc>
-                <a:tc>
-                  <a:txBody>
-                    <a:bodyPr/>
-                    <a:lstStyle/>
-                    <a:p>
-                      <a:pPr algn="ctr" rtl="0"/>
-                      <a:r>
-                        <a:rPr lang="en-US" sz="1800" kern="1200" dirty="0">
-                          <a:solidFill>
-                            <a:schemeClr val="dk1"/>
-                          </a:solidFill>
-                          <a:latin typeface="+mn-lt"/>
-                          <a:ea typeface="+mn-ea"/>
-                          <a:cs typeface="+mn-cs"/>
-                        </a:rPr>
-                        <a:t>5000</a:t>
-                      </a:r>
-                      <a:endParaRPr lang="he-IL" sz="1800" kern="1200" dirty="0">
-                        <a:solidFill>
-                          <a:schemeClr val="dk1"/>
-                        </a:solidFill>
-                        <a:latin typeface="+mn-lt"/>
-                        <a:ea typeface="+mn-ea"/>
-                        <a:cs typeface="+mn-cs"/>
-                      </a:endParaRPr>
-                    </a:p>
-                  </a:txBody>
-                  <a:tcPr anchor="ctr"/>
+                  <a:tcPr/>
                 </a:tc>
                 <a:tc>
                   <a:txBody>
@@ -21384,16 +21659,68 @@
                   </a:txBody>
                   <a:tcPr anchor="ctr"/>
                 </a:tc>
-                <a:tc vMerge="1">
+                <a:tc>
                   <a:txBody>
                     <a:bodyPr/>
                     <a:lstStyle/>
                     <a:p>
-                      <a:pPr algn="l" rtl="0"/>
-                      <a:endParaRPr lang="he-IL" dirty="0"/>
+                      <a:pPr algn="ctr" rtl="0" fontAlgn="b"/>
+                      <a:r>
+                        <a:rPr lang="he-IL" sz="1800" kern="1200" dirty="0">
+                          <a:solidFill>
+                            <a:schemeClr val="dk1"/>
+                          </a:solidFill>
+                          <a:latin typeface="+mn-lt"/>
+                          <a:ea typeface="+mn-ea"/>
+                          <a:cs typeface="+mn-cs"/>
+                        </a:rPr>
+                        <a:t>19.99</a:t>
+                      </a:r>
                     </a:p>
                   </a:txBody>
-                  <a:tcPr/>
+                  <a:tcPr marL="9525" marR="9525" marT="9525" marB="0" anchor="ctr"/>
+                </a:tc>
+                <a:tc>
+                  <a:txBody>
+                    <a:bodyPr/>
+                    <a:lstStyle/>
+                    <a:p>
+                      <a:pPr algn="ctr" rtl="0" fontAlgn="b"/>
+                      <a:r>
+                        <a:rPr lang="he-IL" sz="1800" kern="1200" dirty="0">
+                          <a:solidFill>
+                            <a:schemeClr val="dk1"/>
+                          </a:solidFill>
+                          <a:latin typeface="+mn-lt"/>
+                          <a:ea typeface="+mn-ea"/>
+                          <a:cs typeface="+mn-cs"/>
+                        </a:rPr>
+                        <a:t>500</a:t>
+                      </a:r>
+                    </a:p>
+                  </a:txBody>
+                  <a:tcPr marL="9525" marR="9525" marT="9525" marB="0" anchor="ctr"/>
+                </a:tc>
+                <a:tc>
+                  <a:txBody>
+                    <a:bodyPr/>
+                    <a:lstStyle/>
+                    <a:p>
+                      <a:pPr algn="ctr" rtl="0" fontAlgn="b"/>
+                      <a:r>
+                        <a:rPr lang="he-IL" sz="1800" kern="1200" dirty="0">
+                          <a:solidFill>
+                            <a:schemeClr val="dk1"/>
+                          </a:solidFill>
+                          <a:latin typeface="+mn-lt"/>
+                          <a:ea typeface="+mn-ea"/>
+                          <a:cs typeface="+mn-cs"/>
+                        </a:rPr>
+                        <a:t>4000</a:t>
+                      </a:r>
+                    </a:p>
+                  </a:txBody>
+                  <a:tcPr marL="9525" marR="9525" marT="9525" marB="0" anchor="ctr"/>
                 </a:tc>
                 <a:extLst>
                   <a:ext uri="{0D108BD9-81ED-4DB2-BD59-A6C34878D82A}">
@@ -21402,83 +21729,16 @@
                 </a:extLst>
               </a:tr>
               <a:tr h="379495">
-                <a:tc>
+                <a:tc vMerge="1">
                   <a:txBody>
                     <a:bodyPr/>
                     <a:lstStyle/>
                     <a:p>
-                      <a:pPr marL="0" algn="ctr" defTabSz="914400" rtl="0" eaLnBrk="1" latinLnBrk="0" hangingPunct="1"/>
-                      <a:r>
-                        <a:rPr lang="en-US" sz="1800" kern="1200" dirty="0">
-                          <a:solidFill>
-                            <a:srgbClr val="DF2121"/>
-                          </a:solidFill>
-                        </a:rPr>
-                        <a:t>13.85</a:t>
-                      </a:r>
-                      <a:endParaRPr lang="he-IL" sz="1800" kern="1200" dirty="0">
-                        <a:solidFill>
-                          <a:srgbClr val="DF2121"/>
-                        </a:solidFill>
-                        <a:latin typeface="+mn-lt"/>
-                        <a:ea typeface="+mn-ea"/>
-                        <a:cs typeface="+mn-cs"/>
-                      </a:endParaRPr>
+                      <a:pPr rtl="1"/>
+                      <a:endParaRPr lang="he-IL" dirty="0"/>
                     </a:p>
                   </a:txBody>
-                  <a:tcPr anchor="ctr"/>
-                </a:tc>
-                <a:tc>
-                  <a:txBody>
-                    <a:bodyPr/>
-                    <a:lstStyle/>
-                    <a:p>
-                      <a:pPr marL="0" algn="ctr" defTabSz="914400" rtl="0" eaLnBrk="1" latinLnBrk="0" hangingPunct="1"/>
-                      <a:r>
-                        <a:rPr lang="en-US" sz="1800" kern="1200" dirty="0">
-                          <a:solidFill>
-                            <a:srgbClr val="DF2121"/>
-                          </a:solidFill>
-                        </a:rPr>
-                        <a:t>750</a:t>
-                      </a:r>
-                      <a:endParaRPr lang="he-IL" sz="1800" kern="1200" dirty="0">
-                        <a:solidFill>
-                          <a:srgbClr val="DF2121"/>
-                        </a:solidFill>
-                        <a:latin typeface="+mn-lt"/>
-                        <a:ea typeface="+mn-ea"/>
-                        <a:cs typeface="+mn-cs"/>
-                      </a:endParaRPr>
-                    </a:p>
-                  </a:txBody>
-                  <a:tcPr anchor="ctr"/>
-                </a:tc>
-                <a:tc>
-                  <a:txBody>
-                    <a:bodyPr/>
-                    <a:lstStyle/>
-                    <a:p>
-                      <a:pPr marL="0" algn="ctr" defTabSz="914400" rtl="0" eaLnBrk="1" latinLnBrk="0" hangingPunct="1"/>
-                      <a:r>
-                        <a:rPr lang="en-US" sz="1800" kern="1200" dirty="0">
-                          <a:solidFill>
-                            <a:srgbClr val="DF2121"/>
-                          </a:solidFill>
-                        </a:rPr>
-                        <a:t>5000</a:t>
-                      </a:r>
-                      <a:endParaRPr lang="he-IL" sz="1800" kern="1200" dirty="0">
-                        <a:solidFill>
-                          <a:srgbClr val="DF2121"/>
-                        </a:solidFill>
-                        <a:latin typeface="+mn-lt"/>
-                        <a:ea typeface="+mn-ea"/>
-                        <a:cs typeface="+mn-cs"/>
-                      </a:endParaRPr>
-                    </a:p>
-                  </a:txBody>
-                  <a:tcPr anchor="ctr"/>
+                  <a:tcPr/>
                 </a:tc>
                 <a:tc>
                   <a:txBody>
@@ -21506,16 +21766,68 @@
                   </a:txBody>
                   <a:tcPr anchor="ctr"/>
                 </a:tc>
-                <a:tc vMerge="1">
+                <a:tc>
                   <a:txBody>
                     <a:bodyPr/>
                     <a:lstStyle/>
                     <a:p>
-                      <a:pPr rtl="1"/>
-                      <a:endParaRPr lang="he-IL"/>
+                      <a:pPr algn="ctr" rtl="0" fontAlgn="b"/>
+                      <a:r>
+                        <a:rPr lang="he-IL" sz="1800" kern="1200" dirty="0">
+                          <a:solidFill>
+                            <a:srgbClr val="DF2121"/>
+                          </a:solidFill>
+                          <a:latin typeface="+mn-lt"/>
+                          <a:ea typeface="+mn-ea"/>
+                          <a:cs typeface="+mn-cs"/>
+                        </a:rPr>
+                        <a:t>13.85</a:t>
+                      </a:r>
                     </a:p>
                   </a:txBody>
-                  <a:tcPr/>
+                  <a:tcPr marL="9525" marR="9525" marT="9525" marB="0" anchor="ctr"/>
+                </a:tc>
+                <a:tc>
+                  <a:txBody>
+                    <a:bodyPr/>
+                    <a:lstStyle/>
+                    <a:p>
+                      <a:pPr algn="ctr" rtl="0" fontAlgn="b"/>
+                      <a:r>
+                        <a:rPr lang="he-IL" sz="1800" kern="1200" dirty="0">
+                          <a:solidFill>
+                            <a:srgbClr val="DF2121"/>
+                          </a:solidFill>
+                          <a:latin typeface="+mn-lt"/>
+                          <a:ea typeface="+mn-ea"/>
+                          <a:cs typeface="+mn-cs"/>
+                        </a:rPr>
+                        <a:t>750</a:t>
+                      </a:r>
+                    </a:p>
+                  </a:txBody>
+                  <a:tcPr marL="9525" marR="9525" marT="9525" marB="0" anchor="ctr"/>
+                </a:tc>
+                <a:tc>
+                  <a:txBody>
+                    <a:bodyPr/>
+                    <a:lstStyle/>
+                    <a:p>
+                      <a:pPr algn="ctr" rtl="0" fontAlgn="b"/>
+                      <a:r>
+                        <a:rPr lang="he-IL" sz="1800" kern="1200" dirty="0">
+                          <a:solidFill>
+                            <a:srgbClr val="DF2121"/>
+                          </a:solidFill>
+                          <a:latin typeface="+mn-lt"/>
+                          <a:ea typeface="+mn-ea"/>
+                          <a:cs typeface="+mn-cs"/>
+                        </a:rPr>
+                        <a:t>5000</a:t>
+                      </a:r>
+                    </a:p>
+                  </a:txBody>
+                  <a:tcPr marL="9525" marR="9525" marT="9525" marB="0" anchor="ctr"/>
                 </a:tc>
                 <a:extLst>
                   <a:ext uri="{0D108BD9-81ED-4DB2-BD59-A6C34878D82A}">
@@ -21524,83 +21836,16 @@
                 </a:extLst>
               </a:tr>
               <a:tr h="379495">
-                <a:tc>
+                <a:tc vMerge="1">
                   <a:txBody>
                     <a:bodyPr/>
                     <a:lstStyle/>
                     <a:p>
-                      <a:pPr marL="0" algn="ctr" defTabSz="914400" rtl="0" eaLnBrk="1" latinLnBrk="0" hangingPunct="1"/>
-                      <a:r>
-                        <a:rPr lang="en-US" sz="1800" kern="1200" dirty="0">
-                          <a:solidFill>
-                            <a:srgbClr val="DF2121"/>
-                          </a:solidFill>
-                        </a:rPr>
-                        <a:t>17.98</a:t>
-                      </a:r>
-                      <a:endParaRPr lang="he-IL" sz="1800" kern="1200" dirty="0">
-                        <a:solidFill>
-                          <a:srgbClr val="DF2121"/>
-                        </a:solidFill>
-                        <a:latin typeface="+mn-lt"/>
-                        <a:ea typeface="+mn-ea"/>
-                        <a:cs typeface="+mn-cs"/>
-                      </a:endParaRPr>
+                      <a:pPr algn="l" rtl="0"/>
+                      <a:endParaRPr lang="he-IL" dirty="0"/>
                     </a:p>
                   </a:txBody>
-                  <a:tcPr anchor="ctr"/>
-                </a:tc>
-                <a:tc>
-                  <a:txBody>
-                    <a:bodyPr/>
-                    <a:lstStyle/>
-                    <a:p>
-                      <a:pPr marL="0" algn="ctr" defTabSz="914400" rtl="0" eaLnBrk="1" latinLnBrk="0" hangingPunct="1"/>
-                      <a:r>
-                        <a:rPr lang="en-US" sz="1800" kern="1200" dirty="0">
-                          <a:solidFill>
-                            <a:srgbClr val="DF2121"/>
-                          </a:solidFill>
-                        </a:rPr>
-                        <a:t>1000</a:t>
-                      </a:r>
-                      <a:endParaRPr lang="he-IL" sz="1800" kern="1200" dirty="0">
-                        <a:solidFill>
-                          <a:srgbClr val="DF2121"/>
-                        </a:solidFill>
-                        <a:latin typeface="+mn-lt"/>
-                        <a:ea typeface="+mn-ea"/>
-                        <a:cs typeface="+mn-cs"/>
-                      </a:endParaRPr>
-                    </a:p>
-                  </a:txBody>
-                  <a:tcPr anchor="ctr"/>
-                </a:tc>
-                <a:tc>
-                  <a:txBody>
-                    <a:bodyPr/>
-                    <a:lstStyle/>
-                    <a:p>
-                      <a:pPr marL="0" algn="ctr" defTabSz="914400" rtl="0" eaLnBrk="1" latinLnBrk="0" hangingPunct="1"/>
-                      <a:r>
-                        <a:rPr lang="en-US" sz="1800" kern="1200" dirty="0">
-                          <a:solidFill>
-                            <a:srgbClr val="DF2121"/>
-                          </a:solidFill>
-                        </a:rPr>
-                        <a:t>4000</a:t>
-                      </a:r>
-                      <a:endParaRPr lang="he-IL" sz="1800" kern="1200" dirty="0">
-                        <a:solidFill>
-                          <a:srgbClr val="DF2121"/>
-                        </a:solidFill>
-                        <a:latin typeface="+mn-lt"/>
-                        <a:ea typeface="+mn-ea"/>
-                        <a:cs typeface="+mn-cs"/>
-                      </a:endParaRPr>
-                    </a:p>
-                  </a:txBody>
-                  <a:tcPr anchor="ctr"/>
+                  <a:tcPr/>
                 </a:tc>
                 <a:tc>
                   <a:txBody>
@@ -21628,16 +21873,68 @@
                   </a:txBody>
                   <a:tcPr anchor="ctr"/>
                 </a:tc>
-                <a:tc vMerge="1">
+                <a:tc>
                   <a:txBody>
                     <a:bodyPr/>
                     <a:lstStyle/>
                     <a:p>
-                      <a:pPr algn="l" rtl="0"/>
-                      <a:endParaRPr lang="he-IL" dirty="0"/>
+                      <a:pPr algn="ctr" rtl="0" fontAlgn="b"/>
+                      <a:r>
+                        <a:rPr lang="he-IL" sz="1800" kern="1200" dirty="0">
+                          <a:solidFill>
+                            <a:srgbClr val="DF2121"/>
+                          </a:solidFill>
+                          <a:latin typeface="+mn-lt"/>
+                          <a:ea typeface="+mn-ea"/>
+                          <a:cs typeface="+mn-cs"/>
+                        </a:rPr>
+                        <a:t>17.98</a:t>
+                      </a:r>
                     </a:p>
                   </a:txBody>
-                  <a:tcPr/>
+                  <a:tcPr marL="9525" marR="9525" marT="9525" marB="0" anchor="ctr"/>
+                </a:tc>
+                <a:tc>
+                  <a:txBody>
+                    <a:bodyPr/>
+                    <a:lstStyle/>
+                    <a:p>
+                      <a:pPr algn="ctr" rtl="0" fontAlgn="b"/>
+                      <a:r>
+                        <a:rPr lang="he-IL" sz="1800" kern="1200" dirty="0">
+                          <a:solidFill>
+                            <a:srgbClr val="DF2121"/>
+                          </a:solidFill>
+                          <a:latin typeface="+mn-lt"/>
+                          <a:ea typeface="+mn-ea"/>
+                          <a:cs typeface="+mn-cs"/>
+                        </a:rPr>
+                        <a:t>1000</a:t>
+                      </a:r>
+                    </a:p>
+                  </a:txBody>
+                  <a:tcPr marL="9525" marR="9525" marT="9525" marB="0" anchor="ctr"/>
+                </a:tc>
+                <a:tc>
+                  <a:txBody>
+                    <a:bodyPr/>
+                    <a:lstStyle/>
+                    <a:p>
+                      <a:pPr algn="ctr" rtl="0" fontAlgn="b"/>
+                      <a:r>
+                        <a:rPr lang="he-IL" sz="1800" kern="1200" dirty="0">
+                          <a:solidFill>
+                            <a:srgbClr val="DF2121"/>
+                          </a:solidFill>
+                          <a:latin typeface="+mn-lt"/>
+                          <a:ea typeface="+mn-ea"/>
+                          <a:cs typeface="+mn-cs"/>
+                        </a:rPr>
+                        <a:t>4000</a:t>
+                      </a:r>
+                    </a:p>
+                  </a:txBody>
+                  <a:tcPr marL="9525" marR="9525" marT="9525" marB="0" anchor="ctr"/>
                 </a:tc>
                 <a:extLst>
                   <a:ext uri="{0D108BD9-81ED-4DB2-BD59-A6C34878D82A}">
@@ -21646,91 +21943,17 @@
                 </a:extLst>
               </a:tr>
               <a:tr h="379495">
-                <a:tc>
-                  <a:txBody>
-                    <a:bodyPr/>
-                    <a:lstStyle/>
-                    <a:p>
-                      <a:pPr marL="0" marR="0" lvl="0" indent="0" algn="ctr" defTabSz="914400" rtl="0" eaLnBrk="1" fontAlgn="auto" latinLnBrk="0" hangingPunct="1">
-                        <a:lnSpc>
-                          <a:spcPct val="100000"/>
-                        </a:lnSpc>
-                        <a:spcBef>
-                          <a:spcPts val="0"/>
-                        </a:spcBef>
-                        <a:spcAft>
-                          <a:spcPts val="0"/>
-                        </a:spcAft>
-                        <a:buClrTx/>
-                        <a:buSzTx/>
-                        <a:buFontTx/>
-                        <a:buNone/>
-                        <a:tabLst/>
-                        <a:defRPr/>
-                      </a:pPr>
-                      <a:r>
-                        <a:rPr lang="en-US" dirty="0"/>
-                        <a:t>~19.99</a:t>
-                      </a:r>
-                      <a:endParaRPr lang="he-IL" dirty="0"/>
-                    </a:p>
-                  </a:txBody>
-                  <a:tcPr anchor="ctr"/>
-                </a:tc>
-                <a:tc>
+                <a:tc rowSpan="4">
                   <a:txBody>
                     <a:bodyPr/>
                     <a:lstStyle/>
                     <a:p>
                       <a:pPr algn="ctr" rtl="0"/>
                       <a:r>
-                        <a:rPr lang="en-US" sz="1800" kern="1200" dirty="0">
-                          <a:solidFill>
-                            <a:schemeClr val="dk1"/>
-                          </a:solidFill>
-                          <a:latin typeface="+mn-lt"/>
-                          <a:ea typeface="+mn-ea"/>
-                          <a:cs typeface="+mn-cs"/>
-                        </a:rPr>
-                        <a:t>750</a:t>
+                        <a:rPr lang="en-US" dirty="0"/>
+                        <a:t>30x30</a:t>
                       </a:r>
-                      <a:endParaRPr lang="he-IL" sz="1800" kern="1200" dirty="0">
-                        <a:solidFill>
-                          <a:schemeClr val="dk1"/>
-                        </a:solidFill>
-                        <a:latin typeface="+mn-lt"/>
-                        <a:ea typeface="+mn-ea"/>
-                        <a:cs typeface="+mn-cs"/>
-                      </a:endParaRPr>
-                    </a:p>
-                  </a:txBody>
-                  <a:tcPr anchor="ctr"/>
-                </a:tc>
-                <a:tc>
-                  <a:txBody>
-                    <a:bodyPr/>
-                    <a:lstStyle/>
-                    <a:p>
-                      <a:pPr algn="ctr" rtl="0"/>
-                      <a:r>
-                        <a:rPr lang="en-US" sz="1800" kern="1200" dirty="0">
-                          <a:solidFill>
-                            <a:schemeClr val="dk1"/>
-                          </a:solidFill>
-                          <a:latin typeface="+mn-lt"/>
-                          <a:ea typeface="+mn-ea"/>
-                          <a:cs typeface="+mn-cs"/>
-                        </a:rPr>
-                        <a:t>5000</a:t>
-                      </a:r>
-                      <a:endParaRPr lang="he-IL" sz="1800" kern="1200" dirty="0">
-                        <a:solidFill>
-                          <a:schemeClr val="dk1"/>
-                        </a:solidFill>
-                        <a:latin typeface="+mn-lt"/>
-                        <a:ea typeface="+mn-ea"/>
-                        <a:cs typeface="+mn-cs"/>
-                      </a:endParaRPr>
+                      <a:endParaRPr lang="he-IL" dirty="0"/>
                     </a:p>
                   </a:txBody>
                   <a:tcPr anchor="ctr"/>
@@ -21750,67 +21973,35 @@
                   </a:txBody>
                   <a:tcPr anchor="ctr"/>
                 </a:tc>
-                <a:tc rowSpan="4">
-                  <a:txBody>
-                    <a:bodyPr/>
-                    <a:lstStyle/>
-                    <a:p>
-                      <a:pPr algn="ctr" rtl="0"/>
-                      <a:r>
-                        <a:rPr lang="en-US" dirty="0"/>
-                        <a:t>Board 30x30</a:t>
-                      </a:r>
-                      <a:endParaRPr lang="he-IL" dirty="0"/>
-                    </a:p>
-                  </a:txBody>
-                  <a:tcPr anchor="ctr"/>
-                </a:tc>
-                <a:extLst>
-                  <a:ext uri="{0D108BD9-81ED-4DB2-BD59-A6C34878D82A}">
-                    <a16:rowId xmlns:a16="http://schemas.microsoft.com/office/drawing/2014/main" val="3946476614"/>
-                  </a:ext>
-                </a:extLst>
-              </a:tr>
-              <a:tr h="379495">
                 <a:tc>
                   <a:txBody>
                     <a:bodyPr/>
                     <a:lstStyle/>
                     <a:p>
-                      <a:pPr marL="0" marR="0" lvl="0" indent="0" algn="ctr" defTabSz="914400" rtl="0" eaLnBrk="1" fontAlgn="auto" latinLnBrk="0" hangingPunct="1">
-                        <a:lnSpc>
-                          <a:spcPct val="100000"/>
-                        </a:lnSpc>
-                        <a:spcBef>
-                          <a:spcPts val="0"/>
-                        </a:spcBef>
-                        <a:spcAft>
-                          <a:spcPts val="0"/>
-                        </a:spcAft>
-                        <a:buClrTx/>
-                        <a:buSzTx/>
-                        <a:buFontTx/>
-                        <a:buNone/>
-                        <a:tabLst/>
-                        <a:defRPr/>
-                      </a:pPr>
+                      <a:pPr algn="ctr" rtl="0" fontAlgn="b"/>
                       <a:r>
-                        <a:rPr lang="en-US" dirty="0"/>
-                        <a:t>~19.99</a:t>
+                        <a:rPr lang="he-IL" sz="1800" kern="1200" dirty="0">
+                          <a:solidFill>
+                            <a:schemeClr val="dk1"/>
+                          </a:solidFill>
+                          <a:latin typeface="+mn-lt"/>
+                          <a:ea typeface="+mn-ea"/>
+                          <a:cs typeface="+mn-cs"/>
+                        </a:rPr>
+                        <a:t>20</a:t>
                       </a:r>
-                      <a:endParaRPr lang="he-IL" dirty="0"/>
                     </a:p>
                   </a:txBody>
-                  <a:tcPr anchor="ctr"/>
+                  <a:tcPr marL="9525" marR="9525" marT="9525" marB="0" anchor="ctr"/>
                 </a:tc>
                 <a:tc>
                   <a:txBody>
                     <a:bodyPr/>
                     <a:lstStyle/>
                     <a:p>
-                      <a:pPr algn="ctr" rtl="0"/>
+                      <a:pPr algn="ctr" rtl="0" fontAlgn="b"/>
                       <a:r>
-                        <a:rPr lang="en-US" sz="1800" kern="1200" dirty="0">
+                        <a:rPr lang="he-IL" sz="1800" kern="1200" dirty="0">
                           <a:solidFill>
                             <a:schemeClr val="dk1"/>
                           </a:solidFill>
@@ -21820,26 +22011,18 @@
                         </a:rPr>
                         <a:t>750</a:t>
                       </a:r>
-                      <a:endParaRPr lang="he-IL" sz="1800" kern="1200" dirty="0">
-                        <a:solidFill>
-                          <a:schemeClr val="dk1"/>
-                        </a:solidFill>
-                        <a:latin typeface="+mn-lt"/>
-                        <a:ea typeface="+mn-ea"/>
-                        <a:cs typeface="+mn-cs"/>
-                      </a:endParaRPr>
                     </a:p>
                   </a:txBody>
-                  <a:tcPr anchor="ctr"/>
+                  <a:tcPr marL="9525" marR="9525" marT="9525" marB="0" anchor="ctr"/>
                 </a:tc>
                 <a:tc>
                   <a:txBody>
                     <a:bodyPr/>
                     <a:lstStyle/>
                     <a:p>
-                      <a:pPr algn="ctr" rtl="0"/>
+                      <a:pPr algn="ctr" rtl="0" fontAlgn="b"/>
                       <a:r>
-                        <a:rPr lang="en-US" sz="1800" kern="1200" dirty="0">
+                        <a:rPr lang="he-IL" sz="1800" kern="1200" dirty="0">
                           <a:solidFill>
                             <a:schemeClr val="dk1"/>
                           </a:solidFill>
@@ -21849,17 +22032,27 @@
                         </a:rPr>
                         <a:t>5000</a:t>
                       </a:r>
-                      <a:endParaRPr lang="he-IL" sz="1800" kern="1200" dirty="0">
-                        <a:solidFill>
-                          <a:schemeClr val="dk1"/>
-                        </a:solidFill>
-                        <a:latin typeface="+mn-lt"/>
-                        <a:ea typeface="+mn-ea"/>
-                        <a:cs typeface="+mn-cs"/>
-                      </a:endParaRPr>
                     </a:p>
                   </a:txBody>
-                  <a:tcPr anchor="ctr"/>
+                  <a:tcPr marL="9525" marR="9525" marT="9525" marB="0" anchor="ctr"/>
+                </a:tc>
+                <a:extLst>
+                  <a:ext uri="{0D108BD9-81ED-4DB2-BD59-A6C34878D82A}">
+                    <a16:rowId xmlns:a16="http://schemas.microsoft.com/office/drawing/2014/main" val="3946476614"/>
+                  </a:ext>
+                </a:extLst>
+              </a:tr>
+              <a:tr h="379495">
+                <a:tc vMerge="1">
+                  <a:txBody>
+                    <a:bodyPr/>
+                    <a:lstStyle/>
+                    <a:p>
+                      <a:pPr algn="l" rtl="0"/>
+                      <a:endParaRPr lang="he-IL" dirty="0"/>
+                    </a:p>
+                  </a:txBody>
+                  <a:tcPr/>
                 </a:tc>
                 <a:tc>
                   <a:txBody>
@@ -21876,16 +22069,68 @@
                   </a:txBody>
                   <a:tcPr anchor="ctr"/>
                 </a:tc>
-                <a:tc vMerge="1">
+                <a:tc>
                   <a:txBody>
                     <a:bodyPr/>
                     <a:lstStyle/>
                     <a:p>
-                      <a:pPr algn="l" rtl="0"/>
-                      <a:endParaRPr lang="he-IL" dirty="0"/>
+                      <a:pPr algn="ctr" rtl="0" fontAlgn="b"/>
+                      <a:r>
+                        <a:rPr lang="he-IL" sz="1800" kern="1200" dirty="0">
+                          <a:solidFill>
+                            <a:schemeClr val="dk1"/>
+                          </a:solidFill>
+                          <a:latin typeface="+mn-lt"/>
+                          <a:ea typeface="+mn-ea"/>
+                          <a:cs typeface="+mn-cs"/>
+                        </a:rPr>
+                        <a:t>19.99</a:t>
+                      </a:r>
                     </a:p>
                   </a:txBody>
-                  <a:tcPr/>
+                  <a:tcPr marL="9525" marR="9525" marT="9525" marB="0" anchor="ctr"/>
+                </a:tc>
+                <a:tc>
+                  <a:txBody>
+                    <a:bodyPr/>
+                    <a:lstStyle/>
+                    <a:p>
+                      <a:pPr algn="ctr" rtl="0" fontAlgn="b"/>
+                      <a:r>
+                        <a:rPr lang="he-IL" sz="1800" kern="1200" dirty="0">
+                          <a:solidFill>
+                            <a:schemeClr val="dk1"/>
+                          </a:solidFill>
+                          <a:latin typeface="+mn-lt"/>
+                          <a:ea typeface="+mn-ea"/>
+                          <a:cs typeface="+mn-cs"/>
+                        </a:rPr>
+                        <a:t>1000</a:t>
+                      </a:r>
+                    </a:p>
+                  </a:txBody>
+                  <a:tcPr marL="9525" marR="9525" marT="9525" marB="0" anchor="ctr"/>
+                </a:tc>
+                <a:tc>
+                  <a:txBody>
+                    <a:bodyPr/>
+                    <a:lstStyle/>
+                    <a:p>
+                      <a:pPr algn="ctr" rtl="0" fontAlgn="b"/>
+                      <a:r>
+                        <a:rPr lang="he-IL" sz="1800" kern="1200" dirty="0">
+                          <a:solidFill>
+                            <a:schemeClr val="dk1"/>
+                          </a:solidFill>
+                          <a:latin typeface="+mn-lt"/>
+                          <a:ea typeface="+mn-ea"/>
+                          <a:cs typeface="+mn-cs"/>
+                        </a:rPr>
+                        <a:t>3000</a:t>
+                      </a:r>
+                    </a:p>
+                  </a:txBody>
+                  <a:tcPr marL="9525" marR="9525" marT="9525" marB="0" anchor="ctr"/>
                 </a:tc>
                 <a:extLst>
                   <a:ext uri="{0D108BD9-81ED-4DB2-BD59-A6C34878D82A}">
@@ -21894,83 +22139,16 @@
                 </a:extLst>
               </a:tr>
               <a:tr h="379495">
-                <a:tc>
+                <a:tc vMerge="1">
                   <a:txBody>
                     <a:bodyPr/>
                     <a:lstStyle/>
                     <a:p>
-                      <a:pPr marL="0" algn="ctr" defTabSz="914400" rtl="0" eaLnBrk="1" latinLnBrk="0" hangingPunct="1"/>
-                      <a:r>
-                        <a:rPr lang="en-US" sz="1800" kern="1200" dirty="0">
-                          <a:solidFill>
-                            <a:srgbClr val="DF2121"/>
-                          </a:solidFill>
-                        </a:rPr>
-                        <a:t>12.18</a:t>
-                      </a:r>
-                      <a:endParaRPr lang="he-IL" sz="1800" kern="1200" dirty="0">
-                        <a:solidFill>
-                          <a:srgbClr val="DF2121"/>
-                        </a:solidFill>
-                        <a:latin typeface="+mn-lt"/>
-                        <a:ea typeface="+mn-ea"/>
-                        <a:cs typeface="+mn-cs"/>
-                      </a:endParaRPr>
+                      <a:pPr rtl="1"/>
+                      <a:endParaRPr lang="he-IL" dirty="0"/>
                     </a:p>
                   </a:txBody>
-                  <a:tcPr anchor="ctr"/>
-                </a:tc>
-                <a:tc>
-                  <a:txBody>
-                    <a:bodyPr/>
-                    <a:lstStyle/>
-                    <a:p>
-                      <a:pPr marL="0" algn="ctr" defTabSz="914400" rtl="0" eaLnBrk="1" latinLnBrk="0" hangingPunct="1"/>
-                      <a:r>
-                        <a:rPr lang="en-US" sz="1800" kern="1200" dirty="0">
-                          <a:solidFill>
-                            <a:srgbClr val="DF2121"/>
-                          </a:solidFill>
-                        </a:rPr>
-                        <a:t>750</a:t>
-                      </a:r>
-                      <a:endParaRPr lang="he-IL" sz="1800" kern="1200" dirty="0">
-                        <a:solidFill>
-                          <a:srgbClr val="DF2121"/>
-                        </a:solidFill>
-                        <a:latin typeface="+mn-lt"/>
-                        <a:ea typeface="+mn-ea"/>
-                        <a:cs typeface="+mn-cs"/>
-                      </a:endParaRPr>
-                    </a:p>
-                  </a:txBody>
-                  <a:tcPr anchor="ctr"/>
-                </a:tc>
-                <a:tc>
-                  <a:txBody>
-                    <a:bodyPr/>
-                    <a:lstStyle/>
-                    <a:p>
-                      <a:pPr marL="0" algn="ctr" defTabSz="914400" rtl="0" eaLnBrk="1" latinLnBrk="0" hangingPunct="1"/>
-                      <a:r>
-                        <a:rPr lang="en-US" sz="1800" kern="1200" dirty="0">
-                          <a:solidFill>
-                            <a:srgbClr val="DF2121"/>
-                          </a:solidFill>
-                        </a:rPr>
-                        <a:t>5000</a:t>
-                      </a:r>
-                      <a:endParaRPr lang="he-IL" sz="1800" kern="1200" dirty="0">
-                        <a:solidFill>
-                          <a:srgbClr val="DF2121"/>
-                        </a:solidFill>
-                        <a:latin typeface="+mn-lt"/>
-                        <a:ea typeface="+mn-ea"/>
-                        <a:cs typeface="+mn-cs"/>
-                      </a:endParaRPr>
-                    </a:p>
-                  </a:txBody>
-                  <a:tcPr anchor="ctr"/>
+                  <a:tcPr/>
                 </a:tc>
                 <a:tc>
                   <a:txBody>
@@ -21998,16 +22176,68 @@
                   </a:txBody>
                   <a:tcPr anchor="ctr"/>
                 </a:tc>
-                <a:tc vMerge="1">
+                <a:tc>
                   <a:txBody>
                     <a:bodyPr/>
                     <a:lstStyle/>
                     <a:p>
-                      <a:pPr rtl="1"/>
-                      <a:endParaRPr lang="he-IL"/>
+                      <a:pPr algn="ctr" rtl="0" fontAlgn="b"/>
+                      <a:r>
+                        <a:rPr lang="he-IL" sz="1800" kern="1200" dirty="0">
+                          <a:solidFill>
+                            <a:srgbClr val="DF2121"/>
+                          </a:solidFill>
+                          <a:latin typeface="+mn-lt"/>
+                          <a:ea typeface="+mn-ea"/>
+                          <a:cs typeface="+mn-cs"/>
+                        </a:rPr>
+                        <a:t>12.18</a:t>
+                      </a:r>
                     </a:p>
                   </a:txBody>
-                  <a:tcPr/>
+                  <a:tcPr marL="9525" marR="9525" marT="9525" marB="0" anchor="ctr"/>
+                </a:tc>
+                <a:tc>
+                  <a:txBody>
+                    <a:bodyPr/>
+                    <a:lstStyle/>
+                    <a:p>
+                      <a:pPr algn="ctr" rtl="0" fontAlgn="b"/>
+                      <a:r>
+                        <a:rPr lang="he-IL" sz="1800" kern="1200" dirty="0">
+                          <a:solidFill>
+                            <a:srgbClr val="DF2121"/>
+                          </a:solidFill>
+                          <a:latin typeface="+mn-lt"/>
+                          <a:ea typeface="+mn-ea"/>
+                          <a:cs typeface="+mn-cs"/>
+                        </a:rPr>
+                        <a:t>750</a:t>
+                      </a:r>
+                    </a:p>
+                  </a:txBody>
+                  <a:tcPr marL="9525" marR="9525" marT="9525" marB="0" anchor="ctr"/>
+                </a:tc>
+                <a:tc>
+                  <a:txBody>
+                    <a:bodyPr/>
+                    <a:lstStyle/>
+                    <a:p>
+                      <a:pPr algn="ctr" rtl="0" fontAlgn="b"/>
+                      <a:r>
+                        <a:rPr lang="he-IL" sz="1800" kern="1200" dirty="0">
+                          <a:solidFill>
+                            <a:srgbClr val="DF2121"/>
+                          </a:solidFill>
+                          <a:latin typeface="+mn-lt"/>
+                          <a:ea typeface="+mn-ea"/>
+                          <a:cs typeface="+mn-cs"/>
+                        </a:rPr>
+                        <a:t>5000</a:t>
+                      </a:r>
+                    </a:p>
+                  </a:txBody>
+                  <a:tcPr marL="9525" marR="9525" marT="9525" marB="0" anchor="ctr"/>
                 </a:tc>
                 <a:extLst>
                   <a:ext uri="{0D108BD9-81ED-4DB2-BD59-A6C34878D82A}">
@@ -22016,83 +22246,16 @@
                 </a:extLst>
               </a:tr>
               <a:tr h="379495">
-                <a:tc>
+                <a:tc vMerge="1">
                   <a:txBody>
                     <a:bodyPr/>
                     <a:lstStyle/>
                     <a:p>
-                      <a:pPr marL="0" algn="ctr" defTabSz="914400" rtl="0" eaLnBrk="1" latinLnBrk="0" hangingPunct="1"/>
-                      <a:r>
-                        <a:rPr lang="en-US" sz="1800" kern="1200" dirty="0">
-                          <a:solidFill>
-                            <a:srgbClr val="DF2121"/>
-                          </a:solidFill>
-                        </a:rPr>
-                        <a:t>17.82</a:t>
-                      </a:r>
-                      <a:endParaRPr lang="he-IL" sz="1800" kern="1200" dirty="0">
-                        <a:solidFill>
-                          <a:srgbClr val="DF2121"/>
-                        </a:solidFill>
-                        <a:latin typeface="+mn-lt"/>
-                        <a:ea typeface="+mn-ea"/>
-                        <a:cs typeface="+mn-cs"/>
-                      </a:endParaRPr>
+                      <a:pPr algn="l" rtl="0"/>
+                      <a:endParaRPr lang="he-IL" dirty="0"/>
                     </a:p>
                   </a:txBody>
-                  <a:tcPr anchor="ctr"/>
-                </a:tc>
-                <a:tc>
-                  <a:txBody>
-                    <a:bodyPr/>
-                    <a:lstStyle/>
-                    <a:p>
-                      <a:pPr marL="0" algn="ctr" defTabSz="914400" rtl="0" eaLnBrk="1" latinLnBrk="0" hangingPunct="1"/>
-                      <a:r>
-                        <a:rPr lang="en-US" sz="1800" kern="1200" dirty="0">
-                          <a:solidFill>
-                            <a:srgbClr val="DF2121"/>
-                          </a:solidFill>
-                        </a:rPr>
-                        <a:t>750</a:t>
-                      </a:r>
-                      <a:endParaRPr lang="he-IL" sz="1800" kern="1200" dirty="0">
-                        <a:solidFill>
-                          <a:srgbClr val="DF2121"/>
-                        </a:solidFill>
-                        <a:latin typeface="+mn-lt"/>
-                        <a:ea typeface="+mn-ea"/>
-                        <a:cs typeface="+mn-cs"/>
-                      </a:endParaRPr>
-                    </a:p>
-                  </a:txBody>
-                  <a:tcPr anchor="ctr"/>
-                </a:tc>
-                <a:tc>
-                  <a:txBody>
-                    <a:bodyPr/>
-                    <a:lstStyle/>
-                    <a:p>
-                      <a:pPr marL="0" algn="ctr" defTabSz="914400" rtl="0" eaLnBrk="1" latinLnBrk="0" hangingPunct="1"/>
-                      <a:r>
-                        <a:rPr lang="en-US" sz="1800" kern="1200" dirty="0">
-                          <a:solidFill>
-                            <a:srgbClr val="DF2121"/>
-                          </a:solidFill>
-                        </a:rPr>
-                        <a:t>5000</a:t>
-                      </a:r>
-                      <a:endParaRPr lang="he-IL" sz="1800" kern="1200" dirty="0">
-                        <a:solidFill>
-                          <a:srgbClr val="DF2121"/>
-                        </a:solidFill>
-                        <a:latin typeface="+mn-lt"/>
-                        <a:ea typeface="+mn-ea"/>
-                        <a:cs typeface="+mn-cs"/>
-                      </a:endParaRPr>
-                    </a:p>
-                  </a:txBody>
-                  <a:tcPr anchor="ctr"/>
+                  <a:tcPr/>
                 </a:tc>
                 <a:tc>
                   <a:txBody>
@@ -22120,16 +22283,68 @@
                   </a:txBody>
                   <a:tcPr anchor="ctr"/>
                 </a:tc>
-                <a:tc vMerge="1">
+                <a:tc>
                   <a:txBody>
                     <a:bodyPr/>
                     <a:lstStyle/>
                     <a:p>
-                      <a:pPr algn="l" rtl="0"/>
-                      <a:endParaRPr lang="he-IL" dirty="0"/>
+                      <a:pPr algn="ctr" rtl="0" fontAlgn="b"/>
+                      <a:r>
+                        <a:rPr lang="he-IL" sz="1800" kern="1200" dirty="0">
+                          <a:solidFill>
+                            <a:srgbClr val="DF2121"/>
+                          </a:solidFill>
+                          <a:latin typeface="+mn-lt"/>
+                          <a:ea typeface="+mn-ea"/>
+                          <a:cs typeface="+mn-cs"/>
+                        </a:rPr>
+                        <a:t>17.82</a:t>
+                      </a:r>
                     </a:p>
                   </a:txBody>
-                  <a:tcPr/>
+                  <a:tcPr marL="9525" marR="9525" marT="9525" marB="0" anchor="ctr"/>
+                </a:tc>
+                <a:tc>
+                  <a:txBody>
+                    <a:bodyPr/>
+                    <a:lstStyle/>
+                    <a:p>
+                      <a:pPr algn="ctr" rtl="0" fontAlgn="b"/>
+                      <a:r>
+                        <a:rPr lang="he-IL" sz="1800" kern="1200" dirty="0">
+                          <a:solidFill>
+                            <a:srgbClr val="DF2121"/>
+                          </a:solidFill>
+                          <a:latin typeface="+mn-lt"/>
+                          <a:ea typeface="+mn-ea"/>
+                          <a:cs typeface="+mn-cs"/>
+                        </a:rPr>
+                        <a:t>750</a:t>
+                      </a:r>
+                    </a:p>
+                  </a:txBody>
+                  <a:tcPr marL="9525" marR="9525" marT="9525" marB="0" anchor="ctr"/>
+                </a:tc>
+                <a:tc>
+                  <a:txBody>
+                    <a:bodyPr/>
+                    <a:lstStyle/>
+                    <a:p>
+                      <a:pPr algn="ctr" rtl="0" fontAlgn="b"/>
+                      <a:r>
+                        <a:rPr lang="he-IL" sz="1800" kern="1200" dirty="0">
+                          <a:solidFill>
+                            <a:srgbClr val="DF2121"/>
+                          </a:solidFill>
+                          <a:latin typeface="+mn-lt"/>
+                          <a:ea typeface="+mn-ea"/>
+                          <a:cs typeface="+mn-cs"/>
+                        </a:rPr>
+                        <a:t>5000</a:t>
+                      </a:r>
+                    </a:p>
+                  </a:txBody>
+                  <a:tcPr marL="9525" marR="9525" marT="9525" marB="0" anchor="ctr"/>
                 </a:tc>
                 <a:extLst>
                   <a:ext uri="{0D108BD9-81ED-4DB2-BD59-A6C34878D82A}">
@@ -22160,7 +22375,7 @@
         <p:spPr>
           <a:xfrm>
             <a:off x="1141412" y="6426685"/>
-            <a:ext cx="6976046" cy="365125"/>
+            <a:ext cx="6502972" cy="365125"/>
           </a:xfrm>
         </p:spPr>
         <p:txBody>
@@ -22169,7 +22384,7 @@
           <a:p>
             <a:r>
               <a:rPr lang="en-US" dirty="0"/>
-              <a:t>* - In case there were multiple scenarios with the same score, we chose arbitrarily one of them</a:t>
+              <a:t>* - In cases where the same result was obtained for several scenarios, it was chosen arbitrarily</a:t>
             </a:r>
             <a:endParaRPr lang="he-IL" dirty="0"/>
           </a:p>
@@ -22189,6 +22404,80 @@
 </file>
 
 <file path=ppt/slides/slide26.xml><?xml version="1.0" encoding="utf-8"?>
+<p:sld xmlns:a="http://schemas.openxmlformats.org/drawingml/2006/main" xmlns:r="http://schemas.openxmlformats.org/officeDocument/2006/relationships" xmlns:p="http://schemas.openxmlformats.org/presentationml/2006/main">
+  <p:cSld>
+    <p:bg>
+      <p:bgPr>
+        <a:solidFill>
+          <a:srgbClr val="002060"/>
+        </a:solidFill>
+        <a:effectLst/>
+      </p:bgPr>
+    </p:bg>
+    <p:spTree>
+      <p:nvGrpSpPr>
+        <p:cNvPr id="1" name=""/>
+        <p:cNvGrpSpPr/>
+        <p:nvPr/>
+      </p:nvGrpSpPr>
+      <p:grpSpPr>
+        <a:xfrm>
+          <a:off x="0" y="0"/>
+          <a:ext cx="0" cy="0"/>
+          <a:chOff x="0" y="0"/>
+          <a:chExt cx="0" cy="0"/>
+        </a:xfrm>
+      </p:grpSpPr>
+      <p:pic>
+        <p:nvPicPr>
+          <p:cNvPr id="4" name="Picture 3">
+            <a:extLst>
+              <a:ext uri="{FF2B5EF4-FFF2-40B4-BE49-F238E27FC236}">
+                <a16:creationId xmlns:a16="http://schemas.microsoft.com/office/drawing/2014/main" id="{16003192-A1E0-40A1-99BC-1A3B5F797734}"/>
+              </a:ext>
+            </a:extLst>
+          </p:cNvPr>
+          <p:cNvPicPr>
+            <a:picLocks noChangeAspect="1"/>
+          </p:cNvPicPr>
+          <p:nvPr/>
+        </p:nvPicPr>
+        <p:blipFill>
+          <a:blip r:embed="rId4">
+            <a:extLst>
+              <a:ext uri="{28A0092B-C50C-407E-A947-70E740481C1C}">
+                <a14:useLocalDpi xmlns:a14="http://schemas.microsoft.com/office/drawing/2010/main" val="0"/>
+              </a:ext>
+            </a:extLst>
+          </a:blip>
+          <a:stretch>
+            <a:fillRect/>
+          </a:stretch>
+        </p:blipFill>
+        <p:spPr>
+          <a:xfrm>
+            <a:off x="1523999" y="0"/>
+            <a:ext cx="9144001" cy="6858000"/>
+          </a:xfrm>
+          <a:prstGeom prst="rect">
+            <a:avLst/>
+          </a:prstGeom>
+        </p:spPr>
+      </p:pic>
+    </p:spTree>
+    <p:extLst>
+      <p:ext uri="{BB962C8B-B14F-4D97-AF65-F5344CB8AC3E}">
+        <p14:creationId xmlns:p14="http://schemas.microsoft.com/office/powerpoint/2010/main" val="2317378467"/>
+      </p:ext>
+    </p:extLst>
+  </p:cSld>
+  <p:clrMapOvr>
+    <a:overrideClrMapping bg1="dk1" tx1="lt1" bg2="dk2" tx2="lt2" accent1="accent1" accent2="accent2" accent3="accent3" accent4="accent4" accent5="accent5" accent6="accent6" hlink="hlink" folHlink="folHlink"/>
+  </p:clrMapOvr>
+</p:sld>
+</file>
+
+<file path=ppt/slides/slide27.xml><?xml version="1.0" encoding="utf-8"?>
 <p:sld xmlns:a="http://schemas.openxmlformats.org/drawingml/2006/main" xmlns:r="http://schemas.openxmlformats.org/officeDocument/2006/relationships" xmlns:p="http://schemas.openxmlformats.org/presentationml/2006/main">
   <p:cSld>
     <p:bg>
@@ -22262,7 +22551,7 @@
 </p:sld>
 </file>
 
-<file path=ppt/slides/slide27.xml><?xml version="1.0" encoding="utf-8"?>
+<file path=ppt/slides/slide28.xml><?xml version="1.0" encoding="utf-8"?>
 <p:sld xmlns:a="http://schemas.openxmlformats.org/drawingml/2006/main" xmlns:r="http://schemas.openxmlformats.org/officeDocument/2006/relationships" xmlns:p="http://schemas.openxmlformats.org/presentationml/2006/main">
   <p:cSld>
     <p:bg>
@@ -22342,7 +22631,6 @@
               <a:rPr lang="en-US" dirty="0"/>
               <a:t>Goal – Maximize Total Reward – Minimize Zombies survive</a:t>
             </a:r>
-            <a:endParaRPr lang="he-IL" dirty="0"/>
           </a:p>
         </p:txBody>
       </p:sp>
@@ -22359,7 +22647,7 @@
 </p:sld>
 </file>
 
-<file path=ppt/slides/slide28.xml><?xml version="1.0" encoding="utf-8"?>
+<file path=ppt/slides/slide29.xml><?xml version="1.0" encoding="utf-8"?>
 <p:sld xmlns:a="http://schemas.openxmlformats.org/drawingml/2006/main" xmlns:r="http://schemas.openxmlformats.org/officeDocument/2006/relationships" xmlns:p="http://schemas.openxmlformats.org/presentationml/2006/main">
   <p:cSld>
     <p:bg>
@@ -22425,41 +22713,6 @@
           </a:p>
         </p:txBody>
       </p:sp>
-      <p:pic>
-        <p:nvPicPr>
-          <p:cNvPr id="12" name="Picture 11">
-            <a:extLst>
-              <a:ext uri="{FF2B5EF4-FFF2-40B4-BE49-F238E27FC236}">
-                <a16:creationId xmlns:a16="http://schemas.microsoft.com/office/drawing/2014/main" id="{D2FA6CF0-A84D-4664-925A-416D0C60B59D}"/>
-              </a:ext>
-            </a:extLst>
-          </p:cNvPr>
-          <p:cNvPicPr>
-            <a:picLocks noChangeAspect="1"/>
-          </p:cNvPicPr>
-          <p:nvPr/>
-        </p:nvPicPr>
-        <p:blipFill rotWithShape="1">
-          <a:blip r:embed="rId4">
-            <a:extLst>
-              <a:ext uri="{28A0092B-C50C-407E-A947-70E740481C1C}">
-                <a14:useLocalDpi xmlns:a14="http://schemas.microsoft.com/office/drawing/2010/main" val="0"/>
-              </a:ext>
-            </a:extLst>
-          </a:blip>
-          <a:srcRect l="9375" t="7083" r="67013" b="62186"/>
-          <a:stretch/>
-        </p:blipFill>
-        <p:spPr>
-          <a:xfrm>
-            <a:off x="6094412" y="2097088"/>
-            <a:ext cx="4298692" cy="4196130"/>
-          </a:xfrm>
-          <a:prstGeom prst="rect">
-            <a:avLst/>
-          </a:prstGeom>
-        </p:spPr>
-      </p:pic>
       <p:sp>
         <p:nvSpPr>
           <p:cNvPr id="4" name="Text Placeholder 3">
@@ -22661,7 +22914,7 @@
           <a:p>
             <a:pPr algn="l" rtl="0"/>
             <a:r>
-              <a:rPr lang="en-US"/>
+              <a:rPr lang="en-US" dirty="0"/>
               <a:t>Board of 10x10</a:t>
             </a:r>
           </a:p>
@@ -22671,72 +22924,12 @@
               <a:rPr lang="en-US" dirty="0"/>
               <a:t>Goal: Maximize Total Reward (Minimum zombies survival)</a:t>
             </a:r>
-            <a:endParaRPr lang="he-IL" dirty="0"/>
           </a:p>
-        </p:txBody>
-      </p:sp>
-    </p:spTree>
-    <p:extLst>
-      <p:ext uri="{BB962C8B-B14F-4D97-AF65-F5344CB8AC3E}">
-        <p14:creationId xmlns:p14="http://schemas.microsoft.com/office/powerpoint/2010/main" val="2231066291"/>
-      </p:ext>
-    </p:extLst>
-  </p:cSld>
-  <p:clrMapOvr>
-    <a:overrideClrMapping bg1="dk1" tx1="lt1" bg2="dk2" tx2="lt2" accent1="accent1" accent2="accent2" accent3="accent3" accent4="accent4" accent5="accent5" accent6="accent6" hlink="hlink" folHlink="folHlink"/>
-  </p:clrMapOvr>
-</p:sld>
-</file>
-
-<file path=ppt/slides/slide29.xml><?xml version="1.0" encoding="utf-8"?>
-<p:sld xmlns:a="http://schemas.openxmlformats.org/drawingml/2006/main" xmlns:r="http://schemas.openxmlformats.org/officeDocument/2006/relationships" xmlns:p="http://schemas.openxmlformats.org/presentationml/2006/main">
-  <p:cSld>
-    <p:bg>
-      <p:bgPr>
-        <a:solidFill>
-          <a:srgbClr val="002060"/>
-        </a:solidFill>
-        <a:effectLst/>
-      </p:bgPr>
-    </p:bg>
-    <p:spTree>
-      <p:nvGrpSpPr>
-        <p:cNvPr id="1" name=""/>
-        <p:cNvGrpSpPr/>
-        <p:nvPr/>
-      </p:nvGrpSpPr>
-      <p:grpSpPr>
-        <a:xfrm>
-          <a:off x="0" y="0"/>
-          <a:ext cx="0" cy="0"/>
-          <a:chOff x="0" y="0"/>
-          <a:chExt cx="0" cy="0"/>
-        </a:xfrm>
-      </p:grpSpPr>
-      <p:sp>
-        <p:nvSpPr>
-          <p:cNvPr id="2" name="Title 1">
-            <a:extLst>
-              <a:ext uri="{FF2B5EF4-FFF2-40B4-BE49-F238E27FC236}">
-                <a16:creationId xmlns:a16="http://schemas.microsoft.com/office/drawing/2014/main" id="{CB842EB8-27EE-4B8E-A665-0ECCEC207EAD}"/>
-              </a:ext>
-            </a:extLst>
-          </p:cNvPr>
-          <p:cNvSpPr>
-            <a:spLocks noGrp="1"/>
-          </p:cNvSpPr>
-          <p:nvPr>
-            <p:ph type="title"/>
-          </p:nvPr>
-        </p:nvSpPr>
-        <p:spPr/>
-        <p:txBody>
-          <a:bodyPr/>
-          <a:lstStyle/>
           <a:p>
+            <a:pPr algn="l" rtl="0"/>
             <a:r>
               <a:rPr lang="en-US" dirty="0"/>
-              <a:t>DDQN vs. all – board of 10x10</a:t>
+              <a:t>Get negative rewards as the opposite of Zombie Player</a:t>
             </a:r>
             <a:endParaRPr lang="he-IL" dirty="0"/>
           </a:p>
@@ -22744,10 +22937,10 @@
       </p:sp>
       <p:pic>
         <p:nvPicPr>
-          <p:cNvPr id="15" name="Picture 14">
+          <p:cNvPr id="7" name="Picture 6">
             <a:extLst>
               <a:ext uri="{FF2B5EF4-FFF2-40B4-BE49-F238E27FC236}">
-                <a16:creationId xmlns:a16="http://schemas.microsoft.com/office/drawing/2014/main" id="{7D9B5F19-30FE-4E51-8FC2-BD734B595892}"/>
+                <a16:creationId xmlns:a16="http://schemas.microsoft.com/office/drawing/2014/main" id="{A28001BF-7B33-4494-BC15-F9DCD4248888}"/>
               </a:ext>
             </a:extLst>
           </p:cNvPr>
@@ -22757,20 +22950,20 @@
           <p:nvPr/>
         </p:nvPicPr>
         <p:blipFill rotWithShape="1">
-          <a:blip r:embed="rId3">
+          <a:blip r:embed="rId4">
             <a:extLst>
               <a:ext uri="{28A0092B-C50C-407E-A947-70E740481C1C}">
                 <a14:useLocalDpi xmlns:a14="http://schemas.microsoft.com/office/drawing/2010/main" val="0"/>
               </a:ext>
             </a:extLst>
           </a:blip>
-          <a:srcRect l="9375" t="7084" r="834" b="62083"/>
+          <a:srcRect l="9725" t="6735" r="67807" b="62337"/>
           <a:stretch/>
         </p:blipFill>
         <p:spPr>
           <a:xfrm>
-            <a:off x="289440" y="2200275"/>
-            <a:ext cx="11613120" cy="2990850"/>
+            <a:off x="6408826" y="1967845"/>
+            <a:ext cx="4205755" cy="4342240"/>
           </a:xfrm>
           <a:prstGeom prst="rect">
             <a:avLst/>
@@ -22780,7 +22973,7 @@
     </p:spTree>
     <p:extLst>
       <p:ext uri="{BB962C8B-B14F-4D97-AF65-F5344CB8AC3E}">
-        <p14:creationId xmlns:p14="http://schemas.microsoft.com/office/powerpoint/2010/main" val="2187702260"/>
+        <p14:creationId xmlns:p14="http://schemas.microsoft.com/office/powerpoint/2010/main" val="2231066291"/>
       </p:ext>
     </p:extLst>
   </p:cSld>
@@ -22912,12 +23105,114 @@
           <a:chExt cx="0" cy="0"/>
         </a:xfrm>
       </p:grpSpPr>
+      <p:sp>
+        <p:nvSpPr>
+          <p:cNvPr id="2" name="Title 1">
+            <a:extLst>
+              <a:ext uri="{FF2B5EF4-FFF2-40B4-BE49-F238E27FC236}">
+                <a16:creationId xmlns:a16="http://schemas.microsoft.com/office/drawing/2014/main" id="{CB842EB8-27EE-4B8E-A665-0ECCEC207EAD}"/>
+              </a:ext>
+            </a:extLst>
+          </p:cNvPr>
+          <p:cNvSpPr>
+            <a:spLocks noGrp="1"/>
+          </p:cNvSpPr>
+          <p:nvPr>
+            <p:ph type="title"/>
+          </p:nvPr>
+        </p:nvSpPr>
+        <p:spPr/>
+        <p:txBody>
+          <a:bodyPr/>
+          <a:lstStyle/>
+          <a:p>
+            <a:r>
+              <a:rPr lang="en-US" dirty="0"/>
+              <a:t>DDQN vs. all – board of 10x10</a:t>
+            </a:r>
+            <a:endParaRPr lang="he-IL" dirty="0"/>
+          </a:p>
+        </p:txBody>
+      </p:sp>
       <p:pic>
         <p:nvPicPr>
-          <p:cNvPr id="3" name="Picture 2">
+          <p:cNvPr id="4" name="Picture 3">
             <a:extLst>
               <a:ext uri="{FF2B5EF4-FFF2-40B4-BE49-F238E27FC236}">
-                <a16:creationId xmlns:a16="http://schemas.microsoft.com/office/drawing/2014/main" id="{6AA68034-7906-44B0-808C-F3BB18C38407}"/>
+                <a16:creationId xmlns:a16="http://schemas.microsoft.com/office/drawing/2014/main" id="{CD68DABC-7F8A-4403-9BDC-8D454281D51B}"/>
+              </a:ext>
+            </a:extLst>
+          </p:cNvPr>
+          <p:cNvPicPr>
+            <a:picLocks noChangeAspect="1"/>
+          </p:cNvPicPr>
+          <p:nvPr/>
+        </p:nvPicPr>
+        <p:blipFill rotWithShape="1">
+          <a:blip r:embed="rId3">
+            <a:extLst>
+              <a:ext uri="{28A0092B-C50C-407E-A947-70E740481C1C}">
+                <a14:useLocalDpi xmlns:a14="http://schemas.microsoft.com/office/drawing/2010/main" val="0"/>
+              </a:ext>
+            </a:extLst>
+          </a:blip>
+          <a:srcRect l="9725" t="6735" b="62337"/>
+          <a:stretch/>
+        </p:blipFill>
+        <p:spPr>
+          <a:xfrm>
+            <a:off x="527909" y="2350881"/>
+            <a:ext cx="11136181" cy="2861411"/>
+          </a:xfrm>
+          <a:prstGeom prst="rect">
+            <a:avLst/>
+          </a:prstGeom>
+        </p:spPr>
+      </p:pic>
+    </p:spTree>
+    <p:extLst>
+      <p:ext uri="{BB962C8B-B14F-4D97-AF65-F5344CB8AC3E}">
+        <p14:creationId xmlns:p14="http://schemas.microsoft.com/office/powerpoint/2010/main" val="2187702260"/>
+      </p:ext>
+    </p:extLst>
+  </p:cSld>
+  <p:clrMapOvr>
+    <a:overrideClrMapping bg1="dk1" tx1="lt1" bg2="dk2" tx2="lt2" accent1="accent1" accent2="accent2" accent3="accent3" accent4="accent4" accent5="accent5" accent6="accent6" hlink="hlink" folHlink="folHlink"/>
+  </p:clrMapOvr>
+</p:sld>
+</file>
+
+<file path=ppt/slides/slide31.xml><?xml version="1.0" encoding="utf-8"?>
+<p:sld xmlns:a="http://schemas.openxmlformats.org/drawingml/2006/main" xmlns:r="http://schemas.openxmlformats.org/officeDocument/2006/relationships" xmlns:p="http://schemas.openxmlformats.org/presentationml/2006/main">
+  <p:cSld>
+    <p:bg>
+      <p:bgPr>
+        <a:solidFill>
+          <a:srgbClr val="002060"/>
+        </a:solidFill>
+        <a:effectLst/>
+      </p:bgPr>
+    </p:bg>
+    <p:spTree>
+      <p:nvGrpSpPr>
+        <p:cNvPr id="1" name=""/>
+        <p:cNvGrpSpPr/>
+        <p:nvPr/>
+      </p:nvGrpSpPr>
+      <p:grpSpPr>
+        <a:xfrm>
+          <a:off x="0" y="0"/>
+          <a:ext cx="0" cy="0"/>
+          <a:chOff x="0" y="0"/>
+          <a:chExt cx="0" cy="0"/>
+        </a:xfrm>
+      </p:grpSpPr>
+      <p:pic>
+        <p:nvPicPr>
+          <p:cNvPr id="6" name="Picture 5">
+            <a:extLst>
+              <a:ext uri="{FF2B5EF4-FFF2-40B4-BE49-F238E27FC236}">
+                <a16:creationId xmlns:a16="http://schemas.microsoft.com/office/drawing/2014/main" id="{452E3D3C-2C29-411B-B874-86DAB19E75D0}"/>
               </a:ext>
             </a:extLst>
           </p:cNvPr>
@@ -22940,7 +23235,7 @@
         </p:blipFill>
         <p:spPr>
           <a:xfrm>
-            <a:off x="1228724" y="0"/>
+            <a:off x="1523999" y="0"/>
             <a:ext cx="9144001" cy="6858000"/>
           </a:xfrm>
           <a:prstGeom prst="rect">
@@ -22961,7 +23256,7 @@
 </p:sld>
 </file>
 
-<file path=ppt/slides/slide31.xml><?xml version="1.0" encoding="utf-8"?>
+<file path=ppt/slides/slide32.xml><?xml version="1.0" encoding="utf-8"?>
 <p:sld xmlns:a="http://schemas.openxmlformats.org/drawingml/2006/main" xmlns:r="http://schemas.openxmlformats.org/officeDocument/2006/relationships" xmlns:p="http://schemas.openxmlformats.org/presentationml/2006/main">
   <p:cSld>
     <p:bg>
@@ -23100,7 +23395,7 @@
 </p:sld>
 </file>
 
-<file path=ppt/slides/slide32.xml><?xml version="1.0" encoding="utf-8"?>
+<file path=ppt/slides/slide33.xml><?xml version="1.0" encoding="utf-8"?>
 <p:sld xmlns:a="http://schemas.openxmlformats.org/drawingml/2006/main" xmlns:r="http://schemas.openxmlformats.org/officeDocument/2006/relationships" xmlns:p="http://schemas.openxmlformats.org/presentationml/2006/main">
   <p:cSld>
     <p:bg>
@@ -23654,7 +23949,7 @@
                     <a:p>
                       <a:pPr algn="ctr" fontAlgn="b"/>
                       <a:r>
-                        <a:rPr lang="he-IL" sz="1800" kern="1200">
+                        <a:rPr lang="he-IL" sz="1800" kern="1200" dirty="0">
                           <a:solidFill>
                             <a:schemeClr val="dk1"/>
                           </a:solidFill>
@@ -23664,14 +23959,6 @@
                         </a:rPr>
                         <a:t>5000</a:t>
                       </a:r>
-                      <a:endParaRPr lang="he-IL" sz="1800" kern="1200" dirty="0">
-                        <a:solidFill>
-                          <a:schemeClr val="dk1"/>
-                        </a:solidFill>
-                        <a:latin typeface="+mn-lt"/>
-                        <a:ea typeface="+mn-ea"/>
-                        <a:cs typeface="+mn-cs"/>
-                      </a:endParaRPr>
                     </a:p>
                   </a:txBody>
                   <a:tcPr marL="9525" marR="9525" marT="9525" marB="0" anchor="ctr"/>
@@ -24589,7 +24876,81 @@
 </p:sld>
 </file>
 
-<file path=ppt/slides/slide33.xml><?xml version="1.0" encoding="utf-8"?>
+<file path=ppt/slides/slide34.xml><?xml version="1.0" encoding="utf-8"?>
+<p:sld xmlns:a="http://schemas.openxmlformats.org/drawingml/2006/main" xmlns:r="http://schemas.openxmlformats.org/officeDocument/2006/relationships" xmlns:p="http://schemas.openxmlformats.org/presentationml/2006/main">
+  <p:cSld>
+    <p:bg>
+      <p:bgPr>
+        <a:solidFill>
+          <a:srgbClr val="002060"/>
+        </a:solidFill>
+        <a:effectLst/>
+      </p:bgPr>
+    </p:bg>
+    <p:spTree>
+      <p:nvGrpSpPr>
+        <p:cNvPr id="1" name=""/>
+        <p:cNvGrpSpPr/>
+        <p:nvPr/>
+      </p:nvGrpSpPr>
+      <p:grpSpPr>
+        <a:xfrm>
+          <a:off x="0" y="0"/>
+          <a:ext cx="0" cy="0"/>
+          <a:chOff x="0" y="0"/>
+          <a:chExt cx="0" cy="0"/>
+        </a:xfrm>
+      </p:grpSpPr>
+      <p:pic>
+        <p:nvPicPr>
+          <p:cNvPr id="27" name="Picture 26">
+            <a:extLst>
+              <a:ext uri="{FF2B5EF4-FFF2-40B4-BE49-F238E27FC236}">
+                <a16:creationId xmlns:a16="http://schemas.microsoft.com/office/drawing/2014/main" id="{F808C5E6-3BD8-4359-9462-AB0FE89817A9}"/>
+              </a:ext>
+            </a:extLst>
+          </p:cNvPr>
+          <p:cNvPicPr>
+            <a:picLocks noChangeAspect="1"/>
+          </p:cNvPicPr>
+          <p:nvPr/>
+        </p:nvPicPr>
+        <p:blipFill>
+          <a:blip r:embed="rId4">
+            <a:extLst>
+              <a:ext uri="{28A0092B-C50C-407E-A947-70E740481C1C}">
+                <a14:useLocalDpi xmlns:a14="http://schemas.microsoft.com/office/drawing/2010/main" val="0"/>
+              </a:ext>
+            </a:extLst>
+          </a:blip>
+          <a:stretch>
+            <a:fillRect/>
+          </a:stretch>
+        </p:blipFill>
+        <p:spPr>
+          <a:xfrm>
+            <a:off x="1523999" y="0"/>
+            <a:ext cx="9144001" cy="6858000"/>
+          </a:xfrm>
+          <a:prstGeom prst="rect">
+            <a:avLst/>
+          </a:prstGeom>
+        </p:spPr>
+      </p:pic>
+    </p:spTree>
+    <p:extLst>
+      <p:ext uri="{BB962C8B-B14F-4D97-AF65-F5344CB8AC3E}">
+        <p14:creationId xmlns:p14="http://schemas.microsoft.com/office/powerpoint/2010/main" val="2809878388"/>
+      </p:ext>
+    </p:extLst>
+  </p:cSld>
+  <p:clrMapOvr>
+    <a:overrideClrMapping bg1="dk1" tx1="lt1" bg2="dk2" tx2="lt2" accent1="accent1" accent2="accent2" accent3="accent3" accent4="accent4" accent5="accent5" accent6="accent6" hlink="hlink" folHlink="folHlink"/>
+  </p:clrMapOvr>
+</p:sld>
+</file>
+
+<file path=ppt/slides/slide35.xml><?xml version="1.0" encoding="utf-8"?>
 <p:sld xmlns:a="http://schemas.openxmlformats.org/drawingml/2006/main" xmlns:r="http://schemas.openxmlformats.org/officeDocument/2006/relationships" xmlns:p="http://schemas.openxmlformats.org/presentationml/2006/main">
   <p:cSld>
     <p:bg>
@@ -24653,7 +25014,7 @@
     </p:spTree>
     <p:extLst>
       <p:ext uri="{BB962C8B-B14F-4D97-AF65-F5344CB8AC3E}">
-        <p14:creationId xmlns:p14="http://schemas.microsoft.com/office/powerpoint/2010/main" val="2809878388"/>
+        <p14:creationId xmlns:p14="http://schemas.microsoft.com/office/powerpoint/2010/main" val="2056738141"/>
       </p:ext>
     </p:extLst>
   </p:cSld>
@@ -24663,7 +25024,7 @@
 </p:sld>
 </file>
 
-<file path=ppt/slides/slide34.xml><?xml version="1.0" encoding="utf-8"?>
+<file path=ppt/slides/slide36.xml><?xml version="1.0" encoding="utf-8"?>
 <p:sld xmlns:a="http://schemas.openxmlformats.org/drawingml/2006/main" xmlns:r="http://schemas.openxmlformats.org/officeDocument/2006/relationships" xmlns:p="http://schemas.openxmlformats.org/presentationml/2006/main">
   <p:cSld>
     <p:spTree>
@@ -24727,7 +25088,7 @@
         </p:nvSpPr>
         <p:spPr>
           <a:xfrm>
-            <a:off x="1141412" y="2249486"/>
+            <a:off x="1141413" y="1973869"/>
             <a:ext cx="10450513" cy="4265613"/>
           </a:xfrm>
         </p:spPr>
@@ -24740,43 +25101,7 @@
             <a:pPr algn="l" rtl="0"/>
             <a:r>
               <a:rPr lang="en-US" dirty="0"/>
-              <a:t>Plot moving average instead of real results (new graphs)</a:t>
-            </a:r>
-          </a:p>
-          <a:p>
-            <a:pPr algn="l" rtl="0"/>
-            <a:r>
-              <a:rPr lang="en-US" dirty="0"/>
-              <a:t>Extract graphs of partial labels for build up</a:t>
-            </a:r>
-          </a:p>
-          <a:p>
-            <a:pPr algn="l" rtl="0"/>
-            <a:r>
-              <a:rPr lang="en-US" dirty="0"/>
-              <a:t>Update the </a:t>
-            </a:r>
-            <a:r>
-              <a:rPr lang="en-US" dirty="0" err="1"/>
-              <a:t>sns</a:t>
-            </a:r>
-            <a:r>
-              <a:rPr lang="en-US" dirty="0"/>
-              <a:t> graph of the light agent</a:t>
-            </a:r>
-          </a:p>
-          <a:p>
-            <a:pPr algn="l" rtl="0"/>
-            <a:r>
-              <a:rPr lang="en-US" dirty="0"/>
-              <a:t>Add the graphs of the comparison</a:t>
-            </a:r>
-          </a:p>
-          <a:p>
-            <a:pPr algn="l" rtl="0"/>
-            <a:r>
-              <a:rPr lang="en-US" dirty="0"/>
-              <a:t>Elaborate on the simple agents</a:t>
+              <a:t>Further elaboration on all simple agents</a:t>
             </a:r>
           </a:p>
           <a:p>
@@ -24790,14 +25115,21 @@
             <a:pPr lvl="1" algn="l" rtl="0"/>
             <a:r>
               <a:rPr lang="en-US" dirty="0"/>
-              <a:t>Add a slide to scenarios and elaborate on the tuning params?</a:t>
+              <a:t>Add a slide to scenarios and elaborate on the tuning params? (Target policy update frequency and replay memory size) </a:t>
             </a:r>
           </a:p>
           <a:p>
             <a:pPr lvl="1" algn="l" rtl="0"/>
             <a:r>
               <a:rPr lang="en-US" dirty="0"/>
-              <a:t>Add action distribution graphs of best agents?</a:t>
+              <a:t>Add action distribution graphs of best agents? (12 graphs for each player type)</a:t>
+            </a:r>
+          </a:p>
+          <a:p>
+            <a:pPr lvl="1" algn="l" rtl="0"/>
+            <a:r>
+              <a:rPr lang="en-US" dirty="0"/>
+              <a:t>What should we do with almost final convergence and non converge at all? Should we try to rerun with more episodes?</a:t>
             </a:r>
             <a:endParaRPr lang="he-IL" dirty="0"/>
           </a:p>
@@ -24889,7 +25221,7 @@
         <p:spPr>
           <a:xfrm>
             <a:off x="1141413" y="1930310"/>
-            <a:ext cx="9905999" cy="3541714"/>
+            <a:ext cx="9905999" cy="3482938"/>
           </a:xfrm>
         </p:spPr>
         <p:txBody>
@@ -24938,10 +25270,6 @@
               <a:rPr lang="en-US" dirty="0"/>
               <a:t>The light agent receives the positions as well as the zombies’ strength</a:t>
             </a:r>
-          </a:p>
-          <a:p>
-            <a:pPr lvl="1" algn="l" rtl="0"/>
-            <a:endParaRPr lang="he-IL" dirty="0"/>
           </a:p>
         </p:txBody>
       </p:sp>
@@ -27985,6 +28313,92 @@
 </a:themeOverride>
 </file>
 
+<file path=ppt/theme/themeOverride34.xml><?xml version="1.0" encoding="utf-8"?>
+<a:themeOverride xmlns:a="http://schemas.openxmlformats.org/drawingml/2006/main">
+  <a:clrScheme name="Circuit">
+    <a:dk1>
+      <a:sysClr val="windowText" lastClr="000000"/>
+    </a:dk1>
+    <a:lt1>
+      <a:sysClr val="window" lastClr="FFFFFF"/>
+    </a:lt1>
+    <a:dk2>
+      <a:srgbClr val="134770"/>
+    </a:dk2>
+    <a:lt2>
+      <a:srgbClr val="82FFFF"/>
+    </a:lt2>
+    <a:accent1>
+      <a:srgbClr val="9ACD4C"/>
+    </a:accent1>
+    <a:accent2>
+      <a:srgbClr val="FAA93A"/>
+    </a:accent2>
+    <a:accent3>
+      <a:srgbClr val="D35940"/>
+    </a:accent3>
+    <a:accent4>
+      <a:srgbClr val="B258D3"/>
+    </a:accent4>
+    <a:accent5>
+      <a:srgbClr val="63A0CC"/>
+    </a:accent5>
+    <a:accent6>
+      <a:srgbClr val="8AC4A7"/>
+    </a:accent6>
+    <a:hlink>
+      <a:srgbClr val="B8FA56"/>
+    </a:hlink>
+    <a:folHlink>
+      <a:srgbClr val="7AF8CC"/>
+    </a:folHlink>
+  </a:clrScheme>
+</a:themeOverride>
+</file>
+
+<file path=ppt/theme/themeOverride35.xml><?xml version="1.0" encoding="utf-8"?>
+<a:themeOverride xmlns:a="http://schemas.openxmlformats.org/drawingml/2006/main">
+  <a:clrScheme name="Circuit">
+    <a:dk1>
+      <a:sysClr val="windowText" lastClr="000000"/>
+    </a:dk1>
+    <a:lt1>
+      <a:sysClr val="window" lastClr="FFFFFF"/>
+    </a:lt1>
+    <a:dk2>
+      <a:srgbClr val="134770"/>
+    </a:dk2>
+    <a:lt2>
+      <a:srgbClr val="82FFFF"/>
+    </a:lt2>
+    <a:accent1>
+      <a:srgbClr val="9ACD4C"/>
+    </a:accent1>
+    <a:accent2>
+      <a:srgbClr val="FAA93A"/>
+    </a:accent2>
+    <a:accent3>
+      <a:srgbClr val="D35940"/>
+    </a:accent3>
+    <a:accent4>
+      <a:srgbClr val="B258D3"/>
+    </a:accent4>
+    <a:accent5>
+      <a:srgbClr val="63A0CC"/>
+    </a:accent5>
+    <a:accent6>
+      <a:srgbClr val="8AC4A7"/>
+    </a:accent6>
+    <a:hlink>
+      <a:srgbClr val="B8FA56"/>
+    </a:hlink>
+    <a:folHlink>
+      <a:srgbClr val="7AF8CC"/>
+    </a:folHlink>
+  </a:clrScheme>
+</a:themeOverride>
+</file>
+
 <file path=ppt/theme/themeOverride4.xml><?xml version="1.0" encoding="utf-8"?>
 <a:themeOverride xmlns:a="http://schemas.openxmlformats.org/drawingml/2006/main">
   <a:clrScheme name="Circuit">

</xml_diff>